<commit_message>
victim data clean up, presentation update
</commit_message>
<xml_diff>
--- a/Presentation.pptx
+++ b/Presentation.pptx
@@ -8,9 +8,14 @@
     <p:sldId id="256" r:id="rId2"/>
     <p:sldId id="257" r:id="rId3"/>
     <p:sldId id="258" r:id="rId4"/>
-    <p:sldId id="259" r:id="rId5"/>
-    <p:sldId id="260" r:id="rId6"/>
-    <p:sldId id="261" r:id="rId7"/>
+    <p:sldId id="262" r:id="rId5"/>
+    <p:sldId id="263" r:id="rId6"/>
+    <p:sldId id="259" r:id="rId7"/>
+    <p:sldId id="264" r:id="rId8"/>
+    <p:sldId id="265" r:id="rId9"/>
+    <p:sldId id="260" r:id="rId10"/>
+    <p:sldId id="266" r:id="rId11"/>
+    <p:sldId id="261" r:id="rId12"/>
   </p:sldIdLst>
   <p:sldSz cx="12192000" cy="6858000"/>
   <p:notesSz cx="6858000" cy="9144000"/>
@@ -109,6 +114,11 @@
       </a:defRPr>
     </a:lvl9pPr>
   </p:defaultTextStyle>
+  <p:extLst>
+    <p:ext uri="{EFAFB233-063F-42B5-8137-9DF3F51BA10A}">
+      <p15:sldGuideLst xmlns:p15="http://schemas.microsoft.com/office/powerpoint/2012/main"/>
+    </p:ext>
+  </p:extLst>
 </p:presentation>
 </file>
 
@@ -845,6 +855,925 @@
   <dgm:styleLbl name="revTx">
     <dgm:fillClrLst meth="repeat">
       <a:schemeClr val="lt2">
+        <a:alpha val="0"/>
+      </a:schemeClr>
+    </dgm:fillClrLst>
+    <dgm:linClrLst meth="repeat">
+      <a:schemeClr val="dk1">
+        <a:alpha val="0"/>
+      </a:schemeClr>
+    </dgm:linClrLst>
+    <dgm:effectClrLst/>
+    <dgm:txLinClrLst/>
+    <dgm:txFillClrLst meth="repeat">
+      <a:schemeClr val="tx1"/>
+    </dgm:txFillClrLst>
+    <dgm:txEffectClrLst/>
+  </dgm:styleLbl>
+</dgm:colorsDef>
+</file>
+
+<file path=ppt/diagrams/colors2.xml><?xml version="1.0" encoding="utf-8"?>
+<dgm:colorsDef xmlns:dgm="http://schemas.openxmlformats.org/drawingml/2006/diagram" xmlns:a="http://schemas.openxmlformats.org/drawingml/2006/main" uniqueId="urn:microsoft.com/office/officeart/2005/8/colors/colorful1">
+  <dgm:title val=""/>
+  <dgm:desc val=""/>
+  <dgm:catLst>
+    <dgm:cat type="colorful" pri="10100"/>
+  </dgm:catLst>
+  <dgm:styleLbl name="node0">
+    <dgm:fillClrLst meth="repeat">
+      <a:schemeClr val="accent1"/>
+    </dgm:fillClrLst>
+    <dgm:linClrLst meth="repeat">
+      <a:schemeClr val="lt1"/>
+    </dgm:linClrLst>
+    <dgm:effectClrLst/>
+    <dgm:txLinClrLst/>
+    <dgm:txFillClrLst/>
+    <dgm:txEffectClrLst/>
+  </dgm:styleLbl>
+  <dgm:styleLbl name="node1">
+    <dgm:fillClrLst meth="repeat">
+      <a:schemeClr val="accent2"/>
+      <a:schemeClr val="accent3"/>
+      <a:schemeClr val="accent4"/>
+      <a:schemeClr val="accent5"/>
+      <a:schemeClr val="accent6"/>
+    </dgm:fillClrLst>
+    <dgm:linClrLst meth="repeat">
+      <a:schemeClr val="lt1"/>
+    </dgm:linClrLst>
+    <dgm:effectClrLst/>
+    <dgm:txLinClrLst/>
+    <dgm:txFillClrLst/>
+    <dgm:txEffectClrLst/>
+  </dgm:styleLbl>
+  <dgm:styleLbl name="alignNode1">
+    <dgm:fillClrLst meth="repeat">
+      <a:schemeClr val="accent2"/>
+      <a:schemeClr val="accent3"/>
+      <a:schemeClr val="accent4"/>
+      <a:schemeClr val="accent5"/>
+      <a:schemeClr val="accent6"/>
+    </dgm:fillClrLst>
+    <dgm:linClrLst meth="repeat">
+      <a:schemeClr val="accent2"/>
+      <a:schemeClr val="accent3"/>
+      <a:schemeClr val="accent4"/>
+      <a:schemeClr val="accent5"/>
+      <a:schemeClr val="accent6"/>
+    </dgm:linClrLst>
+    <dgm:effectClrLst/>
+    <dgm:txLinClrLst/>
+    <dgm:txFillClrLst/>
+    <dgm:txEffectClrLst/>
+  </dgm:styleLbl>
+  <dgm:styleLbl name="lnNode1">
+    <dgm:fillClrLst meth="repeat">
+      <a:schemeClr val="accent2"/>
+      <a:schemeClr val="accent3"/>
+      <a:schemeClr val="accent4"/>
+      <a:schemeClr val="accent5"/>
+      <a:schemeClr val="accent6"/>
+    </dgm:fillClrLst>
+    <dgm:linClrLst meth="repeat">
+      <a:schemeClr val="lt1"/>
+    </dgm:linClrLst>
+    <dgm:effectClrLst/>
+    <dgm:txLinClrLst/>
+    <dgm:txFillClrLst/>
+    <dgm:txEffectClrLst/>
+  </dgm:styleLbl>
+  <dgm:styleLbl name="vennNode1">
+    <dgm:fillClrLst meth="repeat">
+      <a:schemeClr val="accent2">
+        <a:alpha val="50000"/>
+      </a:schemeClr>
+      <a:schemeClr val="accent3">
+        <a:alpha val="50000"/>
+      </a:schemeClr>
+      <a:schemeClr val="accent4">
+        <a:alpha val="50000"/>
+      </a:schemeClr>
+      <a:schemeClr val="accent5">
+        <a:alpha val="50000"/>
+      </a:schemeClr>
+      <a:schemeClr val="accent6">
+        <a:alpha val="50000"/>
+      </a:schemeClr>
+    </dgm:fillClrLst>
+    <dgm:linClrLst meth="repeat">
+      <a:schemeClr val="lt1"/>
+    </dgm:linClrLst>
+    <dgm:effectClrLst/>
+    <dgm:txLinClrLst/>
+    <dgm:txFillClrLst/>
+    <dgm:txEffectClrLst/>
+  </dgm:styleLbl>
+  <dgm:styleLbl name="node2">
+    <dgm:fillClrLst>
+      <a:schemeClr val="accent2"/>
+    </dgm:fillClrLst>
+    <dgm:linClrLst meth="repeat">
+      <a:schemeClr val="lt1"/>
+    </dgm:linClrLst>
+    <dgm:effectClrLst/>
+    <dgm:txLinClrLst/>
+    <dgm:txFillClrLst/>
+    <dgm:txEffectClrLst/>
+  </dgm:styleLbl>
+  <dgm:styleLbl name="node3">
+    <dgm:fillClrLst>
+      <a:schemeClr val="accent3"/>
+    </dgm:fillClrLst>
+    <dgm:linClrLst meth="repeat">
+      <a:schemeClr val="lt1"/>
+    </dgm:linClrLst>
+    <dgm:effectClrLst/>
+    <dgm:txLinClrLst/>
+    <dgm:txFillClrLst/>
+    <dgm:txEffectClrLst/>
+  </dgm:styleLbl>
+  <dgm:styleLbl name="node4">
+    <dgm:fillClrLst>
+      <a:schemeClr val="accent4"/>
+    </dgm:fillClrLst>
+    <dgm:linClrLst meth="repeat">
+      <a:schemeClr val="lt1"/>
+    </dgm:linClrLst>
+    <dgm:effectClrLst/>
+    <dgm:txLinClrLst/>
+    <dgm:txFillClrLst/>
+    <dgm:txEffectClrLst/>
+  </dgm:styleLbl>
+  <dgm:styleLbl name="fgImgPlace1">
+    <dgm:fillClrLst meth="repeat">
+      <a:schemeClr val="accent2">
+        <a:tint val="50000"/>
+      </a:schemeClr>
+      <a:schemeClr val="accent3">
+        <a:tint val="50000"/>
+      </a:schemeClr>
+      <a:schemeClr val="accent4">
+        <a:tint val="50000"/>
+      </a:schemeClr>
+      <a:schemeClr val="accent5">
+        <a:tint val="50000"/>
+      </a:schemeClr>
+      <a:schemeClr val="accent6">
+        <a:tint val="50000"/>
+      </a:schemeClr>
+    </dgm:fillClrLst>
+    <dgm:linClrLst meth="repeat">
+      <a:schemeClr val="lt1"/>
+    </dgm:linClrLst>
+    <dgm:effectClrLst/>
+    <dgm:txLinClrLst/>
+    <dgm:txFillClrLst meth="repeat">
+      <a:schemeClr val="lt1"/>
+    </dgm:txFillClrLst>
+    <dgm:txEffectClrLst/>
+  </dgm:styleLbl>
+  <dgm:styleLbl name="alignImgPlace1">
+    <dgm:fillClrLst>
+      <a:schemeClr val="accent1">
+        <a:tint val="50000"/>
+      </a:schemeClr>
+      <a:schemeClr val="accent2">
+        <a:tint val="20000"/>
+      </a:schemeClr>
+    </dgm:fillClrLst>
+    <dgm:linClrLst meth="repeat">
+      <a:schemeClr val="lt1"/>
+    </dgm:linClrLst>
+    <dgm:effectClrLst/>
+    <dgm:txLinClrLst/>
+    <dgm:txFillClrLst meth="repeat">
+      <a:schemeClr val="lt1"/>
+    </dgm:txFillClrLst>
+    <dgm:txEffectClrLst/>
+  </dgm:styleLbl>
+  <dgm:styleLbl name="bgImgPlace1">
+    <dgm:fillClrLst>
+      <a:schemeClr val="accent1">
+        <a:tint val="50000"/>
+      </a:schemeClr>
+      <a:schemeClr val="accent2">
+        <a:tint val="20000"/>
+      </a:schemeClr>
+    </dgm:fillClrLst>
+    <dgm:linClrLst meth="repeat">
+      <a:schemeClr val="lt1"/>
+    </dgm:linClrLst>
+    <dgm:effectClrLst/>
+    <dgm:txLinClrLst/>
+    <dgm:txFillClrLst meth="repeat">
+      <a:schemeClr val="lt1"/>
+    </dgm:txFillClrLst>
+    <dgm:txEffectClrLst/>
+  </dgm:styleLbl>
+  <dgm:styleLbl name="sibTrans2D1">
+    <dgm:fillClrLst meth="repeat">
+      <a:schemeClr val="accent2"/>
+      <a:schemeClr val="accent3"/>
+      <a:schemeClr val="accent4"/>
+      <a:schemeClr val="accent5"/>
+      <a:schemeClr val="accent6"/>
+    </dgm:fillClrLst>
+    <dgm:linClrLst meth="cycle">
+      <a:schemeClr val="lt1"/>
+    </dgm:linClrLst>
+    <dgm:effectClrLst/>
+    <dgm:txLinClrLst/>
+    <dgm:txFillClrLst/>
+    <dgm:txEffectClrLst/>
+  </dgm:styleLbl>
+  <dgm:styleLbl name="fgSibTrans2D1">
+    <dgm:fillClrLst meth="repeat">
+      <a:schemeClr val="accent2"/>
+      <a:schemeClr val="accent3"/>
+      <a:schemeClr val="accent4"/>
+      <a:schemeClr val="accent5"/>
+      <a:schemeClr val="accent6"/>
+    </dgm:fillClrLst>
+    <dgm:linClrLst meth="cycle">
+      <a:schemeClr val="lt1"/>
+    </dgm:linClrLst>
+    <dgm:effectClrLst/>
+    <dgm:txLinClrLst/>
+    <dgm:txFillClrLst meth="repeat">
+      <a:schemeClr val="lt1"/>
+    </dgm:txFillClrLst>
+    <dgm:txEffectClrLst/>
+  </dgm:styleLbl>
+  <dgm:styleLbl name="bgSibTrans2D1">
+    <dgm:fillClrLst meth="repeat">
+      <a:schemeClr val="accent2"/>
+      <a:schemeClr val="accent3"/>
+      <a:schemeClr val="accent4"/>
+      <a:schemeClr val="accent5"/>
+      <a:schemeClr val="accent6"/>
+    </dgm:fillClrLst>
+    <dgm:linClrLst meth="cycle">
+      <a:schemeClr val="lt1"/>
+    </dgm:linClrLst>
+    <dgm:effectClrLst/>
+    <dgm:txLinClrLst/>
+    <dgm:txFillClrLst meth="repeat">
+      <a:schemeClr val="lt1"/>
+    </dgm:txFillClrLst>
+    <dgm:txEffectClrLst/>
+  </dgm:styleLbl>
+  <dgm:styleLbl name="sibTrans1D1">
+    <dgm:fillClrLst meth="repeat">
+      <a:schemeClr val="accent2"/>
+      <a:schemeClr val="accent3"/>
+      <a:schemeClr val="accent4"/>
+      <a:schemeClr val="accent5"/>
+      <a:schemeClr val="accent6"/>
+    </dgm:fillClrLst>
+    <dgm:linClrLst meth="repeat">
+      <a:schemeClr val="accent2"/>
+      <a:schemeClr val="accent3"/>
+      <a:schemeClr val="accent4"/>
+      <a:schemeClr val="accent5"/>
+      <a:schemeClr val="accent6"/>
+    </dgm:linClrLst>
+    <dgm:effectClrLst/>
+    <dgm:txLinClrLst/>
+    <dgm:txFillClrLst meth="repeat">
+      <a:schemeClr val="tx1"/>
+    </dgm:txFillClrLst>
+    <dgm:txEffectClrLst/>
+  </dgm:styleLbl>
+  <dgm:styleLbl name="callout">
+    <dgm:fillClrLst meth="repeat">
+      <a:schemeClr val="accent2"/>
+    </dgm:fillClrLst>
+    <dgm:linClrLst meth="repeat">
+      <a:schemeClr val="accent2">
+        <a:tint val="50000"/>
+      </a:schemeClr>
+    </dgm:linClrLst>
+    <dgm:effectClrLst/>
+    <dgm:txLinClrLst/>
+    <dgm:txFillClrLst meth="repeat">
+      <a:schemeClr val="tx1"/>
+    </dgm:txFillClrLst>
+    <dgm:txEffectClrLst/>
+  </dgm:styleLbl>
+  <dgm:styleLbl name="asst0">
+    <dgm:fillClrLst meth="repeat">
+      <a:schemeClr val="accent1"/>
+    </dgm:fillClrLst>
+    <dgm:linClrLst meth="repeat">
+      <a:schemeClr val="lt1"/>
+    </dgm:linClrLst>
+    <dgm:effectClrLst/>
+    <dgm:txLinClrLst/>
+    <dgm:txFillClrLst/>
+    <dgm:txEffectClrLst/>
+  </dgm:styleLbl>
+  <dgm:styleLbl name="asst1">
+    <dgm:fillClrLst meth="repeat">
+      <a:schemeClr val="accent2"/>
+    </dgm:fillClrLst>
+    <dgm:linClrLst meth="repeat">
+      <a:schemeClr val="lt1"/>
+    </dgm:linClrLst>
+    <dgm:effectClrLst/>
+    <dgm:txLinClrLst/>
+    <dgm:txFillClrLst/>
+    <dgm:txEffectClrLst/>
+  </dgm:styleLbl>
+  <dgm:styleLbl name="asst2">
+    <dgm:fillClrLst>
+      <a:schemeClr val="accent3"/>
+    </dgm:fillClrLst>
+    <dgm:linClrLst meth="repeat">
+      <a:schemeClr val="lt1"/>
+    </dgm:linClrLst>
+    <dgm:effectClrLst/>
+    <dgm:txLinClrLst/>
+    <dgm:txFillClrLst/>
+    <dgm:txEffectClrLst/>
+  </dgm:styleLbl>
+  <dgm:styleLbl name="asst3">
+    <dgm:fillClrLst>
+      <a:schemeClr val="accent4"/>
+    </dgm:fillClrLst>
+    <dgm:linClrLst meth="repeat">
+      <a:schemeClr val="lt1"/>
+    </dgm:linClrLst>
+    <dgm:effectClrLst/>
+    <dgm:txLinClrLst/>
+    <dgm:txFillClrLst/>
+    <dgm:txEffectClrLst/>
+  </dgm:styleLbl>
+  <dgm:styleLbl name="asst4">
+    <dgm:fillClrLst>
+      <a:schemeClr val="accent5"/>
+    </dgm:fillClrLst>
+    <dgm:linClrLst meth="repeat">
+      <a:schemeClr val="lt1"/>
+    </dgm:linClrLst>
+    <dgm:effectClrLst/>
+    <dgm:txLinClrLst/>
+    <dgm:txFillClrLst/>
+    <dgm:txEffectClrLst/>
+  </dgm:styleLbl>
+  <dgm:styleLbl name="parChTrans2D1">
+    <dgm:fillClrLst meth="repeat">
+      <a:schemeClr val="accent2"/>
+    </dgm:fillClrLst>
+    <dgm:linClrLst meth="repeat">
+      <a:schemeClr val="lt1"/>
+    </dgm:linClrLst>
+    <dgm:effectClrLst/>
+    <dgm:txLinClrLst/>
+    <dgm:txFillClrLst meth="repeat">
+      <a:schemeClr val="lt1"/>
+    </dgm:txFillClrLst>
+    <dgm:txEffectClrLst/>
+  </dgm:styleLbl>
+  <dgm:styleLbl name="parChTrans2D2">
+    <dgm:fillClrLst meth="repeat">
+      <a:schemeClr val="accent3"/>
+    </dgm:fillClrLst>
+    <dgm:linClrLst meth="repeat">
+      <a:schemeClr val="lt1"/>
+    </dgm:linClrLst>
+    <dgm:effectClrLst/>
+    <dgm:txLinClrLst/>
+    <dgm:txFillClrLst/>
+    <dgm:txEffectClrLst/>
+  </dgm:styleLbl>
+  <dgm:styleLbl name="parChTrans2D3">
+    <dgm:fillClrLst meth="repeat">
+      <a:schemeClr val="accent4"/>
+    </dgm:fillClrLst>
+    <dgm:linClrLst meth="repeat">
+      <a:schemeClr val="lt1"/>
+    </dgm:linClrLst>
+    <dgm:effectClrLst/>
+    <dgm:txLinClrLst/>
+    <dgm:txFillClrLst/>
+    <dgm:txEffectClrLst/>
+  </dgm:styleLbl>
+  <dgm:styleLbl name="parChTrans2D4">
+    <dgm:fillClrLst meth="repeat">
+      <a:schemeClr val="accent5"/>
+    </dgm:fillClrLst>
+    <dgm:linClrLst meth="repeat">
+      <a:schemeClr val="lt1"/>
+    </dgm:linClrLst>
+    <dgm:effectClrLst/>
+    <dgm:txLinClrLst/>
+    <dgm:txFillClrLst meth="repeat">
+      <a:schemeClr val="lt1"/>
+    </dgm:txFillClrLst>
+    <dgm:txEffectClrLst/>
+  </dgm:styleLbl>
+  <dgm:styleLbl name="parChTrans1D1">
+    <dgm:fillClrLst meth="repeat">
+      <a:schemeClr val="accent2"/>
+    </dgm:fillClrLst>
+    <dgm:linClrLst meth="repeat">
+      <a:schemeClr val="accent1"/>
+    </dgm:linClrLst>
+    <dgm:effectClrLst/>
+    <dgm:txLinClrLst/>
+    <dgm:txFillClrLst meth="repeat">
+      <a:schemeClr val="tx1"/>
+    </dgm:txFillClrLst>
+    <dgm:txEffectClrLst/>
+  </dgm:styleLbl>
+  <dgm:styleLbl name="parChTrans1D2">
+    <dgm:fillClrLst meth="repeat">
+      <a:schemeClr val="accent3">
+        <a:tint val="90000"/>
+      </a:schemeClr>
+    </dgm:fillClrLst>
+    <dgm:linClrLst meth="repeat">
+      <a:schemeClr val="accent2"/>
+    </dgm:linClrLst>
+    <dgm:effectClrLst/>
+    <dgm:txLinClrLst/>
+    <dgm:txFillClrLst meth="repeat">
+      <a:schemeClr val="tx1"/>
+    </dgm:txFillClrLst>
+    <dgm:txEffectClrLst/>
+  </dgm:styleLbl>
+  <dgm:styleLbl name="parChTrans1D3">
+    <dgm:fillClrLst meth="repeat">
+      <a:schemeClr val="accent4">
+        <a:tint val="70000"/>
+      </a:schemeClr>
+    </dgm:fillClrLst>
+    <dgm:linClrLst meth="repeat">
+      <a:schemeClr val="accent3"/>
+    </dgm:linClrLst>
+    <dgm:effectClrLst/>
+    <dgm:txLinClrLst/>
+    <dgm:txFillClrLst meth="repeat">
+      <a:schemeClr val="tx1"/>
+    </dgm:txFillClrLst>
+    <dgm:txEffectClrLst/>
+  </dgm:styleLbl>
+  <dgm:styleLbl name="parChTrans1D4">
+    <dgm:fillClrLst meth="repeat">
+      <a:schemeClr val="accent5">
+        <a:tint val="50000"/>
+      </a:schemeClr>
+    </dgm:fillClrLst>
+    <dgm:linClrLst meth="repeat">
+      <a:schemeClr val="accent4"/>
+    </dgm:linClrLst>
+    <dgm:effectClrLst/>
+    <dgm:txLinClrLst/>
+    <dgm:txFillClrLst meth="repeat">
+      <a:schemeClr val="tx1"/>
+    </dgm:txFillClrLst>
+    <dgm:txEffectClrLst/>
+  </dgm:styleLbl>
+  <dgm:styleLbl name="fgAcc1">
+    <dgm:fillClrLst meth="repeat">
+      <a:schemeClr val="lt1">
+        <a:alpha val="90000"/>
+      </a:schemeClr>
+    </dgm:fillClrLst>
+    <dgm:linClrLst meth="repeat">
+      <a:schemeClr val="accent2"/>
+      <a:schemeClr val="accent3"/>
+      <a:schemeClr val="accent4"/>
+      <a:schemeClr val="accent5"/>
+      <a:schemeClr val="accent6"/>
+    </dgm:linClrLst>
+    <dgm:effectClrLst/>
+    <dgm:txLinClrLst/>
+    <dgm:txFillClrLst meth="repeat">
+      <a:schemeClr val="dk1"/>
+    </dgm:txFillClrLst>
+    <dgm:txEffectClrLst/>
+  </dgm:styleLbl>
+  <dgm:styleLbl name="conFgAcc1">
+    <dgm:fillClrLst meth="repeat">
+      <a:schemeClr val="lt1">
+        <a:alpha val="90000"/>
+      </a:schemeClr>
+    </dgm:fillClrLst>
+    <dgm:linClrLst meth="repeat">
+      <a:schemeClr val="accent2"/>
+      <a:schemeClr val="accent3"/>
+      <a:schemeClr val="accent4"/>
+      <a:schemeClr val="accent5"/>
+      <a:schemeClr val="accent6"/>
+    </dgm:linClrLst>
+    <dgm:effectClrLst/>
+    <dgm:txLinClrLst/>
+    <dgm:txFillClrLst meth="repeat">
+      <a:schemeClr val="dk1"/>
+    </dgm:txFillClrLst>
+    <dgm:txEffectClrLst/>
+  </dgm:styleLbl>
+  <dgm:styleLbl name="alignAcc1">
+    <dgm:fillClrLst meth="repeat">
+      <a:schemeClr val="lt1">
+        <a:alpha val="90000"/>
+      </a:schemeClr>
+    </dgm:fillClrLst>
+    <dgm:linClrLst meth="repeat">
+      <a:schemeClr val="accent2"/>
+      <a:schemeClr val="accent3"/>
+      <a:schemeClr val="accent4"/>
+      <a:schemeClr val="accent5"/>
+      <a:schemeClr val="accent6"/>
+    </dgm:linClrLst>
+    <dgm:effectClrLst/>
+    <dgm:txLinClrLst/>
+    <dgm:txFillClrLst meth="repeat">
+      <a:schemeClr val="dk1"/>
+    </dgm:txFillClrLst>
+    <dgm:txEffectClrLst/>
+  </dgm:styleLbl>
+  <dgm:styleLbl name="trAlignAcc1">
+    <dgm:fillClrLst meth="repeat">
+      <a:schemeClr val="lt1">
+        <a:alpha val="40000"/>
+      </a:schemeClr>
+    </dgm:fillClrLst>
+    <dgm:linClrLst meth="repeat">
+      <a:schemeClr val="accent1"/>
+    </dgm:linClrLst>
+    <dgm:effectClrLst/>
+    <dgm:txLinClrLst/>
+    <dgm:txFillClrLst meth="repeat">
+      <a:schemeClr val="dk1"/>
+    </dgm:txFillClrLst>
+    <dgm:txEffectClrLst/>
+  </dgm:styleLbl>
+  <dgm:styleLbl name="bgAcc1">
+    <dgm:fillClrLst meth="repeat">
+      <a:schemeClr val="lt1">
+        <a:alpha val="90000"/>
+      </a:schemeClr>
+    </dgm:fillClrLst>
+    <dgm:linClrLst meth="repeat">
+      <a:schemeClr val="accent2"/>
+      <a:schemeClr val="accent3"/>
+      <a:schemeClr val="accent4"/>
+      <a:schemeClr val="accent5"/>
+      <a:schemeClr val="accent6"/>
+    </dgm:linClrLst>
+    <dgm:effectClrLst/>
+    <dgm:txLinClrLst/>
+    <dgm:txFillClrLst meth="repeat">
+      <a:schemeClr val="dk1"/>
+    </dgm:txFillClrLst>
+    <dgm:txEffectClrLst/>
+  </dgm:styleLbl>
+  <dgm:styleLbl name="solidFgAcc1">
+    <dgm:fillClrLst meth="repeat">
+      <a:schemeClr val="lt1"/>
+    </dgm:fillClrLst>
+    <dgm:linClrLst meth="repeat">
+      <a:schemeClr val="accent2"/>
+      <a:schemeClr val="accent3"/>
+      <a:schemeClr val="accent4"/>
+      <a:schemeClr val="accent5"/>
+      <a:schemeClr val="accent6"/>
+    </dgm:linClrLst>
+    <dgm:effectClrLst/>
+    <dgm:txLinClrLst/>
+    <dgm:txFillClrLst meth="repeat">
+      <a:schemeClr val="dk1"/>
+    </dgm:txFillClrLst>
+    <dgm:txEffectClrLst/>
+  </dgm:styleLbl>
+  <dgm:styleLbl name="solidAlignAcc1">
+    <dgm:fillClrLst meth="repeat">
+      <a:schemeClr val="lt1"/>
+    </dgm:fillClrLst>
+    <dgm:linClrLst meth="repeat">
+      <a:schemeClr val="accent2"/>
+      <a:schemeClr val="accent3"/>
+      <a:schemeClr val="accent4"/>
+      <a:schemeClr val="accent5"/>
+      <a:schemeClr val="accent6"/>
+    </dgm:linClrLst>
+    <dgm:effectClrLst/>
+    <dgm:txLinClrLst/>
+    <dgm:txFillClrLst meth="repeat">
+      <a:schemeClr val="dk1"/>
+    </dgm:txFillClrLst>
+    <dgm:txEffectClrLst/>
+  </dgm:styleLbl>
+  <dgm:styleLbl name="solidBgAcc1">
+    <dgm:fillClrLst meth="repeat">
+      <a:schemeClr val="lt1"/>
+    </dgm:fillClrLst>
+    <dgm:linClrLst meth="repeat">
+      <a:schemeClr val="accent2"/>
+      <a:schemeClr val="accent3"/>
+      <a:schemeClr val="accent4"/>
+      <a:schemeClr val="accent5"/>
+      <a:schemeClr val="accent6"/>
+    </dgm:linClrLst>
+    <dgm:effectClrLst/>
+    <dgm:txLinClrLst/>
+    <dgm:txFillClrLst meth="repeat">
+      <a:schemeClr val="dk1"/>
+    </dgm:txFillClrLst>
+    <dgm:txEffectClrLst/>
+  </dgm:styleLbl>
+  <dgm:styleLbl name="fgAccFollowNode1">
+    <dgm:fillClrLst meth="repeat">
+      <a:schemeClr val="accent2">
+        <a:tint val="40000"/>
+        <a:alpha val="90000"/>
+      </a:schemeClr>
+      <a:schemeClr val="accent3">
+        <a:tint val="40000"/>
+        <a:alpha val="90000"/>
+      </a:schemeClr>
+      <a:schemeClr val="accent4">
+        <a:tint val="40000"/>
+        <a:alpha val="90000"/>
+      </a:schemeClr>
+      <a:schemeClr val="accent5">
+        <a:tint val="40000"/>
+        <a:alpha val="90000"/>
+      </a:schemeClr>
+      <a:schemeClr val="accent6">
+        <a:tint val="40000"/>
+        <a:alpha val="90000"/>
+      </a:schemeClr>
+    </dgm:fillClrLst>
+    <dgm:linClrLst meth="repeat">
+      <a:schemeClr val="accent2">
+        <a:tint val="40000"/>
+        <a:alpha val="90000"/>
+      </a:schemeClr>
+      <a:schemeClr val="accent3">
+        <a:tint val="40000"/>
+        <a:alpha val="90000"/>
+      </a:schemeClr>
+      <a:schemeClr val="accent4">
+        <a:tint val="40000"/>
+        <a:alpha val="90000"/>
+      </a:schemeClr>
+      <a:schemeClr val="accent5">
+        <a:tint val="40000"/>
+        <a:alpha val="90000"/>
+      </a:schemeClr>
+      <a:schemeClr val="accent6">
+        <a:tint val="40000"/>
+        <a:alpha val="90000"/>
+      </a:schemeClr>
+    </dgm:linClrLst>
+    <dgm:effectClrLst/>
+    <dgm:txLinClrLst/>
+    <dgm:txFillClrLst meth="repeat">
+      <a:schemeClr val="dk1"/>
+    </dgm:txFillClrLst>
+    <dgm:txEffectClrLst/>
+  </dgm:styleLbl>
+  <dgm:styleLbl name="alignAccFollowNode1">
+    <dgm:fillClrLst meth="repeat">
+      <a:schemeClr val="accent2">
+        <a:tint val="40000"/>
+        <a:alpha val="90000"/>
+      </a:schemeClr>
+      <a:schemeClr val="accent3">
+        <a:tint val="40000"/>
+        <a:alpha val="90000"/>
+      </a:schemeClr>
+      <a:schemeClr val="accent4">
+        <a:tint val="40000"/>
+        <a:alpha val="90000"/>
+      </a:schemeClr>
+      <a:schemeClr val="accent5">
+        <a:tint val="40000"/>
+        <a:alpha val="90000"/>
+      </a:schemeClr>
+      <a:schemeClr val="accent6">
+        <a:tint val="40000"/>
+        <a:alpha val="90000"/>
+      </a:schemeClr>
+    </dgm:fillClrLst>
+    <dgm:linClrLst meth="repeat">
+      <a:schemeClr val="accent2">
+        <a:tint val="40000"/>
+        <a:alpha val="90000"/>
+      </a:schemeClr>
+      <a:schemeClr val="accent3">
+        <a:tint val="40000"/>
+        <a:alpha val="90000"/>
+      </a:schemeClr>
+      <a:schemeClr val="accent4">
+        <a:tint val="40000"/>
+        <a:alpha val="90000"/>
+      </a:schemeClr>
+      <a:schemeClr val="accent5">
+        <a:tint val="40000"/>
+        <a:alpha val="90000"/>
+      </a:schemeClr>
+      <a:schemeClr val="accent6">
+        <a:tint val="40000"/>
+        <a:alpha val="90000"/>
+      </a:schemeClr>
+    </dgm:linClrLst>
+    <dgm:effectClrLst/>
+    <dgm:txLinClrLst/>
+    <dgm:txFillClrLst meth="repeat">
+      <a:schemeClr val="dk1"/>
+    </dgm:txFillClrLst>
+    <dgm:txEffectClrLst/>
+  </dgm:styleLbl>
+  <dgm:styleLbl name="bgAccFollowNode1">
+    <dgm:fillClrLst meth="repeat">
+      <a:schemeClr val="accent2">
+        <a:tint val="40000"/>
+        <a:alpha val="90000"/>
+      </a:schemeClr>
+      <a:schemeClr val="accent3">
+        <a:tint val="40000"/>
+        <a:alpha val="90000"/>
+      </a:schemeClr>
+      <a:schemeClr val="accent4">
+        <a:tint val="40000"/>
+        <a:alpha val="90000"/>
+      </a:schemeClr>
+      <a:schemeClr val="accent5">
+        <a:tint val="40000"/>
+        <a:alpha val="90000"/>
+      </a:schemeClr>
+      <a:schemeClr val="accent6">
+        <a:tint val="40000"/>
+        <a:alpha val="90000"/>
+      </a:schemeClr>
+    </dgm:fillClrLst>
+    <dgm:linClrLst meth="repeat">
+      <a:schemeClr val="accent2">
+        <a:tint val="40000"/>
+        <a:alpha val="90000"/>
+      </a:schemeClr>
+      <a:schemeClr val="accent3">
+        <a:tint val="40000"/>
+        <a:alpha val="90000"/>
+      </a:schemeClr>
+      <a:schemeClr val="accent4">
+        <a:tint val="40000"/>
+        <a:alpha val="90000"/>
+      </a:schemeClr>
+      <a:schemeClr val="accent5">
+        <a:tint val="40000"/>
+        <a:alpha val="90000"/>
+      </a:schemeClr>
+      <a:schemeClr val="accent6">
+        <a:tint val="40000"/>
+        <a:alpha val="90000"/>
+      </a:schemeClr>
+    </dgm:linClrLst>
+    <dgm:effectClrLst/>
+    <dgm:txLinClrLst/>
+    <dgm:txFillClrLst meth="repeat">
+      <a:schemeClr val="dk1"/>
+    </dgm:txFillClrLst>
+    <dgm:txEffectClrLst/>
+  </dgm:styleLbl>
+  <dgm:styleLbl name="fgAcc0">
+    <dgm:fillClrLst meth="repeat">
+      <a:schemeClr val="lt1">
+        <a:alpha val="90000"/>
+      </a:schemeClr>
+    </dgm:fillClrLst>
+    <dgm:linClrLst>
+      <a:schemeClr val="accent1"/>
+    </dgm:linClrLst>
+    <dgm:effectClrLst/>
+    <dgm:txLinClrLst/>
+    <dgm:txFillClrLst meth="repeat">
+      <a:schemeClr val="dk1"/>
+    </dgm:txFillClrLst>
+    <dgm:txEffectClrLst/>
+  </dgm:styleLbl>
+  <dgm:styleLbl name="fgAcc2">
+    <dgm:fillClrLst meth="repeat">
+      <a:schemeClr val="lt1">
+        <a:alpha val="90000"/>
+      </a:schemeClr>
+    </dgm:fillClrLst>
+    <dgm:linClrLst>
+      <a:schemeClr val="accent2"/>
+    </dgm:linClrLst>
+    <dgm:effectClrLst/>
+    <dgm:txLinClrLst/>
+    <dgm:txFillClrLst meth="repeat">
+      <a:schemeClr val="dk1"/>
+    </dgm:txFillClrLst>
+    <dgm:txEffectClrLst/>
+  </dgm:styleLbl>
+  <dgm:styleLbl name="fgAcc3">
+    <dgm:fillClrLst meth="repeat">
+      <a:schemeClr val="lt1">
+        <a:alpha val="90000"/>
+      </a:schemeClr>
+    </dgm:fillClrLst>
+    <dgm:linClrLst>
+      <a:schemeClr val="accent3"/>
+    </dgm:linClrLst>
+    <dgm:effectClrLst/>
+    <dgm:txLinClrLst/>
+    <dgm:txFillClrLst meth="repeat">
+      <a:schemeClr val="dk1"/>
+    </dgm:txFillClrLst>
+    <dgm:txEffectClrLst/>
+  </dgm:styleLbl>
+  <dgm:styleLbl name="fgAcc4">
+    <dgm:fillClrLst meth="repeat">
+      <a:schemeClr val="lt1">
+        <a:alpha val="90000"/>
+      </a:schemeClr>
+    </dgm:fillClrLst>
+    <dgm:linClrLst>
+      <a:schemeClr val="accent4"/>
+    </dgm:linClrLst>
+    <dgm:effectClrLst/>
+    <dgm:txLinClrLst/>
+    <dgm:txFillClrLst meth="repeat">
+      <a:schemeClr val="dk1"/>
+    </dgm:txFillClrLst>
+    <dgm:txEffectClrLst/>
+  </dgm:styleLbl>
+  <dgm:styleLbl name="bgShp">
+    <dgm:fillClrLst meth="repeat">
+      <a:schemeClr val="accent2">
+        <a:tint val="40000"/>
+      </a:schemeClr>
+    </dgm:fillClrLst>
+    <dgm:linClrLst meth="repeat">
+      <a:schemeClr val="dk1"/>
+    </dgm:linClrLst>
+    <dgm:effectClrLst/>
+    <dgm:txLinClrLst/>
+    <dgm:txFillClrLst meth="repeat">
+      <a:schemeClr val="dk1"/>
+    </dgm:txFillClrLst>
+    <dgm:txEffectClrLst/>
+  </dgm:styleLbl>
+  <dgm:styleLbl name="dkBgShp">
+    <dgm:fillClrLst meth="repeat">
+      <a:schemeClr val="accent2">
+        <a:shade val="90000"/>
+      </a:schemeClr>
+    </dgm:fillClrLst>
+    <dgm:linClrLst meth="repeat">
+      <a:schemeClr val="dk1"/>
+    </dgm:linClrLst>
+    <dgm:effectClrLst/>
+    <dgm:txLinClrLst/>
+    <dgm:txFillClrLst meth="repeat">
+      <a:schemeClr val="lt1"/>
+    </dgm:txFillClrLst>
+    <dgm:txEffectClrLst/>
+  </dgm:styleLbl>
+  <dgm:styleLbl name="trBgShp">
+    <dgm:fillClrLst meth="repeat">
+      <a:schemeClr val="accent1">
+        <a:tint val="50000"/>
+        <a:alpha val="40000"/>
+      </a:schemeClr>
+    </dgm:fillClrLst>
+    <dgm:linClrLst meth="repeat">
+      <a:schemeClr val="accent2"/>
+    </dgm:linClrLst>
+    <dgm:effectClrLst/>
+    <dgm:txLinClrLst/>
+    <dgm:txFillClrLst meth="repeat">
+      <a:schemeClr val="lt1"/>
+    </dgm:txFillClrLst>
+    <dgm:txEffectClrLst/>
+  </dgm:styleLbl>
+  <dgm:styleLbl name="fgShp">
+    <dgm:fillClrLst meth="repeat">
+      <a:schemeClr val="accent2">
+        <a:tint val="40000"/>
+      </a:schemeClr>
+    </dgm:fillClrLst>
+    <dgm:linClrLst meth="repeat">
+      <a:schemeClr val="lt1"/>
+    </dgm:linClrLst>
+    <dgm:effectClrLst/>
+    <dgm:txLinClrLst/>
+    <dgm:txFillClrLst meth="repeat">
+      <a:schemeClr val="dk1"/>
+    </dgm:txFillClrLst>
+    <dgm:txEffectClrLst/>
+  </dgm:styleLbl>
+  <dgm:styleLbl name="revTx">
+    <dgm:fillClrLst meth="repeat">
+      <a:schemeClr val="lt1">
         <a:alpha val="0"/>
       </a:schemeClr>
     </dgm:fillClrLst>
@@ -1385,6 +2314,242 @@
     <dgm:cxn modelId="{1FE79F56-807C-48BB-8900-5504EDEC247E}" type="presParOf" srcId="{FB5FBD80-0C7D-4678-A02E-E97A0D8CB393}" destId="{52B36218-D09D-4D88-A6EA-EECA06CCD0FF}" srcOrd="1" destOrd="0" presId="urn:microsoft.com/office/officeart/2005/8/layout/list1"/>
     <dgm:cxn modelId="{9682F60F-DA89-4DD0-B9E4-B226CF92241E}" type="presParOf" srcId="{3F336FD0-8D00-47B7-8C11-ABF16C018003}" destId="{BD569835-4388-4D78-BE20-921400668860}" srcOrd="9" destOrd="0" presId="urn:microsoft.com/office/officeart/2005/8/layout/list1"/>
     <dgm:cxn modelId="{0E988745-4E20-4FA1-B9B7-F03380C29A71}" type="presParOf" srcId="{3F336FD0-8D00-47B7-8C11-ABF16C018003}" destId="{20F1337F-AE13-47E1-9E04-FEC3DE2731AA}" srcOrd="10" destOrd="0" presId="urn:microsoft.com/office/officeart/2005/8/layout/list1"/>
+  </dgm:cxnLst>
+  <dgm:bg/>
+  <dgm:whole/>
+  <dgm:extLst>
+    <a:ext uri="http://schemas.microsoft.com/office/drawing/2008/diagram">
+      <dsp:dataModelExt xmlns:dsp="http://schemas.microsoft.com/office/drawing/2008/diagram" relId="rId7" minVer="http://schemas.openxmlformats.org/drawingml/2006/diagram"/>
+    </a:ext>
+  </dgm:extLst>
+</dgm:dataModel>
+</file>
+
+<file path=ppt/diagrams/data2.xml><?xml version="1.0" encoding="utf-8"?>
+<dgm:dataModel xmlns:dgm="http://schemas.openxmlformats.org/drawingml/2006/diagram" xmlns:a="http://schemas.openxmlformats.org/drawingml/2006/main">
+  <dgm:ptLst>
+    <dgm:pt modelId="{9094546F-409A-45E1-82A0-D709760BC682}" type="doc">
+      <dgm:prSet loTypeId="urn:microsoft.com/office/officeart/2005/8/layout/vProcess5" loCatId="process" qsTypeId="urn:microsoft.com/office/officeart/2005/8/quickstyle/simple5" qsCatId="simple" csTypeId="urn:microsoft.com/office/officeart/2005/8/colors/colorful1" csCatId="colorful" phldr="1"/>
+      <dgm:spPr/>
+      <dgm:t>
+        <a:bodyPr/>
+        <a:lstStyle/>
+        <a:p>
+          <a:endParaRPr lang="en-US"/>
+        </a:p>
+      </dgm:t>
+    </dgm:pt>
+    <dgm:pt modelId="{C87B3550-ECD1-486B-B85B-3532A01942CE}">
+      <dgm:prSet/>
+      <dgm:spPr/>
+      <dgm:t>
+        <a:bodyPr/>
+        <a:lstStyle/>
+        <a:p>
+          <a:r>
+            <a:rPr lang="en-US" dirty="0"/>
+            <a:t>Utilized Case ID to create a Date column. Any that could not be reasonably determined was dropped along with post 1975: The Year of Jaws. </a:t>
+          </a:r>
+        </a:p>
+      </dgm:t>
+    </dgm:pt>
+    <dgm:pt modelId="{C5144655-F4D4-41A3-B53B-2B1D128A1AAF}" type="parTrans" cxnId="{4CFD0963-20C5-403A-AEF6-A9EFC937DE1B}">
+      <dgm:prSet/>
+      <dgm:spPr/>
+      <dgm:t>
+        <a:bodyPr/>
+        <a:lstStyle/>
+        <a:p>
+          <a:endParaRPr lang="en-US"/>
+        </a:p>
+      </dgm:t>
+    </dgm:pt>
+    <dgm:pt modelId="{49E5D743-393C-49D7-B959-3D0E3B3B7416}" type="sibTrans" cxnId="{4CFD0963-20C5-403A-AEF6-A9EFC937DE1B}">
+      <dgm:prSet/>
+      <dgm:spPr/>
+      <dgm:t>
+        <a:bodyPr/>
+        <a:lstStyle/>
+        <a:p>
+          <a:endParaRPr lang="en-US"/>
+        </a:p>
+      </dgm:t>
+    </dgm:pt>
+    <dgm:pt modelId="{30A29A0C-C3FB-4C8A-AAE7-5C433C130518}">
+      <dgm:prSet/>
+      <dgm:spPr/>
+      <dgm:t>
+        <a:bodyPr/>
+        <a:lstStyle/>
+        <a:p>
+          <a:r>
+            <a:rPr lang="en-US" dirty="0"/>
+            <a:t>Rough start of grouping similar activities together. Checked other columns for potential cleanup need.</a:t>
+          </a:r>
+        </a:p>
+      </dgm:t>
+    </dgm:pt>
+    <dgm:pt modelId="{B2D64F63-EAA8-417E-B4D5-E7AE98B2FA6F}" type="parTrans" cxnId="{EE03936A-92A9-4EB4-A43C-9E868C8FDB7D}">
+      <dgm:prSet/>
+      <dgm:spPr/>
+      <dgm:t>
+        <a:bodyPr/>
+        <a:lstStyle/>
+        <a:p>
+          <a:endParaRPr lang="en-US"/>
+        </a:p>
+      </dgm:t>
+    </dgm:pt>
+    <dgm:pt modelId="{25A8B204-AEC2-4446-BE5C-48592551F380}" type="sibTrans" cxnId="{EE03936A-92A9-4EB4-A43C-9E868C8FDB7D}">
+      <dgm:prSet/>
+      <dgm:spPr/>
+      <dgm:t>
+        <a:bodyPr/>
+        <a:lstStyle/>
+        <a:p>
+          <a:endParaRPr lang="en-US"/>
+        </a:p>
+      </dgm:t>
+    </dgm:pt>
+    <dgm:pt modelId="{25290F73-A376-4C43-8F41-1113A124EB80}">
+      <dgm:prSet/>
+      <dgm:spPr/>
+      <dgm:t>
+        <a:bodyPr/>
+        <a:lstStyle/>
+        <a:p>
+          <a:r>
+            <a:rPr lang="en-US" dirty="0"/>
+            <a:t>Export to CSV to use for analysis.</a:t>
+          </a:r>
+        </a:p>
+      </dgm:t>
+    </dgm:pt>
+    <dgm:pt modelId="{1822D237-8EF9-45AB-8B77-59E8EC0C7ADF}" type="parTrans" cxnId="{178AD368-A0C9-49E0-B9EC-8F24DE786A51}">
+      <dgm:prSet/>
+      <dgm:spPr/>
+      <dgm:t>
+        <a:bodyPr/>
+        <a:lstStyle/>
+        <a:p>
+          <a:endParaRPr lang="en-US"/>
+        </a:p>
+      </dgm:t>
+    </dgm:pt>
+    <dgm:pt modelId="{004E2750-3F75-4E01-A58D-60C1BC61326F}" type="sibTrans" cxnId="{178AD368-A0C9-49E0-B9EC-8F24DE786A51}">
+      <dgm:prSet/>
+      <dgm:spPr/>
+      <dgm:t>
+        <a:bodyPr/>
+        <a:lstStyle/>
+        <a:p>
+          <a:endParaRPr lang="en-US"/>
+        </a:p>
+      </dgm:t>
+    </dgm:pt>
+    <dgm:pt modelId="{53BCD287-0F08-4D45-BA9A-78AFA1F3BDD6}" type="pres">
+      <dgm:prSet presAssocID="{9094546F-409A-45E1-82A0-D709760BC682}" presName="outerComposite" presStyleCnt="0">
+        <dgm:presLayoutVars>
+          <dgm:chMax val="5"/>
+          <dgm:dir/>
+          <dgm:resizeHandles val="exact"/>
+        </dgm:presLayoutVars>
+      </dgm:prSet>
+      <dgm:spPr/>
+    </dgm:pt>
+    <dgm:pt modelId="{35048A11-AC38-458B-BDF7-0D2F4272BAF9}" type="pres">
+      <dgm:prSet presAssocID="{9094546F-409A-45E1-82A0-D709760BC682}" presName="dummyMaxCanvas" presStyleCnt="0">
+        <dgm:presLayoutVars/>
+      </dgm:prSet>
+      <dgm:spPr/>
+    </dgm:pt>
+    <dgm:pt modelId="{254DDF09-E4B5-4476-BD2B-42398E7DF6E3}" type="pres">
+      <dgm:prSet presAssocID="{9094546F-409A-45E1-82A0-D709760BC682}" presName="ThreeNodes_1" presStyleLbl="node1" presStyleIdx="0" presStyleCnt="3">
+        <dgm:presLayoutVars>
+          <dgm:bulletEnabled val="1"/>
+        </dgm:presLayoutVars>
+      </dgm:prSet>
+      <dgm:spPr/>
+    </dgm:pt>
+    <dgm:pt modelId="{63838E60-4960-4C73-A35E-89583592F4B0}" type="pres">
+      <dgm:prSet presAssocID="{9094546F-409A-45E1-82A0-D709760BC682}" presName="ThreeNodes_2" presStyleLbl="node1" presStyleIdx="1" presStyleCnt="3">
+        <dgm:presLayoutVars>
+          <dgm:bulletEnabled val="1"/>
+        </dgm:presLayoutVars>
+      </dgm:prSet>
+      <dgm:spPr/>
+    </dgm:pt>
+    <dgm:pt modelId="{93CB0EDF-48F3-428B-8425-535032956FB5}" type="pres">
+      <dgm:prSet presAssocID="{9094546F-409A-45E1-82A0-D709760BC682}" presName="ThreeNodes_3" presStyleLbl="node1" presStyleIdx="2" presStyleCnt="3">
+        <dgm:presLayoutVars>
+          <dgm:bulletEnabled val="1"/>
+        </dgm:presLayoutVars>
+      </dgm:prSet>
+      <dgm:spPr/>
+    </dgm:pt>
+    <dgm:pt modelId="{798F93E7-E1CC-476A-A3DE-73B4A7262A4C}" type="pres">
+      <dgm:prSet presAssocID="{9094546F-409A-45E1-82A0-D709760BC682}" presName="ThreeConn_1-2" presStyleLbl="fgAccFollowNode1" presStyleIdx="0" presStyleCnt="2">
+        <dgm:presLayoutVars>
+          <dgm:bulletEnabled val="1"/>
+        </dgm:presLayoutVars>
+      </dgm:prSet>
+      <dgm:spPr/>
+    </dgm:pt>
+    <dgm:pt modelId="{583A142C-104F-4A75-A6BE-18C8F79F18D6}" type="pres">
+      <dgm:prSet presAssocID="{9094546F-409A-45E1-82A0-D709760BC682}" presName="ThreeConn_2-3" presStyleLbl="fgAccFollowNode1" presStyleIdx="1" presStyleCnt="2">
+        <dgm:presLayoutVars>
+          <dgm:bulletEnabled val="1"/>
+        </dgm:presLayoutVars>
+      </dgm:prSet>
+      <dgm:spPr/>
+    </dgm:pt>
+    <dgm:pt modelId="{37E632BD-5CBC-4140-9746-BAE2213B2481}" type="pres">
+      <dgm:prSet presAssocID="{9094546F-409A-45E1-82A0-D709760BC682}" presName="ThreeNodes_1_text" presStyleLbl="node1" presStyleIdx="2" presStyleCnt="3">
+        <dgm:presLayoutVars>
+          <dgm:bulletEnabled val="1"/>
+        </dgm:presLayoutVars>
+      </dgm:prSet>
+      <dgm:spPr/>
+    </dgm:pt>
+    <dgm:pt modelId="{AB69C5A0-0650-45A2-BE25-61F72360D3FB}" type="pres">
+      <dgm:prSet presAssocID="{9094546F-409A-45E1-82A0-D709760BC682}" presName="ThreeNodes_2_text" presStyleLbl="node1" presStyleIdx="2" presStyleCnt="3">
+        <dgm:presLayoutVars>
+          <dgm:bulletEnabled val="1"/>
+        </dgm:presLayoutVars>
+      </dgm:prSet>
+      <dgm:spPr/>
+    </dgm:pt>
+    <dgm:pt modelId="{8DE60695-3058-45F4-BA9E-3523F5D29FB5}" type="pres">
+      <dgm:prSet presAssocID="{9094546F-409A-45E1-82A0-D709760BC682}" presName="ThreeNodes_3_text" presStyleLbl="node1" presStyleIdx="2" presStyleCnt="3">
+        <dgm:presLayoutVars>
+          <dgm:bulletEnabled val="1"/>
+        </dgm:presLayoutVars>
+      </dgm:prSet>
+      <dgm:spPr/>
+    </dgm:pt>
+  </dgm:ptLst>
+  <dgm:cxnLst>
+    <dgm:cxn modelId="{CF77EE1A-7BDB-4B4E-A6DA-E72FC2F5D5FE}" type="presOf" srcId="{C87B3550-ECD1-486B-B85B-3532A01942CE}" destId="{254DDF09-E4B5-4476-BD2B-42398E7DF6E3}" srcOrd="0" destOrd="0" presId="urn:microsoft.com/office/officeart/2005/8/layout/vProcess5"/>
+    <dgm:cxn modelId="{051FC734-C0DF-4078-97D9-5BBDA93C8F8D}" type="presOf" srcId="{49E5D743-393C-49D7-B959-3D0E3B3B7416}" destId="{798F93E7-E1CC-476A-A3DE-73B4A7262A4C}" srcOrd="0" destOrd="0" presId="urn:microsoft.com/office/officeart/2005/8/layout/vProcess5"/>
+    <dgm:cxn modelId="{4CFD0963-20C5-403A-AEF6-A9EFC937DE1B}" srcId="{9094546F-409A-45E1-82A0-D709760BC682}" destId="{C87B3550-ECD1-486B-B85B-3532A01942CE}" srcOrd="0" destOrd="0" parTransId="{C5144655-F4D4-41A3-B53B-2B1D128A1AAF}" sibTransId="{49E5D743-393C-49D7-B959-3D0E3B3B7416}"/>
+    <dgm:cxn modelId="{9280E747-52CE-4A48-B2B2-8A40EBB8AFDC}" type="presOf" srcId="{9094546F-409A-45E1-82A0-D709760BC682}" destId="{53BCD287-0F08-4D45-BA9A-78AFA1F3BDD6}" srcOrd="0" destOrd="0" presId="urn:microsoft.com/office/officeart/2005/8/layout/vProcess5"/>
+    <dgm:cxn modelId="{178AD368-A0C9-49E0-B9EC-8F24DE786A51}" srcId="{9094546F-409A-45E1-82A0-D709760BC682}" destId="{25290F73-A376-4C43-8F41-1113A124EB80}" srcOrd="2" destOrd="0" parTransId="{1822D237-8EF9-45AB-8B77-59E8EC0C7ADF}" sibTransId="{004E2750-3F75-4E01-A58D-60C1BC61326F}"/>
+    <dgm:cxn modelId="{EE03936A-92A9-4EB4-A43C-9E868C8FDB7D}" srcId="{9094546F-409A-45E1-82A0-D709760BC682}" destId="{30A29A0C-C3FB-4C8A-AAE7-5C433C130518}" srcOrd="1" destOrd="0" parTransId="{B2D64F63-EAA8-417E-B4D5-E7AE98B2FA6F}" sibTransId="{25A8B204-AEC2-4446-BE5C-48592551F380}"/>
+    <dgm:cxn modelId="{E174B550-80E1-4DD7-88B1-12415627A38F}" type="presOf" srcId="{C87B3550-ECD1-486B-B85B-3532A01942CE}" destId="{37E632BD-5CBC-4140-9746-BAE2213B2481}" srcOrd="1" destOrd="0" presId="urn:microsoft.com/office/officeart/2005/8/layout/vProcess5"/>
+    <dgm:cxn modelId="{71E1AC81-ECF5-4B20-B7CB-23E93C633B68}" type="presOf" srcId="{25290F73-A376-4C43-8F41-1113A124EB80}" destId="{93CB0EDF-48F3-428B-8425-535032956FB5}" srcOrd="0" destOrd="0" presId="urn:microsoft.com/office/officeart/2005/8/layout/vProcess5"/>
+    <dgm:cxn modelId="{7358B2C9-2003-42A6-9300-4CB2324737A0}" type="presOf" srcId="{30A29A0C-C3FB-4C8A-AAE7-5C433C130518}" destId="{AB69C5A0-0650-45A2-BE25-61F72360D3FB}" srcOrd="1" destOrd="0" presId="urn:microsoft.com/office/officeart/2005/8/layout/vProcess5"/>
+    <dgm:cxn modelId="{CA1938D4-5380-47D2-9B79-21E422333680}" type="presOf" srcId="{25290F73-A376-4C43-8F41-1113A124EB80}" destId="{8DE60695-3058-45F4-BA9E-3523F5D29FB5}" srcOrd="1" destOrd="0" presId="urn:microsoft.com/office/officeart/2005/8/layout/vProcess5"/>
+    <dgm:cxn modelId="{2D2324DC-6CD9-4E06-89AD-9187F41EFB50}" type="presOf" srcId="{25A8B204-AEC2-4446-BE5C-48592551F380}" destId="{583A142C-104F-4A75-A6BE-18C8F79F18D6}" srcOrd="0" destOrd="0" presId="urn:microsoft.com/office/officeart/2005/8/layout/vProcess5"/>
+    <dgm:cxn modelId="{D79995DE-F335-4E1D-83B5-A655DA627977}" type="presOf" srcId="{30A29A0C-C3FB-4C8A-AAE7-5C433C130518}" destId="{63838E60-4960-4C73-A35E-89583592F4B0}" srcOrd="0" destOrd="0" presId="urn:microsoft.com/office/officeart/2005/8/layout/vProcess5"/>
+    <dgm:cxn modelId="{8B453FF0-C0D3-421A-A7F7-DA65EE361571}" type="presParOf" srcId="{53BCD287-0F08-4D45-BA9A-78AFA1F3BDD6}" destId="{35048A11-AC38-458B-BDF7-0D2F4272BAF9}" srcOrd="0" destOrd="0" presId="urn:microsoft.com/office/officeart/2005/8/layout/vProcess5"/>
+    <dgm:cxn modelId="{22C12DAD-CF49-4F7A-A4CA-19EBB0922497}" type="presParOf" srcId="{53BCD287-0F08-4D45-BA9A-78AFA1F3BDD6}" destId="{254DDF09-E4B5-4476-BD2B-42398E7DF6E3}" srcOrd="1" destOrd="0" presId="urn:microsoft.com/office/officeart/2005/8/layout/vProcess5"/>
+    <dgm:cxn modelId="{0F4A7A2F-9876-4C24-BCAA-A29757132BAF}" type="presParOf" srcId="{53BCD287-0F08-4D45-BA9A-78AFA1F3BDD6}" destId="{63838E60-4960-4C73-A35E-89583592F4B0}" srcOrd="2" destOrd="0" presId="urn:microsoft.com/office/officeart/2005/8/layout/vProcess5"/>
+    <dgm:cxn modelId="{AA3F7753-4C4E-489D-8641-7B8A9708445D}" type="presParOf" srcId="{53BCD287-0F08-4D45-BA9A-78AFA1F3BDD6}" destId="{93CB0EDF-48F3-428B-8425-535032956FB5}" srcOrd="3" destOrd="0" presId="urn:microsoft.com/office/officeart/2005/8/layout/vProcess5"/>
+    <dgm:cxn modelId="{ECC8F4E2-8C19-4EFF-95BC-6C959D75CADC}" type="presParOf" srcId="{53BCD287-0F08-4D45-BA9A-78AFA1F3BDD6}" destId="{798F93E7-E1CC-476A-A3DE-73B4A7262A4C}" srcOrd="4" destOrd="0" presId="urn:microsoft.com/office/officeart/2005/8/layout/vProcess5"/>
+    <dgm:cxn modelId="{70806A73-3F73-408F-A5FD-E241CC968F6D}" type="presParOf" srcId="{53BCD287-0F08-4D45-BA9A-78AFA1F3BDD6}" destId="{583A142C-104F-4A75-A6BE-18C8F79F18D6}" srcOrd="5" destOrd="0" presId="urn:microsoft.com/office/officeart/2005/8/layout/vProcess5"/>
+    <dgm:cxn modelId="{6864BE3B-2EDF-4821-BF9B-7213396CFB3F}" type="presParOf" srcId="{53BCD287-0F08-4D45-BA9A-78AFA1F3BDD6}" destId="{37E632BD-5CBC-4140-9746-BAE2213B2481}" srcOrd="6" destOrd="0" presId="urn:microsoft.com/office/officeart/2005/8/layout/vProcess5"/>
+    <dgm:cxn modelId="{C993FEC5-748F-4FFA-89EC-7B9627DCD52C}" type="presParOf" srcId="{53BCD287-0F08-4D45-BA9A-78AFA1F3BDD6}" destId="{AB69C5A0-0650-45A2-BE25-61F72360D3FB}" srcOrd="7" destOrd="0" presId="urn:microsoft.com/office/officeart/2005/8/layout/vProcess5"/>
+    <dgm:cxn modelId="{FA09F22A-5613-4FA9-B0A8-A09B507AC65D}" type="presParOf" srcId="{53BCD287-0F08-4D45-BA9A-78AFA1F3BDD6}" destId="{8DE60695-3058-45F4-BA9E-3523F5D29FB5}" srcOrd="8" destOrd="0" presId="urn:microsoft.com/office/officeart/2005/8/layout/vProcess5"/>
   </dgm:cxnLst>
   <dgm:bg/>
   <dgm:whole/>
@@ -2008,6 +3173,499 @@
 </dsp:drawing>
 </file>
 
+<file path=ppt/diagrams/drawing2.xml><?xml version="1.0" encoding="utf-8"?>
+<dsp:drawing xmlns:dgm="http://schemas.openxmlformats.org/drawingml/2006/diagram" xmlns:dsp="http://schemas.microsoft.com/office/drawing/2008/diagram" xmlns:a="http://schemas.openxmlformats.org/drawingml/2006/main">
+  <dsp:spTree>
+    <dsp:nvGrpSpPr>
+      <dsp:cNvPr id="0" name=""/>
+      <dsp:cNvGrpSpPr/>
+    </dsp:nvGrpSpPr>
+    <dsp:grpSpPr/>
+    <dsp:sp modelId="{254DDF09-E4B5-4476-BD2B-42398E7DF6E3}">
+      <dsp:nvSpPr>
+        <dsp:cNvPr id="0" name=""/>
+        <dsp:cNvSpPr/>
+      </dsp:nvSpPr>
+      <dsp:spPr>
+        <a:xfrm>
+          <a:off x="0" y="0"/>
+          <a:ext cx="8698071" cy="1305401"/>
+        </a:xfrm>
+        <a:prstGeom prst="roundRect">
+          <a:avLst>
+            <a:gd name="adj" fmla="val 10000"/>
+          </a:avLst>
+        </a:prstGeom>
+        <a:gradFill rotWithShape="0">
+          <a:gsLst>
+            <a:gs pos="0">
+              <a:schemeClr val="accent2">
+                <a:hueOff val="0"/>
+                <a:satOff val="0"/>
+                <a:lumOff val="0"/>
+                <a:alphaOff val="0"/>
+                <a:satMod val="103000"/>
+                <a:lumMod val="102000"/>
+                <a:tint val="94000"/>
+              </a:schemeClr>
+            </a:gs>
+            <a:gs pos="50000">
+              <a:schemeClr val="accent2">
+                <a:hueOff val="0"/>
+                <a:satOff val="0"/>
+                <a:lumOff val="0"/>
+                <a:alphaOff val="0"/>
+                <a:satMod val="110000"/>
+                <a:lumMod val="100000"/>
+                <a:shade val="100000"/>
+              </a:schemeClr>
+            </a:gs>
+            <a:gs pos="100000">
+              <a:schemeClr val="accent2">
+                <a:hueOff val="0"/>
+                <a:satOff val="0"/>
+                <a:lumOff val="0"/>
+                <a:alphaOff val="0"/>
+                <a:lumMod val="99000"/>
+                <a:satMod val="120000"/>
+                <a:shade val="78000"/>
+              </a:schemeClr>
+            </a:gs>
+          </a:gsLst>
+          <a:lin ang="5400000" scaled="0"/>
+        </a:gradFill>
+        <a:ln>
+          <a:noFill/>
+        </a:ln>
+        <a:effectLst>
+          <a:outerShdw blurRad="57150" dist="19050" dir="5400000" algn="ctr" rotWithShape="0">
+            <a:srgbClr val="000000">
+              <a:alpha val="63000"/>
+            </a:srgbClr>
+          </a:outerShdw>
+        </a:effectLst>
+      </dsp:spPr>
+      <dsp:style>
+        <a:lnRef idx="0">
+          <a:scrgbClr r="0" g="0" b="0"/>
+        </a:lnRef>
+        <a:fillRef idx="3">
+          <a:scrgbClr r="0" g="0" b="0"/>
+        </a:fillRef>
+        <a:effectRef idx="3">
+          <a:scrgbClr r="0" g="0" b="0"/>
+        </a:effectRef>
+        <a:fontRef idx="minor">
+          <a:schemeClr val="lt1"/>
+        </a:fontRef>
+      </dsp:style>
+      <dsp:txBody>
+        <a:bodyPr spcFirstLastPara="0" vert="horz" wrap="square" lIns="91440" tIns="91440" rIns="91440" bIns="91440" numCol="1" spcCol="1270" anchor="ctr" anchorCtr="0">
+          <a:noAutofit/>
+        </a:bodyPr>
+        <a:lstStyle/>
+        <a:p>
+          <a:pPr marL="0" lvl="0" indent="0" algn="l" defTabSz="1066800">
+            <a:lnSpc>
+              <a:spcPct val="90000"/>
+            </a:lnSpc>
+            <a:spcBef>
+              <a:spcPct val="0"/>
+            </a:spcBef>
+            <a:spcAft>
+              <a:spcPct val="35000"/>
+            </a:spcAft>
+            <a:buNone/>
+          </a:pPr>
+          <a:r>
+            <a:rPr lang="en-US" sz="2400" kern="1200" dirty="0"/>
+            <a:t>Utilized Case ID to create a Date column. Any that could not be reasonably determined was dropped along with post 1975: The Year of Jaws. </a:t>
+          </a:r>
+        </a:p>
+      </dsp:txBody>
+      <dsp:txXfrm>
+        <a:off x="38234" y="38234"/>
+        <a:ext cx="7289441" cy="1228933"/>
+      </dsp:txXfrm>
+    </dsp:sp>
+    <dsp:sp modelId="{63838E60-4960-4C73-A35E-89583592F4B0}">
+      <dsp:nvSpPr>
+        <dsp:cNvPr id="0" name=""/>
+        <dsp:cNvSpPr/>
+      </dsp:nvSpPr>
+      <dsp:spPr>
+        <a:xfrm>
+          <a:off x="767476" y="1522968"/>
+          <a:ext cx="8698071" cy="1305401"/>
+        </a:xfrm>
+        <a:prstGeom prst="roundRect">
+          <a:avLst>
+            <a:gd name="adj" fmla="val 10000"/>
+          </a:avLst>
+        </a:prstGeom>
+        <a:gradFill rotWithShape="0">
+          <a:gsLst>
+            <a:gs pos="0">
+              <a:schemeClr val="accent3">
+                <a:hueOff val="0"/>
+                <a:satOff val="0"/>
+                <a:lumOff val="0"/>
+                <a:alphaOff val="0"/>
+                <a:satMod val="103000"/>
+                <a:lumMod val="102000"/>
+                <a:tint val="94000"/>
+              </a:schemeClr>
+            </a:gs>
+            <a:gs pos="50000">
+              <a:schemeClr val="accent3">
+                <a:hueOff val="0"/>
+                <a:satOff val="0"/>
+                <a:lumOff val="0"/>
+                <a:alphaOff val="0"/>
+                <a:satMod val="110000"/>
+                <a:lumMod val="100000"/>
+                <a:shade val="100000"/>
+              </a:schemeClr>
+            </a:gs>
+            <a:gs pos="100000">
+              <a:schemeClr val="accent3">
+                <a:hueOff val="0"/>
+                <a:satOff val="0"/>
+                <a:lumOff val="0"/>
+                <a:alphaOff val="0"/>
+                <a:lumMod val="99000"/>
+                <a:satMod val="120000"/>
+                <a:shade val="78000"/>
+              </a:schemeClr>
+            </a:gs>
+          </a:gsLst>
+          <a:lin ang="5400000" scaled="0"/>
+        </a:gradFill>
+        <a:ln>
+          <a:noFill/>
+        </a:ln>
+        <a:effectLst>
+          <a:outerShdw blurRad="57150" dist="19050" dir="5400000" algn="ctr" rotWithShape="0">
+            <a:srgbClr val="000000">
+              <a:alpha val="63000"/>
+            </a:srgbClr>
+          </a:outerShdw>
+        </a:effectLst>
+      </dsp:spPr>
+      <dsp:style>
+        <a:lnRef idx="0">
+          <a:scrgbClr r="0" g="0" b="0"/>
+        </a:lnRef>
+        <a:fillRef idx="3">
+          <a:scrgbClr r="0" g="0" b="0"/>
+        </a:fillRef>
+        <a:effectRef idx="3">
+          <a:scrgbClr r="0" g="0" b="0"/>
+        </a:effectRef>
+        <a:fontRef idx="minor">
+          <a:schemeClr val="lt1"/>
+        </a:fontRef>
+      </dsp:style>
+      <dsp:txBody>
+        <a:bodyPr spcFirstLastPara="0" vert="horz" wrap="square" lIns="91440" tIns="91440" rIns="91440" bIns="91440" numCol="1" spcCol="1270" anchor="ctr" anchorCtr="0">
+          <a:noAutofit/>
+        </a:bodyPr>
+        <a:lstStyle/>
+        <a:p>
+          <a:pPr marL="0" lvl="0" indent="0" algn="l" defTabSz="1066800">
+            <a:lnSpc>
+              <a:spcPct val="90000"/>
+            </a:lnSpc>
+            <a:spcBef>
+              <a:spcPct val="0"/>
+            </a:spcBef>
+            <a:spcAft>
+              <a:spcPct val="35000"/>
+            </a:spcAft>
+            <a:buNone/>
+          </a:pPr>
+          <a:r>
+            <a:rPr lang="en-US" sz="2400" kern="1200" dirty="0"/>
+            <a:t>Rough start of grouping similar activities together. Checked other columns for potential cleanup need.</a:t>
+          </a:r>
+        </a:p>
+      </dsp:txBody>
+      <dsp:txXfrm>
+        <a:off x="805710" y="1561202"/>
+        <a:ext cx="7005615" cy="1228933"/>
+      </dsp:txXfrm>
+    </dsp:sp>
+    <dsp:sp modelId="{93CB0EDF-48F3-428B-8425-535032956FB5}">
+      <dsp:nvSpPr>
+        <dsp:cNvPr id="0" name=""/>
+        <dsp:cNvSpPr/>
+      </dsp:nvSpPr>
+      <dsp:spPr>
+        <a:xfrm>
+          <a:off x="1534953" y="3045936"/>
+          <a:ext cx="8698071" cy="1305401"/>
+        </a:xfrm>
+        <a:prstGeom prst="roundRect">
+          <a:avLst>
+            <a:gd name="adj" fmla="val 10000"/>
+          </a:avLst>
+        </a:prstGeom>
+        <a:gradFill rotWithShape="0">
+          <a:gsLst>
+            <a:gs pos="0">
+              <a:schemeClr val="accent4">
+                <a:hueOff val="0"/>
+                <a:satOff val="0"/>
+                <a:lumOff val="0"/>
+                <a:alphaOff val="0"/>
+                <a:satMod val="103000"/>
+                <a:lumMod val="102000"/>
+                <a:tint val="94000"/>
+              </a:schemeClr>
+            </a:gs>
+            <a:gs pos="50000">
+              <a:schemeClr val="accent4">
+                <a:hueOff val="0"/>
+                <a:satOff val="0"/>
+                <a:lumOff val="0"/>
+                <a:alphaOff val="0"/>
+                <a:satMod val="110000"/>
+                <a:lumMod val="100000"/>
+                <a:shade val="100000"/>
+              </a:schemeClr>
+            </a:gs>
+            <a:gs pos="100000">
+              <a:schemeClr val="accent4">
+                <a:hueOff val="0"/>
+                <a:satOff val="0"/>
+                <a:lumOff val="0"/>
+                <a:alphaOff val="0"/>
+                <a:lumMod val="99000"/>
+                <a:satMod val="120000"/>
+                <a:shade val="78000"/>
+              </a:schemeClr>
+            </a:gs>
+          </a:gsLst>
+          <a:lin ang="5400000" scaled="0"/>
+        </a:gradFill>
+        <a:ln>
+          <a:noFill/>
+        </a:ln>
+        <a:effectLst>
+          <a:outerShdw blurRad="57150" dist="19050" dir="5400000" algn="ctr" rotWithShape="0">
+            <a:srgbClr val="000000">
+              <a:alpha val="63000"/>
+            </a:srgbClr>
+          </a:outerShdw>
+        </a:effectLst>
+      </dsp:spPr>
+      <dsp:style>
+        <a:lnRef idx="0">
+          <a:scrgbClr r="0" g="0" b="0"/>
+        </a:lnRef>
+        <a:fillRef idx="3">
+          <a:scrgbClr r="0" g="0" b="0"/>
+        </a:fillRef>
+        <a:effectRef idx="3">
+          <a:scrgbClr r="0" g="0" b="0"/>
+        </a:effectRef>
+        <a:fontRef idx="minor">
+          <a:schemeClr val="lt1"/>
+        </a:fontRef>
+      </dsp:style>
+      <dsp:txBody>
+        <a:bodyPr spcFirstLastPara="0" vert="horz" wrap="square" lIns="91440" tIns="91440" rIns="91440" bIns="91440" numCol="1" spcCol="1270" anchor="ctr" anchorCtr="0">
+          <a:noAutofit/>
+        </a:bodyPr>
+        <a:lstStyle/>
+        <a:p>
+          <a:pPr marL="0" lvl="0" indent="0" algn="l" defTabSz="1066800">
+            <a:lnSpc>
+              <a:spcPct val="90000"/>
+            </a:lnSpc>
+            <a:spcBef>
+              <a:spcPct val="0"/>
+            </a:spcBef>
+            <a:spcAft>
+              <a:spcPct val="35000"/>
+            </a:spcAft>
+            <a:buNone/>
+          </a:pPr>
+          <a:r>
+            <a:rPr lang="en-US" sz="2400" kern="1200" dirty="0"/>
+            <a:t>Export to CSV to use for analysis.</a:t>
+          </a:r>
+        </a:p>
+      </dsp:txBody>
+      <dsp:txXfrm>
+        <a:off x="1573187" y="3084170"/>
+        <a:ext cx="7005615" cy="1228933"/>
+      </dsp:txXfrm>
+    </dsp:sp>
+    <dsp:sp modelId="{798F93E7-E1CC-476A-A3DE-73B4A7262A4C}">
+      <dsp:nvSpPr>
+        <dsp:cNvPr id="0" name=""/>
+        <dsp:cNvSpPr/>
+      </dsp:nvSpPr>
+      <dsp:spPr>
+        <a:xfrm>
+          <a:off x="7849560" y="989929"/>
+          <a:ext cx="848510" cy="848510"/>
+        </a:xfrm>
+        <a:prstGeom prst="downArrow">
+          <a:avLst>
+            <a:gd name="adj1" fmla="val 55000"/>
+            <a:gd name="adj2" fmla="val 45000"/>
+          </a:avLst>
+        </a:prstGeom>
+        <a:solidFill>
+          <a:schemeClr val="accent2">
+            <a:tint val="40000"/>
+            <a:alpha val="90000"/>
+            <a:hueOff val="0"/>
+            <a:satOff val="0"/>
+            <a:lumOff val="0"/>
+            <a:alphaOff val="0"/>
+          </a:schemeClr>
+        </a:solidFill>
+        <a:ln w="6350" cap="flat" cmpd="sng" algn="ctr">
+          <a:solidFill>
+            <a:schemeClr val="accent2">
+              <a:tint val="40000"/>
+              <a:alpha val="90000"/>
+              <a:hueOff val="0"/>
+              <a:satOff val="0"/>
+              <a:lumOff val="0"/>
+              <a:alphaOff val="0"/>
+            </a:schemeClr>
+          </a:solidFill>
+          <a:prstDash val="solid"/>
+          <a:miter lim="800000"/>
+        </a:ln>
+        <a:effectLst/>
+      </dsp:spPr>
+      <dsp:style>
+        <a:lnRef idx="1">
+          <a:scrgbClr r="0" g="0" b="0"/>
+        </a:lnRef>
+        <a:fillRef idx="1">
+          <a:scrgbClr r="0" g="0" b="0"/>
+        </a:fillRef>
+        <a:effectRef idx="2">
+          <a:scrgbClr r="0" g="0" b="0"/>
+        </a:effectRef>
+        <a:fontRef idx="minor"/>
+      </dsp:style>
+      <dsp:txBody>
+        <a:bodyPr spcFirstLastPara="0" vert="horz" wrap="square" lIns="45720" tIns="45720" rIns="45720" bIns="45720" numCol="1" spcCol="1270" anchor="ctr" anchorCtr="0">
+          <a:noAutofit/>
+        </a:bodyPr>
+        <a:lstStyle/>
+        <a:p>
+          <a:pPr marL="0" lvl="0" indent="0" algn="ctr" defTabSz="1600200">
+            <a:lnSpc>
+              <a:spcPct val="90000"/>
+            </a:lnSpc>
+            <a:spcBef>
+              <a:spcPct val="0"/>
+            </a:spcBef>
+            <a:spcAft>
+              <a:spcPct val="35000"/>
+            </a:spcAft>
+            <a:buNone/>
+          </a:pPr>
+          <a:endParaRPr lang="en-US" sz="3600" kern="1200"/>
+        </a:p>
+      </dsp:txBody>
+      <dsp:txXfrm>
+        <a:off x="8040475" y="989929"/>
+        <a:ext cx="466680" cy="638504"/>
+      </dsp:txXfrm>
+    </dsp:sp>
+    <dsp:sp modelId="{583A142C-104F-4A75-A6BE-18C8F79F18D6}">
+      <dsp:nvSpPr>
+        <dsp:cNvPr id="0" name=""/>
+        <dsp:cNvSpPr/>
+      </dsp:nvSpPr>
+      <dsp:spPr>
+        <a:xfrm>
+          <a:off x="8617037" y="2504195"/>
+          <a:ext cx="848510" cy="848510"/>
+        </a:xfrm>
+        <a:prstGeom prst="downArrow">
+          <a:avLst>
+            <a:gd name="adj1" fmla="val 55000"/>
+            <a:gd name="adj2" fmla="val 45000"/>
+          </a:avLst>
+        </a:prstGeom>
+        <a:solidFill>
+          <a:schemeClr val="accent3">
+            <a:tint val="40000"/>
+            <a:alpha val="90000"/>
+            <a:hueOff val="0"/>
+            <a:satOff val="0"/>
+            <a:lumOff val="0"/>
+            <a:alphaOff val="0"/>
+          </a:schemeClr>
+        </a:solidFill>
+        <a:ln w="6350" cap="flat" cmpd="sng" algn="ctr">
+          <a:solidFill>
+            <a:schemeClr val="accent3">
+              <a:tint val="40000"/>
+              <a:alpha val="90000"/>
+              <a:hueOff val="0"/>
+              <a:satOff val="0"/>
+              <a:lumOff val="0"/>
+              <a:alphaOff val="0"/>
+            </a:schemeClr>
+          </a:solidFill>
+          <a:prstDash val="solid"/>
+          <a:miter lim="800000"/>
+        </a:ln>
+        <a:effectLst/>
+      </dsp:spPr>
+      <dsp:style>
+        <a:lnRef idx="1">
+          <a:scrgbClr r="0" g="0" b="0"/>
+        </a:lnRef>
+        <a:fillRef idx="1">
+          <a:scrgbClr r="0" g="0" b="0"/>
+        </a:fillRef>
+        <a:effectRef idx="2">
+          <a:scrgbClr r="0" g="0" b="0"/>
+        </a:effectRef>
+        <a:fontRef idx="minor"/>
+      </dsp:style>
+      <dsp:txBody>
+        <a:bodyPr spcFirstLastPara="0" vert="horz" wrap="square" lIns="45720" tIns="45720" rIns="45720" bIns="45720" numCol="1" spcCol="1270" anchor="ctr" anchorCtr="0">
+          <a:noAutofit/>
+        </a:bodyPr>
+        <a:lstStyle/>
+        <a:p>
+          <a:pPr marL="0" lvl="0" indent="0" algn="ctr" defTabSz="1600200">
+            <a:lnSpc>
+              <a:spcPct val="90000"/>
+            </a:lnSpc>
+            <a:spcBef>
+              <a:spcPct val="0"/>
+            </a:spcBef>
+            <a:spcAft>
+              <a:spcPct val="35000"/>
+            </a:spcAft>
+            <a:buNone/>
+          </a:pPr>
+          <a:endParaRPr lang="en-US" sz="3600" kern="1200"/>
+        </a:p>
+      </dsp:txBody>
+      <dsp:txXfrm>
+        <a:off x="8807952" y="2504195"/>
+        <a:ext cx="466680" cy="638504"/>
+      </dsp:txXfrm>
+    </dsp:sp>
+  </dsp:spTree>
+</dsp:drawing>
+</file>
+
 <file path=ppt/diagrams/layout1.xml><?xml version="1.0" encoding="utf-8"?>
 <dgm:layoutDef xmlns:dgm="http://schemas.openxmlformats.org/drawingml/2006/diagram" xmlns:a="http://schemas.openxmlformats.org/drawingml/2006/main" uniqueId="urn:microsoft.com/office/officeart/2005/8/layout/list1">
   <dgm:title val=""/>
@@ -2233,6 +3891,1232 @@
 </dgm:layoutDef>
 </file>
 
+<file path=ppt/diagrams/layout2.xml><?xml version="1.0" encoding="utf-8"?>
+<dgm:layoutDef xmlns:dgm="http://schemas.openxmlformats.org/drawingml/2006/diagram" xmlns:a="http://schemas.openxmlformats.org/drawingml/2006/main" uniqueId="urn:microsoft.com/office/officeart/2005/8/layout/vProcess5">
+  <dgm:title val=""/>
+  <dgm:desc val=""/>
+  <dgm:catLst>
+    <dgm:cat type="process" pri="14000"/>
+  </dgm:catLst>
+  <dgm:sampData>
+    <dgm:dataModel>
+      <dgm:ptLst>
+        <dgm:pt modelId="0" type="doc"/>
+        <dgm:pt modelId="1">
+          <dgm:prSet phldr="1"/>
+        </dgm:pt>
+        <dgm:pt modelId="2">
+          <dgm:prSet phldr="1"/>
+        </dgm:pt>
+        <dgm:pt modelId="3">
+          <dgm:prSet phldr="1"/>
+        </dgm:pt>
+      </dgm:ptLst>
+      <dgm:cxnLst>
+        <dgm:cxn modelId="5" srcId="0" destId="1" srcOrd="0" destOrd="0"/>
+        <dgm:cxn modelId="6" srcId="0" destId="2" srcOrd="1" destOrd="0"/>
+        <dgm:cxn modelId="7" srcId="0" destId="3" srcOrd="2" destOrd="0"/>
+      </dgm:cxnLst>
+      <dgm:bg/>
+      <dgm:whole/>
+    </dgm:dataModel>
+  </dgm:sampData>
+  <dgm:styleData>
+    <dgm:dataModel>
+      <dgm:ptLst>
+        <dgm:pt modelId="0" type="doc"/>
+        <dgm:pt modelId="1"/>
+        <dgm:pt modelId="2"/>
+      </dgm:ptLst>
+      <dgm:cxnLst>
+        <dgm:cxn modelId="3" srcId="0" destId="1" srcOrd="0" destOrd="0"/>
+        <dgm:cxn modelId="4" srcId="0" destId="2" srcOrd="1" destOrd="0"/>
+      </dgm:cxnLst>
+      <dgm:bg/>
+      <dgm:whole/>
+    </dgm:dataModel>
+  </dgm:styleData>
+  <dgm:clrData>
+    <dgm:dataModel>
+      <dgm:ptLst>
+        <dgm:pt modelId="0" type="doc"/>
+        <dgm:pt modelId="1"/>
+        <dgm:pt modelId="2"/>
+        <dgm:pt modelId="3"/>
+        <dgm:pt modelId="4"/>
+      </dgm:ptLst>
+      <dgm:cxnLst>
+        <dgm:cxn modelId="6" srcId="0" destId="1" srcOrd="0" destOrd="0"/>
+        <dgm:cxn modelId="7" srcId="0" destId="2" srcOrd="1" destOrd="0"/>
+        <dgm:cxn modelId="8" srcId="0" destId="3" srcOrd="2" destOrd="0"/>
+        <dgm:cxn modelId="9" srcId="0" destId="4" srcOrd="3" destOrd="0"/>
+      </dgm:cxnLst>
+      <dgm:bg/>
+      <dgm:whole/>
+    </dgm:dataModel>
+  </dgm:clrData>
+  <dgm:layoutNode name="outerComposite">
+    <dgm:varLst>
+      <dgm:chMax val="5"/>
+      <dgm:dir/>
+      <dgm:resizeHandles val="exact"/>
+    </dgm:varLst>
+    <dgm:alg type="composite"/>
+    <dgm:shape xmlns:r="http://schemas.openxmlformats.org/officeDocument/2006/relationships" r:blip="">
+      <dgm:adjLst/>
+    </dgm:shape>
+    <dgm:presOf/>
+    <dgm:choose name="Name0">
+      <dgm:if name="Name1" func="var" arg="dir" op="equ" val="norm">
+        <dgm:constrLst>
+          <dgm:constr type="primFontSz" for="ch" ptType="node" op="equ" val="65"/>
+          <dgm:constr type="w" for="ch" forName="dummyMaxCanvas" refType="w"/>
+          <dgm:constr type="h" for="ch" forName="dummyMaxCanvas" refType="h"/>
+          <dgm:constr type="w" for="ch" forName="OneNode_1" refType="w"/>
+          <dgm:constr type="h" for="ch" forName="OneNode_1" refType="h" fact="0.5"/>
+          <dgm:constr type="ctrY" for="ch" forName="OneNode_1" refType="h" fact="0.5"/>
+          <dgm:constr type="w" for="ch" forName="TwoNodes_1" refType="w" fact="0.85"/>
+          <dgm:constr type="h" for="ch" forName="TwoNodes_1" refType="h" fact="0.45"/>
+          <dgm:constr type="t" for="ch" forName="TwoNodes_1"/>
+          <dgm:constr type="l" for="ch" forName="TwoNodes_1"/>
+          <dgm:constr type="w" for="ch" forName="TwoNodes_2" refType="w" fact="0.85"/>
+          <dgm:constr type="h" for="ch" forName="TwoNodes_2" refType="h" fact="0.45"/>
+          <dgm:constr type="b" for="ch" forName="TwoNodes_2" refType="h"/>
+          <dgm:constr type="r" for="ch" forName="TwoNodes_2" refType="w"/>
+          <dgm:constr type="w" for="ch" forName="TwoConn_1-2" refType="h" refFor="ch" refForName="TwoNodes_1" fact="0.65"/>
+          <dgm:constr type="h" for="ch" forName="TwoConn_1-2" refType="h" refFor="ch" refForName="TwoNodes_1" fact="0.65"/>
+          <dgm:constr type="ctrY" for="ch" forName="TwoConn_1-2" refType="h" fact="0.5"/>
+          <dgm:constr type="r" for="ch" forName="TwoConn_1-2" refType="r" refFor="ch" refForName="TwoNodes_1"/>
+          <dgm:constr type="r" for="ch" forName="TwoNodes_1_text" refType="l" refFor="ch" refForName="TwoConn_1-2"/>
+          <dgm:constr type="rOff" for="ch" forName="TwoNodes_1_text" refType="w" refFor="ch" refForName="TwoConn_1-2" fact="-0.5"/>
+          <dgm:constr type="t" for="ch" forName="TwoNodes_1_text" refType="t" refFor="ch" refForName="TwoNodes_1"/>
+          <dgm:constr type="b" for="ch" forName="TwoNodes_1_text" refType="b" refFor="ch" refForName="TwoNodes_1"/>
+          <dgm:constr type="l" for="ch" forName="TwoNodes_1_text" refType="l" refFor="ch" refForName="TwoNodes_1"/>
+          <dgm:constr type="r" for="ch" forName="TwoNodes_2_text" refType="l" refFor="ch" refForName="TwoConn_1-2"/>
+          <dgm:constr type="t" for="ch" forName="TwoNodes_2_text" refType="t" refFor="ch" refForName="TwoNodes_2"/>
+          <dgm:constr type="b" for="ch" forName="TwoNodes_2_text" refType="b" refFor="ch" refForName="TwoNodes_2"/>
+          <dgm:constr type="l" for="ch" forName="TwoNodes_2_text" refType="l" refFor="ch" refForName="TwoNodes_2"/>
+          <dgm:constr type="w" for="ch" forName="ThreeNodes_1" refType="w" fact="0.85"/>
+          <dgm:constr type="h" for="ch" forName="ThreeNodes_1" refType="h" fact="0.3"/>
+          <dgm:constr type="t" for="ch" forName="ThreeNodes_1"/>
+          <dgm:constr type="l" for="ch" forName="ThreeNodes_1"/>
+          <dgm:constr type="w" for="ch" forName="ThreeNodes_2" refType="w" fact="0.85"/>
+          <dgm:constr type="h" for="ch" forName="ThreeNodes_2" refType="h" fact="0.3"/>
+          <dgm:constr type="ctrY" for="ch" forName="ThreeNodes_2" refType="h" fact="0.5"/>
+          <dgm:constr type="ctrX" for="ch" forName="ThreeNodes_2" refType="w" fact="0.5"/>
+          <dgm:constr type="w" for="ch" forName="ThreeNodes_3" refType="w" fact="0.85"/>
+          <dgm:constr type="h" for="ch" forName="ThreeNodes_3" refType="h" fact="0.3"/>
+          <dgm:constr type="b" for="ch" forName="ThreeNodes_3" refType="h"/>
+          <dgm:constr type="r" for="ch" forName="ThreeNodes_3" refType="w"/>
+          <dgm:constr type="w" for="ch" forName="ThreeConn_1-2" refType="h" refFor="ch" refForName="ThreeNodes_1" fact="0.65"/>
+          <dgm:constr type="h" for="ch" forName="ThreeConn_1-2" refType="h" refFor="ch" refForName="ThreeNodes_1" fact="0.65"/>
+          <dgm:constr type="ctrY" for="ch" forName="ThreeConn_1-2" refType="h" fact="0.325"/>
+          <dgm:constr type="r" for="ch" forName="ThreeConn_1-2" refType="r" refFor="ch" refForName="ThreeNodes_1"/>
+          <dgm:constr type="w" for="ch" forName="ThreeConn_2-3" refType="h" refFor="ch" refForName="ThreeNodes_2" fact="0.65"/>
+          <dgm:constr type="h" for="ch" forName="ThreeConn_2-3" refType="h" refFor="ch" refForName="ThreeNodes_2" fact="0.65"/>
+          <dgm:constr type="ctrY" for="ch" forName="ThreeConn_2-3" refType="h" fact="0.673"/>
+          <dgm:constr type="r" for="ch" forName="ThreeConn_2-3" refType="r" refFor="ch" refForName="ThreeNodes_2"/>
+          <dgm:constr type="r" for="ch" forName="ThreeNodes_1_text" refType="l" refFor="ch" refForName="ThreeConn_1-2"/>
+          <dgm:constr type="rOff" for="ch" forName="ThreeNodes_1_text" refType="w" refFor="ch" refForName="ThreeConn_1-2" fact="-0.57"/>
+          <dgm:constr type="t" for="ch" forName="ThreeNodes_1_text" refType="t" refFor="ch" refForName="ThreeNodes_1"/>
+          <dgm:constr type="b" for="ch" forName="ThreeNodes_1_text" refType="b" refFor="ch" refForName="ThreeNodes_1"/>
+          <dgm:constr type="l" for="ch" forName="ThreeNodes_1_text" refType="l" refFor="ch" refForName="ThreeNodes_1"/>
+          <dgm:constr type="r" for="ch" forName="ThreeNodes_2_text" refType="l" refFor="ch" refForName="ThreeConn_1-2"/>
+          <dgm:constr type="t" for="ch" forName="ThreeNodes_2_text" refType="t" refFor="ch" refForName="ThreeNodes_2"/>
+          <dgm:constr type="b" for="ch" forName="ThreeNodes_2_text" refType="b" refFor="ch" refForName="ThreeNodes_2"/>
+          <dgm:constr type="l" for="ch" forName="ThreeNodes_2_text" refType="l" refFor="ch" refForName="ThreeNodes_2"/>
+          <dgm:constr type="r" for="ch" forName="ThreeNodes_3_text" refType="l" refFor="ch" refForName="ThreeConn_2-3"/>
+          <dgm:constr type="t" for="ch" forName="ThreeNodes_3_text" refType="t" refFor="ch" refForName="ThreeNodes_3"/>
+          <dgm:constr type="b" for="ch" forName="ThreeNodes_3_text" refType="b" refFor="ch" refForName="ThreeNodes_3"/>
+          <dgm:constr type="l" for="ch" forName="ThreeNodes_3_text" refType="l" refFor="ch" refForName="ThreeNodes_3"/>
+          <dgm:constr type="w" for="ch" forName="FourNodes_1" refType="w" fact="0.8"/>
+          <dgm:constr type="h" for="ch" forName="FourNodes_1" refType="h" fact="0.22"/>
+          <dgm:constr type="t" for="ch" forName="FourNodes_1"/>
+          <dgm:constr type="l" for="ch" forName="FourNodes_1"/>
+          <dgm:constr type="w" for="ch" forName="FourNodes_2" refType="w" fact="0.8"/>
+          <dgm:constr type="h" for="ch" forName="FourNodes_2" refType="h" fact="0.22"/>
+          <dgm:constr type="ctrY" for="ch" forName="FourNodes_2" refType="h" fact="0.37"/>
+          <dgm:constr type="ctrX" for="ch" forName="FourNodes_2" refType="w" fact="0.467"/>
+          <dgm:constr type="w" for="ch" forName="FourNodes_3" refType="w" fact="0.8"/>
+          <dgm:constr type="h" for="ch" forName="FourNodes_3" refType="h" fact="0.22"/>
+          <dgm:constr type="ctrY" for="ch" forName="FourNodes_3" refType="h" fact="0.63"/>
+          <dgm:constr type="ctrX" for="ch" forName="FourNodes_3" refType="w" fact="0.533"/>
+          <dgm:constr type="w" for="ch" forName="FourNodes_4" refType="w" fact="0.8"/>
+          <dgm:constr type="h" for="ch" forName="FourNodes_4" refType="h" fact="0.22"/>
+          <dgm:constr type="b" for="ch" forName="FourNodes_4" refType="h"/>
+          <dgm:constr type="r" for="ch" forName="FourNodes_4" refType="w"/>
+          <dgm:constr type="w" for="ch" forName="FourConn_1-2" refType="h" refFor="ch" refForName="FourNodes_1" fact="0.65"/>
+          <dgm:constr type="h" for="ch" forName="FourConn_1-2" refType="h" refFor="ch" refForName="FourNodes_1" fact="0.65"/>
+          <dgm:constr type="ctrY" for="ch" forName="FourConn_1-2" refType="h" fact="0.24"/>
+          <dgm:constr type="r" for="ch" forName="FourConn_1-2" refType="r" refFor="ch" refForName="FourNodes_1"/>
+          <dgm:constr type="w" for="ch" forName="FourConn_2-3" refType="h" refFor="ch" refForName="FourNodes_2" fact="0.65"/>
+          <dgm:constr type="h" for="ch" forName="FourConn_2-3" refType="h" refFor="ch" refForName="FourNodes_2" fact="0.65"/>
+          <dgm:constr type="ctrY" for="ch" forName="FourConn_2-3" refType="h" fact="0.5"/>
+          <dgm:constr type="r" for="ch" forName="FourConn_2-3" refType="r" refFor="ch" refForName="FourNodes_2"/>
+          <dgm:constr type="w" for="ch" forName="FourConn_3-4" refType="h" refFor="ch" refForName="FourNodes_3" fact="0.65"/>
+          <dgm:constr type="h" for="ch" forName="FourConn_3-4" refType="h" refFor="ch" refForName="FourNodes_3" fact="0.65"/>
+          <dgm:constr type="ctrY" for="ch" forName="FourConn_3-4" refType="h" fact="0.76"/>
+          <dgm:constr type="r" for="ch" forName="FourConn_3-4" refType="r" refFor="ch" refForName="FourNodes_3"/>
+          <dgm:constr type="r" for="ch" forName="FourNodes_1_text" refType="l" refFor="ch" refForName="FourConn_1-2"/>
+          <dgm:constr type="rOff" for="ch" forName="FourNodes_1_text" refType="w" refFor="ch" refForName="FourConn_1-2" fact="-0.7"/>
+          <dgm:constr type="t" for="ch" forName="FourNodes_1_text" refType="t" refFor="ch" refForName="FourNodes_1"/>
+          <dgm:constr type="b" for="ch" forName="FourNodes_1_text" refType="b" refFor="ch" refForName="FourNodes_1"/>
+          <dgm:constr type="l" for="ch" forName="FourNodes_1_text" refType="l" refFor="ch" refForName="FourNodes_1"/>
+          <dgm:constr type="r" for="ch" forName="FourNodes_2_text" refType="l" refFor="ch" refForName="FourConn_1-2"/>
+          <dgm:constr type="t" for="ch" forName="FourNodes_2_text" refType="t" refFor="ch" refForName="FourNodes_2"/>
+          <dgm:constr type="b" for="ch" forName="FourNodes_2_text" refType="b" refFor="ch" refForName="FourNodes_2"/>
+          <dgm:constr type="l" for="ch" forName="FourNodes_2_text" refType="l" refFor="ch" refForName="FourNodes_2"/>
+          <dgm:constr type="r" for="ch" forName="FourNodes_3_text" refType="l" refFor="ch" refForName="FourConn_2-3"/>
+          <dgm:constr type="t" for="ch" forName="FourNodes_3_text" refType="t" refFor="ch" refForName="FourNodes_3"/>
+          <dgm:constr type="b" for="ch" forName="FourNodes_3_text" refType="b" refFor="ch" refForName="FourNodes_3"/>
+          <dgm:constr type="l" for="ch" forName="FourNodes_3_text" refType="l" refFor="ch" refForName="FourNodes_3"/>
+          <dgm:constr type="r" for="ch" forName="FourNodes_4_text" refType="l" refFor="ch" refForName="FourConn_3-4"/>
+          <dgm:constr type="t" for="ch" forName="FourNodes_4_text" refType="t" refFor="ch" refForName="FourNodes_4"/>
+          <dgm:constr type="b" for="ch" forName="FourNodes_4_text" refType="b" refFor="ch" refForName="FourNodes_4"/>
+          <dgm:constr type="l" for="ch" forName="FourNodes_4_text" refType="l" refFor="ch" refForName="FourNodes_4"/>
+          <dgm:constr type="w" for="ch" forName="FiveNodes_1" refType="w" fact="0.77"/>
+          <dgm:constr type="h" for="ch" forName="FiveNodes_1" refType="h" fact="0.18"/>
+          <dgm:constr type="t" for="ch" forName="FiveNodes_1"/>
+          <dgm:constr type="l" for="ch" forName="FiveNodes_1"/>
+          <dgm:constr type="w" for="ch" forName="FiveNodes_2" refType="w" fact="0.77"/>
+          <dgm:constr type="h" for="ch" forName="FiveNodes_2" refType="h" fact="0.18"/>
+          <dgm:constr type="ctrY" for="ch" forName="FiveNodes_2" refType="h" fact="0.295"/>
+          <dgm:constr type="ctrX" for="ch" forName="FiveNodes_2" refType="w" fact="0.4425"/>
+          <dgm:constr type="w" for="ch" forName="FiveNodes_3" refType="w" fact="0.77"/>
+          <dgm:constr type="h" for="ch" forName="FiveNodes_3" refType="h" fact="0.18"/>
+          <dgm:constr type="ctrY" for="ch" forName="FiveNodes_3" refType="h" fact="0.5"/>
+          <dgm:constr type="ctrX" for="ch" forName="FiveNodes_3" refType="w" fact="0.5"/>
+          <dgm:constr type="w" for="ch" forName="FiveNodes_4" refType="w" fact="0.77"/>
+          <dgm:constr type="h" for="ch" forName="FiveNodes_4" refType="h" fact="0.18"/>
+          <dgm:constr type="ctrY" for="ch" forName="FiveNodes_4" refType="h" fact="0.705"/>
+          <dgm:constr type="ctrX" for="ch" forName="FiveNodes_4" refType="w" fact="0.5575"/>
+          <dgm:constr type="w" for="ch" forName="FiveNodes_5" refType="w" fact="0.77"/>
+          <dgm:constr type="h" for="ch" forName="FiveNodes_5" refType="h" fact="0.18"/>
+          <dgm:constr type="b" for="ch" forName="FiveNodes_5" refType="h"/>
+          <dgm:constr type="r" for="ch" forName="FiveNodes_5" refType="w"/>
+          <dgm:constr type="w" for="ch" forName="FiveConn_1-2" refType="h" refFor="ch" refForName="FiveNodes_1" fact="0.65"/>
+          <dgm:constr type="h" for="ch" forName="FiveConn_1-2" refType="h" refFor="ch" refForName="FiveNodes_1" fact="0.65"/>
+          <dgm:constr type="ctrY" for="ch" forName="FiveConn_1-2" refType="h" fact="0.19"/>
+          <dgm:constr type="r" for="ch" forName="FiveConn_1-2" refType="r" refFor="ch" refForName="FiveNodes_1"/>
+          <dgm:constr type="w" for="ch" forName="FiveConn_2-3" refType="h" refFor="ch" refForName="FiveNodes_2" fact="0.65"/>
+          <dgm:constr type="h" for="ch" forName="FiveConn_2-3" refType="h" refFor="ch" refForName="FiveNodes_2" fact="0.65"/>
+          <dgm:constr type="ctrY" for="ch" forName="FiveConn_2-3" refType="h" fact="0.395"/>
+          <dgm:constr type="r" for="ch" forName="FiveConn_2-3" refType="r" refFor="ch" refForName="FiveNodes_2"/>
+          <dgm:constr type="w" for="ch" forName="FiveConn_3-4" refType="h" refFor="ch" refForName="FiveNodes_3" fact="0.65"/>
+          <dgm:constr type="h" for="ch" forName="FiveConn_3-4" refType="h" refFor="ch" refForName="FiveNodes_3" fact="0.65"/>
+          <dgm:constr type="ctrY" for="ch" forName="FiveConn_3-4" refType="h" fact="0.597"/>
+          <dgm:constr type="r" for="ch" forName="FiveConn_3-4" refType="r" refFor="ch" refForName="FiveNodes_3"/>
+          <dgm:constr type="w" for="ch" forName="FiveConn_4-5" refType="h" refFor="ch" refForName="FiveNodes_4" fact="0.65"/>
+          <dgm:constr type="h" for="ch" forName="FiveConn_4-5" refType="h" refFor="ch" refForName="FiveNodes_4" fact="0.65"/>
+          <dgm:constr type="ctrY" for="ch" forName="FiveConn_4-5" refType="h" fact="0.804"/>
+          <dgm:constr type="r" for="ch" forName="FiveConn_4-5" refType="r" refFor="ch" refForName="FiveNodes_4"/>
+          <dgm:constr type="r" for="ch" forName="FiveNodes_1_text" refType="l" refFor="ch" refForName="FiveConn_1-2"/>
+          <dgm:constr type="rOff" for="ch" forName="FiveNodes_1_text" refType="w" refFor="ch" refForName="FiveConn_1-2" fact="-0.75"/>
+          <dgm:constr type="t" for="ch" forName="FiveNodes_1_text" refType="t" refFor="ch" refForName="FiveNodes_1"/>
+          <dgm:constr type="b" for="ch" forName="FiveNodes_1_text" refType="b" refFor="ch" refForName="FiveNodes_1"/>
+          <dgm:constr type="l" for="ch" forName="FiveNodes_1_text" refType="l" refFor="ch" refForName="FiveNodes_1"/>
+          <dgm:constr type="r" for="ch" forName="FiveNodes_2_text" refType="l" refFor="ch" refForName="FiveConn_1-2"/>
+          <dgm:constr type="t" for="ch" forName="FiveNodes_2_text" refType="t" refFor="ch" refForName="FiveNodes_2"/>
+          <dgm:constr type="b" for="ch" forName="FiveNodes_2_text" refType="b" refFor="ch" refForName="FiveNodes_2"/>
+          <dgm:constr type="l" for="ch" forName="FiveNodes_2_text" refType="l" refFor="ch" refForName="FiveNodes_2"/>
+          <dgm:constr type="r" for="ch" forName="FiveNodes_3_text" refType="l" refFor="ch" refForName="FiveConn_2-3"/>
+          <dgm:constr type="t" for="ch" forName="FiveNodes_3_text" refType="t" refFor="ch" refForName="FiveNodes_3"/>
+          <dgm:constr type="b" for="ch" forName="FiveNodes_3_text" refType="b" refFor="ch" refForName="FiveNodes_3"/>
+          <dgm:constr type="l" for="ch" forName="FiveNodes_3_text" refType="l" refFor="ch" refForName="FiveNodes_3"/>
+          <dgm:constr type="r" for="ch" forName="FiveNodes_4_text" refType="l" refFor="ch" refForName="FiveConn_3-4"/>
+          <dgm:constr type="t" for="ch" forName="FiveNodes_4_text" refType="t" refFor="ch" refForName="FiveNodes_4"/>
+          <dgm:constr type="b" for="ch" forName="FiveNodes_4_text" refType="b" refFor="ch" refForName="FiveNodes_4"/>
+          <dgm:constr type="l" for="ch" forName="FiveNodes_4_text" refType="l" refFor="ch" refForName="FiveNodes_4"/>
+          <dgm:constr type="r" for="ch" forName="FiveNodes_5_text" refType="l" refFor="ch" refForName="FiveConn_4-5"/>
+          <dgm:constr type="t" for="ch" forName="FiveNodes_5_text" refType="t" refFor="ch" refForName="FiveNodes_5"/>
+          <dgm:constr type="b" for="ch" forName="FiveNodes_5_text" refType="b" refFor="ch" refForName="FiveNodes_5"/>
+          <dgm:constr type="l" for="ch" forName="FiveNodes_5_text" refType="l" refFor="ch" refForName="FiveNodes_5"/>
+        </dgm:constrLst>
+      </dgm:if>
+      <dgm:else name="Name2">
+        <dgm:constrLst>
+          <dgm:constr type="primFontSz" for="ch" ptType="node" op="equ" val="65"/>
+          <dgm:constr type="w" for="ch" forName="dummyMaxCanvas" refType="w"/>
+          <dgm:constr type="h" for="ch" forName="dummyMaxCanvas" refType="h"/>
+          <dgm:constr type="w" for="ch" forName="OneNode_1" refType="w"/>
+          <dgm:constr type="h" for="ch" forName="OneNode_1" refType="h" fact="0.5"/>
+          <dgm:constr type="ctrY" for="ch" forName="OneNode_1" refType="h" fact="0.5"/>
+          <dgm:constr type="w" for="ch" forName="TwoNodes_1" refType="w" fact="0.85"/>
+          <dgm:constr type="h" for="ch" forName="TwoNodes_1" refType="h" fact="0.45"/>
+          <dgm:constr type="t" for="ch" forName="TwoNodes_1"/>
+          <dgm:constr type="r" for="ch" forName="TwoNodes_1" refType="w"/>
+          <dgm:constr type="w" for="ch" forName="TwoNodes_2" refType="w" fact="0.85"/>
+          <dgm:constr type="h" for="ch" forName="TwoNodes_2" refType="h" fact="0.45"/>
+          <dgm:constr type="b" for="ch" forName="TwoNodes_2" refType="h"/>
+          <dgm:constr type="l" for="ch" forName="TwoNodes_2"/>
+          <dgm:constr type="w" for="ch" forName="TwoConn_1-2" refType="h" refFor="ch" refForName="TwoNodes_1" fact="0.65"/>
+          <dgm:constr type="h" for="ch" forName="TwoConn_1-2" refType="h" refFor="ch" refForName="TwoNodes_1" fact="0.65"/>
+          <dgm:constr type="ctrY" for="ch" forName="TwoConn_1-2" refType="h" fact="0.5"/>
+          <dgm:constr type="l" for="ch" forName="TwoConn_1-2" refType="l" refFor="ch" refForName="TwoNodes_1"/>
+          <dgm:constr type="l" for="ch" forName="TwoNodes_1_text" refType="r" refFor="ch" refForName="TwoConn_1-2"/>
+          <dgm:constr type="lOff" for="ch" forName="TwoNodes_1_text" refType="w" refFor="ch" refForName="TwoConn_1-2" fact="0.5"/>
+          <dgm:constr type="t" for="ch" forName="TwoNodes_1_text" refType="t" refFor="ch" refForName="TwoNodes_1"/>
+          <dgm:constr type="b" for="ch" forName="TwoNodes_1_text" refType="b" refFor="ch" refForName="TwoNodes_1"/>
+          <dgm:constr type="r" for="ch" forName="TwoNodes_1_text" refType="r" refFor="ch" refForName="TwoNodes_1"/>
+          <dgm:constr type="l" for="ch" forName="TwoNodes_2_text" refType="r" refFor="ch" refForName="TwoConn_1-2"/>
+          <dgm:constr type="t" for="ch" forName="TwoNodes_2_text" refType="t" refFor="ch" refForName="TwoNodes_2"/>
+          <dgm:constr type="b" for="ch" forName="TwoNodes_2_text" refType="b" refFor="ch" refForName="TwoNodes_2"/>
+          <dgm:constr type="r" for="ch" forName="TwoNodes_2_text" refType="r" refFor="ch" refForName="TwoNodes_2"/>
+          <dgm:constr type="w" for="ch" forName="ThreeNodes_1" refType="w" fact="0.85"/>
+          <dgm:constr type="h" for="ch" forName="ThreeNodes_1" refType="h" fact="0.3"/>
+          <dgm:constr type="t" for="ch" forName="ThreeNodes_1"/>
+          <dgm:constr type="r" for="ch" forName="ThreeNodes_1" refType="w"/>
+          <dgm:constr type="w" for="ch" forName="ThreeNodes_2" refType="w" fact="0.85"/>
+          <dgm:constr type="h" for="ch" forName="ThreeNodes_2" refType="h" fact="0.3"/>
+          <dgm:constr type="ctrY" for="ch" forName="ThreeNodes_2" refType="h" fact="0.5"/>
+          <dgm:constr type="ctrX" for="ch" forName="ThreeNodes_2" refType="w" fact="0.5"/>
+          <dgm:constr type="w" for="ch" forName="ThreeNodes_3" refType="w" fact="0.85"/>
+          <dgm:constr type="h" for="ch" forName="ThreeNodes_3" refType="h" fact="0.3"/>
+          <dgm:constr type="b" for="ch" forName="ThreeNodes_3" refType="h"/>
+          <dgm:constr type="l" for="ch" forName="ThreeNodes_3"/>
+          <dgm:constr type="w" for="ch" forName="ThreeConn_1-2" refType="h" refFor="ch" refForName="ThreeNodes_1" fact="0.65"/>
+          <dgm:constr type="h" for="ch" forName="ThreeConn_1-2" refType="h" refFor="ch" refForName="ThreeNodes_1" fact="0.65"/>
+          <dgm:constr type="ctrY" for="ch" forName="ThreeConn_1-2" refType="h" fact="0.325"/>
+          <dgm:constr type="l" for="ch" forName="ThreeConn_1-2" refType="l" refFor="ch" refForName="ThreeNodes_1"/>
+          <dgm:constr type="w" for="ch" forName="ThreeConn_2-3" refType="h" refFor="ch" refForName="ThreeNodes_2" fact="0.65"/>
+          <dgm:constr type="h" for="ch" forName="ThreeConn_2-3" refType="h" refFor="ch" refForName="ThreeNodes_2" fact="0.65"/>
+          <dgm:constr type="ctrY" for="ch" forName="ThreeConn_2-3" refType="h" fact="0.673"/>
+          <dgm:constr type="l" for="ch" forName="ThreeConn_2-3" refType="l" refFor="ch" refForName="ThreeNodes_2"/>
+          <dgm:constr type="l" for="ch" forName="ThreeNodes_1_text" refType="r" refFor="ch" refForName="ThreeConn_1-2"/>
+          <dgm:constr type="lOff" for="ch" forName="ThreeNodes_1_text" refType="w" refFor="ch" refForName="ThreeConn_1-2" fact="0.55"/>
+          <dgm:constr type="t" for="ch" forName="ThreeNodes_1_text" refType="t" refFor="ch" refForName="ThreeNodes_1"/>
+          <dgm:constr type="b" for="ch" forName="ThreeNodes_1_text" refType="b" refFor="ch" refForName="ThreeNodes_1"/>
+          <dgm:constr type="r" for="ch" forName="ThreeNodes_1_text" refType="r" refFor="ch" refForName="ThreeNodes_1"/>
+          <dgm:constr type="l" for="ch" forName="ThreeNodes_2_text" refType="r" refFor="ch" refForName="ThreeConn_1-2"/>
+          <dgm:constr type="t" for="ch" forName="ThreeNodes_2_text" refType="t" refFor="ch" refForName="ThreeNodes_2"/>
+          <dgm:constr type="b" for="ch" forName="ThreeNodes_2_text" refType="b" refFor="ch" refForName="ThreeNodes_2"/>
+          <dgm:constr type="r" for="ch" forName="ThreeNodes_2_text" refType="r" refFor="ch" refForName="ThreeNodes_2"/>
+          <dgm:constr type="l" for="ch" forName="ThreeNodes_3_text" refType="r" refFor="ch" refForName="ThreeConn_2-3"/>
+          <dgm:constr type="t" for="ch" forName="ThreeNodes_3_text" refType="t" refFor="ch" refForName="ThreeNodes_3"/>
+          <dgm:constr type="b" for="ch" forName="ThreeNodes_3_text" refType="b" refFor="ch" refForName="ThreeNodes_3"/>
+          <dgm:constr type="r" for="ch" forName="ThreeNodes_3_text" refType="r" refFor="ch" refForName="ThreeNodes_3"/>
+          <dgm:constr type="w" for="ch" forName="FourNodes_1" refType="w" fact="0.8"/>
+          <dgm:constr type="h" for="ch" forName="FourNodes_1" refType="h" fact="0.22"/>
+          <dgm:constr type="t" for="ch" forName="FourNodes_1"/>
+          <dgm:constr type="r" for="ch" forName="FourNodes_1" refType="w"/>
+          <dgm:constr type="w" for="ch" forName="FourNodes_2" refType="w" fact="0.8"/>
+          <dgm:constr type="h" for="ch" forName="FourNodes_2" refType="h" fact="0.22"/>
+          <dgm:constr type="ctrY" for="ch" forName="FourNodes_2" refType="h" fact="0.37"/>
+          <dgm:constr type="ctrX" for="ch" forName="FourNodes_2" refType="w" fact="0.533"/>
+          <dgm:constr type="w" for="ch" forName="FourNodes_3" refType="w" fact="0.8"/>
+          <dgm:constr type="h" for="ch" forName="FourNodes_3" refType="h" fact="0.22"/>
+          <dgm:constr type="ctrY" for="ch" forName="FourNodes_3" refType="h" fact="0.63"/>
+          <dgm:constr type="ctrX" for="ch" forName="FourNodes_3" refType="w" fact="0.467"/>
+          <dgm:constr type="w" for="ch" forName="FourNodes_4" refType="w" fact="0.8"/>
+          <dgm:constr type="h" for="ch" forName="FourNodes_4" refType="h" fact="0.22"/>
+          <dgm:constr type="b" for="ch" forName="FourNodes_4" refType="h"/>
+          <dgm:constr type="l" for="ch" forName="FourNodes_4"/>
+          <dgm:constr type="w" for="ch" forName="FourConn_1-2" refType="h" refFor="ch" refForName="FourNodes_1" fact="0.65"/>
+          <dgm:constr type="h" for="ch" forName="FourConn_1-2" refType="h" refFor="ch" refForName="FourNodes_1" fact="0.65"/>
+          <dgm:constr type="ctrY" for="ch" forName="FourConn_1-2" refType="h" fact="0.24"/>
+          <dgm:constr type="l" for="ch" forName="FourConn_1-2" refType="l" refFor="ch" refForName="FourNodes_1"/>
+          <dgm:constr type="w" for="ch" forName="FourConn_2-3" refType="h" refFor="ch" refForName="FourNodes_2" fact="0.65"/>
+          <dgm:constr type="h" for="ch" forName="FourConn_2-3" refType="h" refFor="ch" refForName="FourNodes_2" fact="0.65"/>
+          <dgm:constr type="ctrY" for="ch" forName="FourConn_2-3" refType="h" fact="0.5"/>
+          <dgm:constr type="l" for="ch" forName="FourConn_2-3" refType="l" refFor="ch" refForName="FourNodes_2"/>
+          <dgm:constr type="w" for="ch" forName="FourConn_3-4" refType="h" refFor="ch" refForName="FourNodes_3" fact="0.65"/>
+          <dgm:constr type="h" for="ch" forName="FourConn_3-4" refType="h" refFor="ch" refForName="FourNodes_3" fact="0.65"/>
+          <dgm:constr type="ctrY" for="ch" forName="FourConn_3-4" refType="h" fact="0.76"/>
+          <dgm:constr type="l" for="ch" forName="FourConn_3-4" refType="l" refFor="ch" refForName="FourNodes_3"/>
+          <dgm:constr type="l" for="ch" forName="FourNodes_1_text" refType="r" refFor="ch" refForName="FourConn_1-2"/>
+          <dgm:constr type="lOff" for="ch" forName="FourNodes_1_text" refType="w" refFor="ch" refForName="FourConn_1-2" fact="0.69"/>
+          <dgm:constr type="t" for="ch" forName="FourNodes_1_text" refType="t" refFor="ch" refForName="FourNodes_1"/>
+          <dgm:constr type="b" for="ch" forName="FourNodes_1_text" refType="b" refFor="ch" refForName="FourNodes_1"/>
+          <dgm:constr type="r" for="ch" forName="FourNodes_1_text" refType="r" refFor="ch" refForName="FourNodes_1"/>
+          <dgm:constr type="l" for="ch" forName="FourNodes_2_text" refType="r" refFor="ch" refForName="FourConn_1-2"/>
+          <dgm:constr type="t" for="ch" forName="FourNodes_2_text" refType="t" refFor="ch" refForName="FourNodes_2"/>
+          <dgm:constr type="b" for="ch" forName="FourNodes_2_text" refType="b" refFor="ch" refForName="FourNodes_2"/>
+          <dgm:constr type="r" for="ch" forName="FourNodes_2_text" refType="r" refFor="ch" refForName="FourNodes_2"/>
+          <dgm:constr type="l" for="ch" forName="FourNodes_3_text" refType="r" refFor="ch" refForName="FourConn_2-3"/>
+          <dgm:constr type="t" for="ch" forName="FourNodes_3_text" refType="t" refFor="ch" refForName="FourNodes_3"/>
+          <dgm:constr type="b" for="ch" forName="FourNodes_3_text" refType="b" refFor="ch" refForName="FourNodes_3"/>
+          <dgm:constr type="r" for="ch" forName="FourNodes_3_text" refType="r" refFor="ch" refForName="FourNodes_3"/>
+          <dgm:constr type="l" for="ch" forName="FourNodes_4_text" refType="r" refFor="ch" refForName="FourConn_3-4"/>
+          <dgm:constr type="t" for="ch" forName="FourNodes_4_text" refType="t" refFor="ch" refForName="FourNodes_4"/>
+          <dgm:constr type="b" for="ch" forName="FourNodes_4_text" refType="b" refFor="ch" refForName="FourNodes_4"/>
+          <dgm:constr type="r" for="ch" forName="FourNodes_4_text" refType="r" refFor="ch" refForName="FourNodes_4"/>
+          <dgm:constr type="w" for="ch" forName="FiveNodes_1" refType="w" fact="0.77"/>
+          <dgm:constr type="h" for="ch" forName="FiveNodes_1" refType="h" fact="0.18"/>
+          <dgm:constr type="t" for="ch" forName="FiveNodes_1"/>
+          <dgm:constr type="r" for="ch" forName="FiveNodes_1" refType="w"/>
+          <dgm:constr type="w" for="ch" forName="FiveNodes_2" refType="w" fact="0.77"/>
+          <dgm:constr type="h" for="ch" forName="FiveNodes_2" refType="h" fact="0.18"/>
+          <dgm:constr type="ctrY" for="ch" forName="FiveNodes_2" refType="h" fact="0.295"/>
+          <dgm:constr type="ctrX" for="ch" forName="FiveNodes_2" refType="w" fact="0.5575"/>
+          <dgm:constr type="w" for="ch" forName="FiveNodes_3" refType="w" fact="0.77"/>
+          <dgm:constr type="h" for="ch" forName="FiveNodes_3" refType="h" fact="0.18"/>
+          <dgm:constr type="ctrY" for="ch" forName="FiveNodes_3" refType="h" fact="0.5"/>
+          <dgm:constr type="ctrX" for="ch" forName="FiveNodes_3" refType="w" fact="0.5"/>
+          <dgm:constr type="w" for="ch" forName="FiveNodes_4" refType="w" fact="0.77"/>
+          <dgm:constr type="h" for="ch" forName="FiveNodes_4" refType="h" fact="0.18"/>
+          <dgm:constr type="ctrY" for="ch" forName="FiveNodes_4" refType="h" fact="0.705"/>
+          <dgm:constr type="ctrX" for="ch" forName="FiveNodes_4" refType="w" fact="0.4425"/>
+          <dgm:constr type="w" for="ch" forName="FiveNodes_5" refType="w" fact="0.77"/>
+          <dgm:constr type="h" for="ch" forName="FiveNodes_5" refType="h" fact="0.18"/>
+          <dgm:constr type="b" for="ch" forName="FiveNodes_5" refType="h"/>
+          <dgm:constr type="l" for="ch" forName="FiveNodes_5"/>
+          <dgm:constr type="w" for="ch" forName="FiveConn_1-2" refType="h" refFor="ch" refForName="FiveNodes_1" fact="0.65"/>
+          <dgm:constr type="h" for="ch" forName="FiveConn_1-2" refType="h" refFor="ch" refForName="FiveNodes_1" fact="0.65"/>
+          <dgm:constr type="ctrY" for="ch" forName="FiveConn_1-2" refType="h" fact="0.19"/>
+          <dgm:constr type="l" for="ch" forName="FiveConn_1-2" refType="l" refFor="ch" refForName="FiveNodes_1"/>
+          <dgm:constr type="w" for="ch" forName="FiveConn_2-3" refType="h" refFor="ch" refForName="FiveNodes_2" fact="0.65"/>
+          <dgm:constr type="h" for="ch" forName="FiveConn_2-3" refType="h" refFor="ch" refForName="FiveNodes_2" fact="0.65"/>
+          <dgm:constr type="ctrY" for="ch" forName="FiveConn_2-3" refType="h" fact="0.395"/>
+          <dgm:constr type="l" for="ch" forName="FiveConn_2-3" refType="l" refFor="ch" refForName="FiveNodes_2"/>
+          <dgm:constr type="w" for="ch" forName="FiveConn_3-4" refType="h" refFor="ch" refForName="FiveNodes_3" fact="0.65"/>
+          <dgm:constr type="h" for="ch" forName="FiveConn_3-4" refType="h" refFor="ch" refForName="FiveNodes_3" fact="0.65"/>
+          <dgm:constr type="ctrY" for="ch" forName="FiveConn_3-4" refType="h" fact="0.597"/>
+          <dgm:constr type="l" for="ch" forName="FiveConn_3-4" refType="l" refFor="ch" refForName="FiveNodes_3"/>
+          <dgm:constr type="w" for="ch" forName="FiveConn_4-5" refType="h" refFor="ch" refForName="FiveNodes_4" fact="0.65"/>
+          <dgm:constr type="h" for="ch" forName="FiveConn_4-5" refType="h" refFor="ch" refForName="FiveNodes_4" fact="0.65"/>
+          <dgm:constr type="ctrY" for="ch" forName="FiveConn_4-5" refType="h" fact="0.804"/>
+          <dgm:constr type="l" for="ch" forName="FiveConn_4-5" refType="l" refFor="ch" refForName="FiveNodes_4"/>
+          <dgm:constr type="l" for="ch" forName="FiveNodes_1_text" refType="r" refFor="ch" refForName="FiveConn_1-2"/>
+          <dgm:constr type="lOff" for="ch" forName="FiveNodes_1_text" refType="w" refFor="ch" refForName="FiveConn_1-2" fact="0.73"/>
+          <dgm:constr type="t" for="ch" forName="FiveNodes_1_text" refType="t" refFor="ch" refForName="FiveNodes_1"/>
+          <dgm:constr type="b" for="ch" forName="FiveNodes_1_text" refType="b" refFor="ch" refForName="FiveNodes_1"/>
+          <dgm:constr type="r" for="ch" forName="FiveNodes_1_text" refType="r" refFor="ch" refForName="FiveNodes_1"/>
+          <dgm:constr type="l" for="ch" forName="FiveNodes_2_text" refType="r" refFor="ch" refForName="FiveConn_1-2"/>
+          <dgm:constr type="t" for="ch" forName="FiveNodes_2_text" refType="t" refFor="ch" refForName="FiveNodes_2"/>
+          <dgm:constr type="b" for="ch" forName="FiveNodes_2_text" refType="b" refFor="ch" refForName="FiveNodes_2"/>
+          <dgm:constr type="r" for="ch" forName="FiveNodes_2_text" refType="r" refFor="ch" refForName="FiveNodes_2"/>
+          <dgm:constr type="l" for="ch" forName="FiveNodes_3_text" refType="r" refFor="ch" refForName="FiveConn_2-3"/>
+          <dgm:constr type="t" for="ch" forName="FiveNodes_3_text" refType="t" refFor="ch" refForName="FiveNodes_3"/>
+          <dgm:constr type="b" for="ch" forName="FiveNodes_3_text" refType="b" refFor="ch" refForName="FiveNodes_3"/>
+          <dgm:constr type="r" for="ch" forName="FiveNodes_3_text" refType="r" refFor="ch" refForName="FiveNodes_3"/>
+          <dgm:constr type="l" for="ch" forName="FiveNodes_4_text" refType="r" refFor="ch" refForName="FiveConn_3-4"/>
+          <dgm:constr type="t" for="ch" forName="FiveNodes_4_text" refType="t" refFor="ch" refForName="FiveNodes_4"/>
+          <dgm:constr type="b" for="ch" forName="FiveNodes_4_text" refType="b" refFor="ch" refForName="FiveNodes_4"/>
+          <dgm:constr type="r" for="ch" forName="FiveNodes_4_text" refType="r" refFor="ch" refForName="FiveNodes_4"/>
+          <dgm:constr type="l" for="ch" forName="FiveNodes_5_text" refType="r" refFor="ch" refForName="FiveConn_4-5"/>
+          <dgm:constr type="t" for="ch" forName="FiveNodes_5_text" refType="t" refFor="ch" refForName="FiveNodes_5"/>
+          <dgm:constr type="b" for="ch" forName="FiveNodes_5_text" refType="b" refFor="ch" refForName="FiveNodes_5"/>
+          <dgm:constr type="r" for="ch" forName="FiveNodes_5_text" refType="r" refFor="ch" refForName="FiveNodes_5"/>
+        </dgm:constrLst>
+      </dgm:else>
+    </dgm:choose>
+    <dgm:ruleLst/>
+    <dgm:layoutNode name="dummyMaxCanvas">
+      <dgm:varLst/>
+      <dgm:alg type="sp"/>
+      <dgm:shape xmlns:r="http://schemas.openxmlformats.org/officeDocument/2006/relationships" r:blip="">
+        <dgm:adjLst/>
+      </dgm:shape>
+      <dgm:presOf/>
+      <dgm:constrLst/>
+      <dgm:ruleLst/>
+    </dgm:layoutNode>
+    <dgm:choose name="Name3">
+      <dgm:if name="Name4" axis="ch" ptType="node" func="cnt" op="equ" val="1">
+        <dgm:layoutNode name="OneNode_1">
+          <dgm:varLst>
+            <dgm:bulletEnabled val="1"/>
+          </dgm:varLst>
+          <dgm:alg type="tx"/>
+          <dgm:shape xmlns:r="http://schemas.openxmlformats.org/officeDocument/2006/relationships" type="roundRect" r:blip="">
+            <dgm:adjLst>
+              <dgm:adj idx="1" val="0.1"/>
+            </dgm:adjLst>
+          </dgm:shape>
+          <dgm:presOf axis="ch desOrSelf" ptType="node node" st="1 1" cnt="1 0"/>
+          <dgm:constrLst>
+            <dgm:constr type="lMarg" refType="primFontSz" fact="0.3"/>
+            <dgm:constr type="rMarg" refType="primFontSz" fact="0.3"/>
+            <dgm:constr type="tMarg" refType="primFontSz" fact="0.3"/>
+            <dgm:constr type="bMarg" refType="primFontSz" fact="0.3"/>
+          </dgm:constrLst>
+          <dgm:ruleLst>
+            <dgm:rule type="primFontSz" val="5" fact="NaN" max="NaN"/>
+          </dgm:ruleLst>
+        </dgm:layoutNode>
+      </dgm:if>
+      <dgm:else name="Name5">
+        <dgm:choose name="Name6">
+          <dgm:if name="Name7" axis="ch" ptType="node" func="cnt" op="equ" val="2">
+            <dgm:layoutNode name="TwoNodes_1">
+              <dgm:varLst>
+                <dgm:bulletEnabled val="1"/>
+              </dgm:varLst>
+              <dgm:alg type="sp"/>
+              <dgm:shape xmlns:r="http://schemas.openxmlformats.org/officeDocument/2006/relationships" type="roundRect" r:blip="">
+                <dgm:adjLst>
+                  <dgm:adj idx="1" val="0.1"/>
+                </dgm:adjLst>
+              </dgm:shape>
+              <dgm:presOf axis="ch desOrSelf" ptType="node node" st="1 1" cnt="1 0"/>
+              <dgm:constrLst/>
+              <dgm:ruleLst/>
+            </dgm:layoutNode>
+            <dgm:layoutNode name="TwoNodes_2">
+              <dgm:varLst>
+                <dgm:bulletEnabled val="1"/>
+              </dgm:varLst>
+              <dgm:alg type="sp"/>
+              <dgm:shape xmlns:r="http://schemas.openxmlformats.org/officeDocument/2006/relationships" type="roundRect" r:blip="">
+                <dgm:adjLst>
+                  <dgm:adj idx="1" val="0.1"/>
+                </dgm:adjLst>
+              </dgm:shape>
+              <dgm:presOf axis="ch desOrSelf" ptType="node node" st="2 1" cnt="1 0"/>
+              <dgm:constrLst/>
+              <dgm:ruleLst/>
+            </dgm:layoutNode>
+            <dgm:layoutNode name="TwoConn_1-2" styleLbl="fgAccFollowNode1">
+              <dgm:varLst>
+                <dgm:bulletEnabled val="1"/>
+              </dgm:varLst>
+              <dgm:alg type="tx"/>
+              <dgm:shape xmlns:r="http://schemas.openxmlformats.org/officeDocument/2006/relationships" type="downArrow" r:blip="">
+                <dgm:adjLst>
+                  <dgm:adj idx="1" val="0.55"/>
+                  <dgm:adj idx="2" val="0.45"/>
+                </dgm:adjLst>
+              </dgm:shape>
+              <dgm:presOf axis="ch" ptType="sibTrans" cnt="1"/>
+              <dgm:constrLst>
+                <dgm:constr type="lMarg" refType="primFontSz" fact="0.1"/>
+                <dgm:constr type="rMarg" refType="primFontSz" fact="0.1"/>
+                <dgm:constr type="tMarg" refType="primFontSz" fact="0.1"/>
+                <dgm:constr type="bMarg" refType="primFontSz" fact="0.1"/>
+              </dgm:constrLst>
+              <dgm:ruleLst>
+                <dgm:rule type="primFontSz" val="5" fact="NaN" max="NaN"/>
+              </dgm:ruleLst>
+            </dgm:layoutNode>
+            <dgm:layoutNode name="TwoNodes_1_text">
+              <dgm:varLst>
+                <dgm:bulletEnabled val="1"/>
+              </dgm:varLst>
+              <dgm:alg type="tx">
+                <dgm:param type="parTxLTRAlign" val="l"/>
+                <dgm:param type="txAnchorVertCh" val="mid"/>
+              </dgm:alg>
+              <dgm:shape xmlns:r="http://schemas.openxmlformats.org/officeDocument/2006/relationships" type="roundRect" r:blip="" hideGeom="1">
+                <dgm:adjLst>
+                  <dgm:adj idx="1" val="0.1"/>
+                </dgm:adjLst>
+              </dgm:shape>
+              <dgm:presOf axis="ch desOrSelf" ptType="node node" st="1 1" cnt="1 0"/>
+              <dgm:constrLst>
+                <dgm:constr type="lMarg" refType="primFontSz" fact="0.3"/>
+                <dgm:constr type="rMarg" refType="primFontSz" fact="0.3"/>
+                <dgm:constr type="tMarg" refType="primFontSz" fact="0.3"/>
+                <dgm:constr type="bMarg" refType="primFontSz" fact="0.3"/>
+              </dgm:constrLst>
+              <dgm:ruleLst>
+                <dgm:rule type="primFontSz" val="5" fact="NaN" max="NaN"/>
+              </dgm:ruleLst>
+            </dgm:layoutNode>
+            <dgm:layoutNode name="TwoNodes_2_text">
+              <dgm:varLst>
+                <dgm:bulletEnabled val="1"/>
+              </dgm:varLst>
+              <dgm:alg type="tx">
+                <dgm:param type="parTxLTRAlign" val="l"/>
+                <dgm:param type="txAnchorVertCh" val="mid"/>
+              </dgm:alg>
+              <dgm:shape xmlns:r="http://schemas.openxmlformats.org/officeDocument/2006/relationships" type="roundRect" r:blip="" hideGeom="1">
+                <dgm:adjLst>
+                  <dgm:adj idx="1" val="0.1"/>
+                </dgm:adjLst>
+              </dgm:shape>
+              <dgm:presOf axis="ch desOrSelf" ptType="node node" st="2 1" cnt="1 0"/>
+              <dgm:constrLst>
+                <dgm:constr type="lMarg" refType="primFontSz" fact="0.3"/>
+                <dgm:constr type="rMarg" refType="primFontSz" fact="0.3"/>
+                <dgm:constr type="tMarg" refType="primFontSz" fact="0.3"/>
+                <dgm:constr type="bMarg" refType="primFontSz" fact="0.3"/>
+              </dgm:constrLst>
+              <dgm:ruleLst>
+                <dgm:rule type="primFontSz" val="5" fact="NaN" max="NaN"/>
+              </dgm:ruleLst>
+            </dgm:layoutNode>
+          </dgm:if>
+          <dgm:else name="Name8">
+            <dgm:choose name="Name9">
+              <dgm:if name="Name10" axis="ch" ptType="node" func="cnt" op="equ" val="3">
+                <dgm:layoutNode name="ThreeNodes_1">
+                  <dgm:varLst>
+                    <dgm:bulletEnabled val="1"/>
+                  </dgm:varLst>
+                  <dgm:alg type="sp"/>
+                  <dgm:shape xmlns:r="http://schemas.openxmlformats.org/officeDocument/2006/relationships" type="roundRect" r:blip="">
+                    <dgm:adjLst>
+                      <dgm:adj idx="1" val="0.1"/>
+                    </dgm:adjLst>
+                  </dgm:shape>
+                  <dgm:presOf axis="ch desOrSelf" ptType="node node" st="1 1" cnt="1 0"/>
+                  <dgm:constrLst/>
+                  <dgm:ruleLst/>
+                </dgm:layoutNode>
+                <dgm:layoutNode name="ThreeNodes_2">
+                  <dgm:varLst>
+                    <dgm:bulletEnabled val="1"/>
+                  </dgm:varLst>
+                  <dgm:alg type="sp"/>
+                  <dgm:shape xmlns:r="http://schemas.openxmlformats.org/officeDocument/2006/relationships" type="roundRect" r:blip="">
+                    <dgm:adjLst>
+                      <dgm:adj idx="1" val="0.1"/>
+                    </dgm:adjLst>
+                  </dgm:shape>
+                  <dgm:presOf axis="ch desOrSelf" ptType="node node" st="2 1" cnt="1 0"/>
+                  <dgm:constrLst/>
+                  <dgm:ruleLst/>
+                </dgm:layoutNode>
+                <dgm:layoutNode name="ThreeNodes_3">
+                  <dgm:varLst>
+                    <dgm:bulletEnabled val="1"/>
+                  </dgm:varLst>
+                  <dgm:alg type="sp"/>
+                  <dgm:shape xmlns:r="http://schemas.openxmlformats.org/officeDocument/2006/relationships" type="roundRect" r:blip="">
+                    <dgm:adjLst>
+                      <dgm:adj idx="1" val="0.1"/>
+                    </dgm:adjLst>
+                  </dgm:shape>
+                  <dgm:presOf axis="ch desOrSelf" ptType="node node" st="3 1" cnt="1 0"/>
+                  <dgm:constrLst/>
+                  <dgm:ruleLst/>
+                </dgm:layoutNode>
+                <dgm:layoutNode name="ThreeConn_1-2" styleLbl="fgAccFollowNode1">
+                  <dgm:varLst>
+                    <dgm:bulletEnabled val="1"/>
+                  </dgm:varLst>
+                  <dgm:alg type="tx"/>
+                  <dgm:shape xmlns:r="http://schemas.openxmlformats.org/officeDocument/2006/relationships" type="downArrow" r:blip="">
+                    <dgm:adjLst>
+                      <dgm:adj idx="1" val="0.55"/>
+                      <dgm:adj idx="2" val="0.45"/>
+                    </dgm:adjLst>
+                  </dgm:shape>
+                  <dgm:presOf axis="ch" ptType="sibTrans" cnt="1"/>
+                  <dgm:constrLst>
+                    <dgm:constr type="lMarg" refType="primFontSz" fact="0.1"/>
+                    <dgm:constr type="rMarg" refType="primFontSz" fact="0.1"/>
+                    <dgm:constr type="tMarg" refType="primFontSz" fact="0.1"/>
+                    <dgm:constr type="bMarg" refType="primFontSz" fact="0.1"/>
+                  </dgm:constrLst>
+                  <dgm:ruleLst>
+                    <dgm:rule type="primFontSz" val="5" fact="NaN" max="NaN"/>
+                  </dgm:ruleLst>
+                </dgm:layoutNode>
+                <dgm:layoutNode name="ThreeConn_2-3" styleLbl="fgAccFollowNode1">
+                  <dgm:varLst>
+                    <dgm:bulletEnabled val="1"/>
+                  </dgm:varLst>
+                  <dgm:alg type="tx"/>
+                  <dgm:shape xmlns:r="http://schemas.openxmlformats.org/officeDocument/2006/relationships" type="downArrow" r:blip="">
+                    <dgm:adjLst>
+                      <dgm:adj idx="1" val="0.55"/>
+                      <dgm:adj idx="2" val="0.45"/>
+                    </dgm:adjLst>
+                  </dgm:shape>
+                  <dgm:presOf axis="ch" ptType="sibTrans" st="2" cnt="1"/>
+                  <dgm:constrLst>
+                    <dgm:constr type="lMarg" refType="primFontSz" fact="0.1"/>
+                    <dgm:constr type="rMarg" refType="primFontSz" fact="0.1"/>
+                    <dgm:constr type="tMarg" refType="primFontSz" fact="0.1"/>
+                    <dgm:constr type="bMarg" refType="primFontSz" fact="0.1"/>
+                  </dgm:constrLst>
+                  <dgm:ruleLst>
+                    <dgm:rule type="primFontSz" val="5" fact="NaN" max="NaN"/>
+                  </dgm:ruleLst>
+                </dgm:layoutNode>
+                <dgm:layoutNode name="ThreeNodes_1_text">
+                  <dgm:varLst>
+                    <dgm:bulletEnabled val="1"/>
+                  </dgm:varLst>
+                  <dgm:alg type="tx">
+                    <dgm:param type="parTxLTRAlign" val="l"/>
+                    <dgm:param type="txAnchorVertCh" val="mid"/>
+                  </dgm:alg>
+                  <dgm:shape xmlns:r="http://schemas.openxmlformats.org/officeDocument/2006/relationships" type="roundRect" r:blip="" hideGeom="1">
+                    <dgm:adjLst>
+                      <dgm:adj idx="1" val="0.1"/>
+                    </dgm:adjLst>
+                  </dgm:shape>
+                  <dgm:presOf axis="ch desOrSelf" ptType="node node" st="1 1" cnt="1 0"/>
+                  <dgm:constrLst>
+                    <dgm:constr type="lMarg" refType="primFontSz" fact="0.3"/>
+                    <dgm:constr type="rMarg" refType="primFontSz" fact="0.3"/>
+                    <dgm:constr type="tMarg" refType="primFontSz" fact="0.3"/>
+                    <dgm:constr type="bMarg" refType="primFontSz" fact="0.3"/>
+                  </dgm:constrLst>
+                  <dgm:ruleLst>
+                    <dgm:rule type="primFontSz" val="5" fact="NaN" max="NaN"/>
+                  </dgm:ruleLst>
+                </dgm:layoutNode>
+                <dgm:layoutNode name="ThreeNodes_2_text">
+                  <dgm:varLst>
+                    <dgm:bulletEnabled val="1"/>
+                  </dgm:varLst>
+                  <dgm:alg type="tx">
+                    <dgm:param type="parTxLTRAlign" val="l"/>
+                    <dgm:param type="txAnchorVertCh" val="mid"/>
+                  </dgm:alg>
+                  <dgm:shape xmlns:r="http://schemas.openxmlformats.org/officeDocument/2006/relationships" type="roundRect" r:blip="" hideGeom="1">
+                    <dgm:adjLst>
+                      <dgm:adj idx="1" val="0.1"/>
+                    </dgm:adjLst>
+                  </dgm:shape>
+                  <dgm:presOf axis="ch desOrSelf" ptType="node node" st="2 1" cnt="1 0"/>
+                  <dgm:constrLst>
+                    <dgm:constr type="lMarg" refType="primFontSz" fact="0.3"/>
+                    <dgm:constr type="rMarg" refType="primFontSz" fact="0.3"/>
+                    <dgm:constr type="tMarg" refType="primFontSz" fact="0.3"/>
+                    <dgm:constr type="bMarg" refType="primFontSz" fact="0.3"/>
+                  </dgm:constrLst>
+                  <dgm:ruleLst>
+                    <dgm:rule type="primFontSz" val="5" fact="NaN" max="NaN"/>
+                  </dgm:ruleLst>
+                </dgm:layoutNode>
+                <dgm:layoutNode name="ThreeNodes_3_text">
+                  <dgm:varLst>
+                    <dgm:bulletEnabled val="1"/>
+                  </dgm:varLst>
+                  <dgm:alg type="tx">
+                    <dgm:param type="parTxLTRAlign" val="l"/>
+                    <dgm:param type="txAnchorVertCh" val="mid"/>
+                  </dgm:alg>
+                  <dgm:shape xmlns:r="http://schemas.openxmlformats.org/officeDocument/2006/relationships" type="roundRect" r:blip="" hideGeom="1">
+                    <dgm:adjLst>
+                      <dgm:adj idx="1" val="0.1"/>
+                    </dgm:adjLst>
+                  </dgm:shape>
+                  <dgm:presOf axis="ch desOrSelf" ptType="node node" st="3 1" cnt="1 0"/>
+                  <dgm:constrLst>
+                    <dgm:constr type="lMarg" refType="primFontSz" fact="0.3"/>
+                    <dgm:constr type="rMarg" refType="primFontSz" fact="0.3"/>
+                    <dgm:constr type="tMarg" refType="primFontSz" fact="0.3"/>
+                    <dgm:constr type="bMarg" refType="primFontSz" fact="0.3"/>
+                  </dgm:constrLst>
+                  <dgm:ruleLst>
+                    <dgm:rule type="primFontSz" val="5" fact="NaN" max="NaN"/>
+                  </dgm:ruleLst>
+                </dgm:layoutNode>
+              </dgm:if>
+              <dgm:else name="Name11">
+                <dgm:choose name="Name12">
+                  <dgm:if name="Name13" axis="ch" ptType="node" func="cnt" op="equ" val="4">
+                    <dgm:layoutNode name="FourNodes_1">
+                      <dgm:varLst>
+                        <dgm:bulletEnabled val="1"/>
+                      </dgm:varLst>
+                      <dgm:alg type="sp"/>
+                      <dgm:shape xmlns:r="http://schemas.openxmlformats.org/officeDocument/2006/relationships" type="roundRect" r:blip="">
+                        <dgm:adjLst>
+                          <dgm:adj idx="1" val="0.1"/>
+                        </dgm:adjLst>
+                      </dgm:shape>
+                      <dgm:presOf axis="ch desOrSelf" ptType="node node" st="1 1" cnt="1 0"/>
+                      <dgm:constrLst/>
+                      <dgm:ruleLst/>
+                    </dgm:layoutNode>
+                    <dgm:layoutNode name="FourNodes_2">
+                      <dgm:varLst>
+                        <dgm:bulletEnabled val="1"/>
+                      </dgm:varLst>
+                      <dgm:alg type="sp"/>
+                      <dgm:shape xmlns:r="http://schemas.openxmlformats.org/officeDocument/2006/relationships" type="roundRect" r:blip="">
+                        <dgm:adjLst>
+                          <dgm:adj idx="1" val="0.1"/>
+                        </dgm:adjLst>
+                      </dgm:shape>
+                      <dgm:presOf axis="ch desOrSelf" ptType="node node" st="2 1" cnt="1 0"/>
+                      <dgm:constrLst/>
+                      <dgm:ruleLst/>
+                    </dgm:layoutNode>
+                    <dgm:layoutNode name="FourNodes_3">
+                      <dgm:varLst>
+                        <dgm:bulletEnabled val="1"/>
+                      </dgm:varLst>
+                      <dgm:alg type="sp"/>
+                      <dgm:shape xmlns:r="http://schemas.openxmlformats.org/officeDocument/2006/relationships" type="roundRect" r:blip="">
+                        <dgm:adjLst>
+                          <dgm:adj idx="1" val="0.1"/>
+                        </dgm:adjLst>
+                      </dgm:shape>
+                      <dgm:presOf axis="ch desOrSelf" ptType="node node" st="3 1" cnt="1 0"/>
+                      <dgm:constrLst/>
+                      <dgm:ruleLst/>
+                    </dgm:layoutNode>
+                    <dgm:layoutNode name="FourNodes_4">
+                      <dgm:varLst>
+                        <dgm:bulletEnabled val="1"/>
+                      </dgm:varLst>
+                      <dgm:alg type="sp"/>
+                      <dgm:shape xmlns:r="http://schemas.openxmlformats.org/officeDocument/2006/relationships" type="roundRect" r:blip="">
+                        <dgm:adjLst>
+                          <dgm:adj idx="1" val="0.1"/>
+                        </dgm:adjLst>
+                      </dgm:shape>
+                      <dgm:presOf axis="ch desOrSelf" ptType="node node" st="4 1" cnt="1 0"/>
+                      <dgm:constrLst/>
+                      <dgm:ruleLst/>
+                    </dgm:layoutNode>
+                    <dgm:layoutNode name="FourConn_1-2" styleLbl="fgAccFollowNode1">
+                      <dgm:varLst>
+                        <dgm:bulletEnabled val="1"/>
+                      </dgm:varLst>
+                      <dgm:alg type="tx"/>
+                      <dgm:shape xmlns:r="http://schemas.openxmlformats.org/officeDocument/2006/relationships" type="downArrow" r:blip="">
+                        <dgm:adjLst>
+                          <dgm:adj idx="1" val="0.55"/>
+                          <dgm:adj idx="2" val="0.45"/>
+                        </dgm:adjLst>
+                      </dgm:shape>
+                      <dgm:presOf axis="ch" ptType="sibTrans" cnt="1"/>
+                      <dgm:constrLst>
+                        <dgm:constr type="lMarg" refType="primFontSz" fact="0.1"/>
+                        <dgm:constr type="rMarg" refType="primFontSz" fact="0.1"/>
+                        <dgm:constr type="tMarg" refType="primFontSz" fact="0.1"/>
+                        <dgm:constr type="bMarg" refType="primFontSz" fact="0.1"/>
+                      </dgm:constrLst>
+                      <dgm:ruleLst>
+                        <dgm:rule type="primFontSz" val="5" fact="NaN" max="NaN"/>
+                      </dgm:ruleLst>
+                    </dgm:layoutNode>
+                    <dgm:layoutNode name="FourConn_2-3" styleLbl="fgAccFollowNode1">
+                      <dgm:varLst>
+                        <dgm:bulletEnabled val="1"/>
+                      </dgm:varLst>
+                      <dgm:alg type="tx"/>
+                      <dgm:shape xmlns:r="http://schemas.openxmlformats.org/officeDocument/2006/relationships" type="downArrow" r:blip="">
+                        <dgm:adjLst>
+                          <dgm:adj idx="1" val="0.55"/>
+                          <dgm:adj idx="2" val="0.45"/>
+                        </dgm:adjLst>
+                      </dgm:shape>
+                      <dgm:presOf axis="ch" ptType="sibTrans" st="2" cnt="1"/>
+                      <dgm:constrLst>
+                        <dgm:constr type="lMarg" refType="primFontSz" fact="0.1"/>
+                        <dgm:constr type="rMarg" refType="primFontSz" fact="0.1"/>
+                        <dgm:constr type="tMarg" refType="primFontSz" fact="0.1"/>
+                        <dgm:constr type="bMarg" refType="primFontSz" fact="0.1"/>
+                      </dgm:constrLst>
+                      <dgm:ruleLst>
+                        <dgm:rule type="primFontSz" val="5" fact="NaN" max="NaN"/>
+                      </dgm:ruleLst>
+                    </dgm:layoutNode>
+                    <dgm:layoutNode name="FourConn_3-4" styleLbl="fgAccFollowNode1">
+                      <dgm:varLst>
+                        <dgm:bulletEnabled val="1"/>
+                      </dgm:varLst>
+                      <dgm:alg type="tx"/>
+                      <dgm:shape xmlns:r="http://schemas.openxmlformats.org/officeDocument/2006/relationships" type="downArrow" r:blip="">
+                        <dgm:adjLst>
+                          <dgm:adj idx="1" val="0.55"/>
+                          <dgm:adj idx="2" val="0.45"/>
+                        </dgm:adjLst>
+                      </dgm:shape>
+                      <dgm:presOf axis="ch" ptType="sibTrans" st="3" cnt="1"/>
+                      <dgm:constrLst>
+                        <dgm:constr type="lMarg" refType="primFontSz" fact="0.1"/>
+                        <dgm:constr type="rMarg" refType="primFontSz" fact="0.1"/>
+                        <dgm:constr type="tMarg" refType="primFontSz" fact="0.1"/>
+                        <dgm:constr type="bMarg" refType="primFontSz" fact="0.1"/>
+                      </dgm:constrLst>
+                      <dgm:ruleLst>
+                        <dgm:rule type="primFontSz" val="5" fact="NaN" max="NaN"/>
+                      </dgm:ruleLst>
+                    </dgm:layoutNode>
+                    <dgm:layoutNode name="FourNodes_1_text">
+                      <dgm:varLst>
+                        <dgm:bulletEnabled val="1"/>
+                      </dgm:varLst>
+                      <dgm:alg type="tx">
+                        <dgm:param type="parTxLTRAlign" val="l"/>
+                        <dgm:param type="txAnchorVertCh" val="mid"/>
+                      </dgm:alg>
+                      <dgm:shape xmlns:r="http://schemas.openxmlformats.org/officeDocument/2006/relationships" type="roundRect" r:blip="" hideGeom="1">
+                        <dgm:adjLst>
+                          <dgm:adj idx="1" val="0.1"/>
+                        </dgm:adjLst>
+                      </dgm:shape>
+                      <dgm:presOf axis="ch desOrSelf" ptType="node node" st="1 1" cnt="1 0"/>
+                      <dgm:constrLst>
+                        <dgm:constr type="lMarg" refType="primFontSz" fact="0.3"/>
+                        <dgm:constr type="rMarg" refType="primFontSz" fact="0.3"/>
+                        <dgm:constr type="tMarg" refType="primFontSz" fact="0.3"/>
+                        <dgm:constr type="bMarg" refType="primFontSz" fact="0.3"/>
+                      </dgm:constrLst>
+                      <dgm:ruleLst>
+                        <dgm:rule type="primFontSz" val="5" fact="NaN" max="NaN"/>
+                      </dgm:ruleLst>
+                    </dgm:layoutNode>
+                    <dgm:layoutNode name="FourNodes_2_text">
+                      <dgm:varLst>
+                        <dgm:bulletEnabled val="1"/>
+                      </dgm:varLst>
+                      <dgm:alg type="tx">
+                        <dgm:param type="parTxLTRAlign" val="l"/>
+                        <dgm:param type="txAnchorVertCh" val="mid"/>
+                      </dgm:alg>
+                      <dgm:shape xmlns:r="http://schemas.openxmlformats.org/officeDocument/2006/relationships" type="roundRect" r:blip="" hideGeom="1">
+                        <dgm:adjLst>
+                          <dgm:adj idx="1" val="0.1"/>
+                        </dgm:adjLst>
+                      </dgm:shape>
+                      <dgm:presOf axis="ch desOrSelf" ptType="node node" st="2 1" cnt="1 0"/>
+                      <dgm:constrLst>
+                        <dgm:constr type="lMarg" refType="primFontSz" fact="0.3"/>
+                        <dgm:constr type="rMarg" refType="primFontSz" fact="0.3"/>
+                        <dgm:constr type="tMarg" refType="primFontSz" fact="0.3"/>
+                        <dgm:constr type="bMarg" refType="primFontSz" fact="0.3"/>
+                      </dgm:constrLst>
+                      <dgm:ruleLst>
+                        <dgm:rule type="primFontSz" val="5" fact="NaN" max="NaN"/>
+                      </dgm:ruleLst>
+                    </dgm:layoutNode>
+                    <dgm:layoutNode name="FourNodes_3_text">
+                      <dgm:varLst>
+                        <dgm:bulletEnabled val="1"/>
+                      </dgm:varLst>
+                      <dgm:alg type="tx">
+                        <dgm:param type="parTxLTRAlign" val="l"/>
+                        <dgm:param type="txAnchorVertCh" val="mid"/>
+                      </dgm:alg>
+                      <dgm:shape xmlns:r="http://schemas.openxmlformats.org/officeDocument/2006/relationships" type="roundRect" r:blip="" hideGeom="1">
+                        <dgm:adjLst>
+                          <dgm:adj idx="1" val="0.1"/>
+                        </dgm:adjLst>
+                      </dgm:shape>
+                      <dgm:presOf axis="ch desOrSelf" ptType="node node" st="3 1" cnt="1 0"/>
+                      <dgm:constrLst>
+                        <dgm:constr type="lMarg" refType="primFontSz" fact="0.3"/>
+                        <dgm:constr type="rMarg" refType="primFontSz" fact="0.3"/>
+                        <dgm:constr type="tMarg" refType="primFontSz" fact="0.3"/>
+                        <dgm:constr type="bMarg" refType="primFontSz" fact="0.3"/>
+                      </dgm:constrLst>
+                      <dgm:ruleLst>
+                        <dgm:rule type="primFontSz" val="5" fact="NaN" max="NaN"/>
+                      </dgm:ruleLst>
+                    </dgm:layoutNode>
+                    <dgm:layoutNode name="FourNodes_4_text">
+                      <dgm:varLst>
+                        <dgm:bulletEnabled val="1"/>
+                      </dgm:varLst>
+                      <dgm:alg type="tx">
+                        <dgm:param type="parTxLTRAlign" val="l"/>
+                        <dgm:param type="txAnchorVertCh" val="mid"/>
+                      </dgm:alg>
+                      <dgm:shape xmlns:r="http://schemas.openxmlformats.org/officeDocument/2006/relationships" type="roundRect" r:blip="" hideGeom="1">
+                        <dgm:adjLst>
+                          <dgm:adj idx="1" val="0.1"/>
+                        </dgm:adjLst>
+                      </dgm:shape>
+                      <dgm:presOf axis="ch desOrSelf" ptType="node node" st="4 1" cnt="1 0"/>
+                      <dgm:constrLst>
+                        <dgm:constr type="lMarg" refType="primFontSz" fact="0.3"/>
+                        <dgm:constr type="rMarg" refType="primFontSz" fact="0.3"/>
+                        <dgm:constr type="tMarg" refType="primFontSz" fact="0.3"/>
+                        <dgm:constr type="bMarg" refType="primFontSz" fact="0.3"/>
+                      </dgm:constrLst>
+                      <dgm:ruleLst>
+                        <dgm:rule type="primFontSz" val="5" fact="NaN" max="NaN"/>
+                      </dgm:ruleLst>
+                    </dgm:layoutNode>
+                  </dgm:if>
+                  <dgm:else name="Name14">
+                    <dgm:choose name="Name15">
+                      <dgm:if name="Name16" axis="ch" ptType="node" func="cnt" op="gte" val="5">
+                        <dgm:layoutNode name="FiveNodes_1">
+                          <dgm:varLst>
+                            <dgm:bulletEnabled val="1"/>
+                          </dgm:varLst>
+                          <dgm:alg type="sp"/>
+                          <dgm:shape xmlns:r="http://schemas.openxmlformats.org/officeDocument/2006/relationships" type="roundRect" r:blip="">
+                            <dgm:adjLst>
+                              <dgm:adj idx="1" val="0.1"/>
+                            </dgm:adjLst>
+                          </dgm:shape>
+                          <dgm:presOf axis="ch desOrSelf" ptType="node node" st="1 1" cnt="1 0"/>
+                          <dgm:constrLst/>
+                          <dgm:ruleLst/>
+                        </dgm:layoutNode>
+                        <dgm:layoutNode name="FiveNodes_2">
+                          <dgm:varLst>
+                            <dgm:bulletEnabled val="1"/>
+                          </dgm:varLst>
+                          <dgm:alg type="sp"/>
+                          <dgm:shape xmlns:r="http://schemas.openxmlformats.org/officeDocument/2006/relationships" type="roundRect" r:blip="">
+                            <dgm:adjLst>
+                              <dgm:adj idx="1" val="0.1"/>
+                            </dgm:adjLst>
+                          </dgm:shape>
+                          <dgm:presOf axis="ch desOrSelf" ptType="node node" st="2 1" cnt="1 0"/>
+                          <dgm:constrLst/>
+                          <dgm:ruleLst/>
+                        </dgm:layoutNode>
+                        <dgm:layoutNode name="FiveNodes_3">
+                          <dgm:varLst>
+                            <dgm:bulletEnabled val="1"/>
+                          </dgm:varLst>
+                          <dgm:alg type="sp"/>
+                          <dgm:shape xmlns:r="http://schemas.openxmlformats.org/officeDocument/2006/relationships" type="roundRect" r:blip="">
+                            <dgm:adjLst>
+                              <dgm:adj idx="1" val="0.1"/>
+                            </dgm:adjLst>
+                          </dgm:shape>
+                          <dgm:presOf axis="ch desOrSelf" ptType="node node" st="3 1" cnt="1 0"/>
+                          <dgm:constrLst/>
+                          <dgm:ruleLst/>
+                        </dgm:layoutNode>
+                        <dgm:layoutNode name="FiveNodes_4">
+                          <dgm:varLst>
+                            <dgm:bulletEnabled val="1"/>
+                          </dgm:varLst>
+                          <dgm:alg type="sp"/>
+                          <dgm:shape xmlns:r="http://schemas.openxmlformats.org/officeDocument/2006/relationships" type="roundRect" r:blip="">
+                            <dgm:adjLst>
+                              <dgm:adj idx="1" val="0.1"/>
+                            </dgm:adjLst>
+                          </dgm:shape>
+                          <dgm:presOf axis="ch desOrSelf" ptType="node node" st="4 1" cnt="1 0"/>
+                          <dgm:constrLst/>
+                          <dgm:ruleLst/>
+                        </dgm:layoutNode>
+                        <dgm:layoutNode name="FiveNodes_5">
+                          <dgm:varLst>
+                            <dgm:bulletEnabled val="1"/>
+                          </dgm:varLst>
+                          <dgm:alg type="sp"/>
+                          <dgm:shape xmlns:r="http://schemas.openxmlformats.org/officeDocument/2006/relationships" type="roundRect" r:blip="">
+                            <dgm:adjLst>
+                              <dgm:adj idx="1" val="0.1"/>
+                            </dgm:adjLst>
+                          </dgm:shape>
+                          <dgm:presOf axis="ch desOrSelf" ptType="node node" st="5 1" cnt="1 0"/>
+                          <dgm:constrLst/>
+                          <dgm:ruleLst/>
+                        </dgm:layoutNode>
+                        <dgm:layoutNode name="FiveConn_1-2" styleLbl="fgAccFollowNode1">
+                          <dgm:varLst>
+                            <dgm:bulletEnabled val="1"/>
+                          </dgm:varLst>
+                          <dgm:alg type="tx"/>
+                          <dgm:shape xmlns:r="http://schemas.openxmlformats.org/officeDocument/2006/relationships" type="downArrow" r:blip="">
+                            <dgm:adjLst>
+                              <dgm:adj idx="1" val="0.55"/>
+                              <dgm:adj idx="2" val="0.45"/>
+                            </dgm:adjLst>
+                          </dgm:shape>
+                          <dgm:presOf axis="ch" ptType="sibTrans" cnt="1"/>
+                          <dgm:constrLst>
+                            <dgm:constr type="lMarg" refType="primFontSz" fact="0.1"/>
+                            <dgm:constr type="rMarg" refType="primFontSz" fact="0.1"/>
+                            <dgm:constr type="tMarg" refType="primFontSz" fact="0.1"/>
+                            <dgm:constr type="bMarg" refType="primFontSz" fact="0.1"/>
+                          </dgm:constrLst>
+                          <dgm:ruleLst>
+                            <dgm:rule type="primFontSz" val="5" fact="NaN" max="NaN"/>
+                          </dgm:ruleLst>
+                        </dgm:layoutNode>
+                        <dgm:layoutNode name="FiveConn_2-3" styleLbl="fgAccFollowNode1">
+                          <dgm:varLst>
+                            <dgm:bulletEnabled val="1"/>
+                          </dgm:varLst>
+                          <dgm:alg type="tx"/>
+                          <dgm:shape xmlns:r="http://schemas.openxmlformats.org/officeDocument/2006/relationships" type="downArrow" r:blip="">
+                            <dgm:adjLst>
+                              <dgm:adj idx="1" val="0.55"/>
+                              <dgm:adj idx="2" val="0.45"/>
+                            </dgm:adjLst>
+                          </dgm:shape>
+                          <dgm:presOf axis="ch" ptType="sibTrans" st="2" cnt="1"/>
+                          <dgm:constrLst>
+                            <dgm:constr type="lMarg" refType="primFontSz" fact="0.1"/>
+                            <dgm:constr type="rMarg" refType="primFontSz" fact="0.1"/>
+                            <dgm:constr type="tMarg" refType="primFontSz" fact="0.1"/>
+                            <dgm:constr type="bMarg" refType="primFontSz" fact="0.1"/>
+                          </dgm:constrLst>
+                          <dgm:ruleLst>
+                            <dgm:rule type="primFontSz" val="5" fact="NaN" max="NaN"/>
+                          </dgm:ruleLst>
+                        </dgm:layoutNode>
+                        <dgm:layoutNode name="FiveConn_3-4" styleLbl="fgAccFollowNode1">
+                          <dgm:varLst>
+                            <dgm:bulletEnabled val="1"/>
+                          </dgm:varLst>
+                          <dgm:alg type="tx"/>
+                          <dgm:shape xmlns:r="http://schemas.openxmlformats.org/officeDocument/2006/relationships" type="downArrow" r:blip="">
+                            <dgm:adjLst>
+                              <dgm:adj idx="1" val="0.55"/>
+                              <dgm:adj idx="2" val="0.45"/>
+                            </dgm:adjLst>
+                          </dgm:shape>
+                          <dgm:presOf axis="ch" ptType="sibTrans" st="3" cnt="1"/>
+                          <dgm:constrLst>
+                            <dgm:constr type="lMarg" refType="primFontSz" fact="0.1"/>
+                            <dgm:constr type="rMarg" refType="primFontSz" fact="0.1"/>
+                            <dgm:constr type="tMarg" refType="primFontSz" fact="0.1"/>
+                            <dgm:constr type="bMarg" refType="primFontSz" fact="0.1"/>
+                          </dgm:constrLst>
+                          <dgm:ruleLst>
+                            <dgm:rule type="primFontSz" val="5" fact="NaN" max="NaN"/>
+                          </dgm:ruleLst>
+                        </dgm:layoutNode>
+                        <dgm:layoutNode name="FiveConn_4-5" styleLbl="fgAccFollowNode1">
+                          <dgm:varLst>
+                            <dgm:bulletEnabled val="1"/>
+                          </dgm:varLst>
+                          <dgm:alg type="tx"/>
+                          <dgm:shape xmlns:r="http://schemas.openxmlformats.org/officeDocument/2006/relationships" type="downArrow" r:blip="">
+                            <dgm:adjLst>
+                              <dgm:adj idx="1" val="0.55"/>
+                              <dgm:adj idx="2" val="0.45"/>
+                            </dgm:adjLst>
+                          </dgm:shape>
+                          <dgm:presOf axis="ch" ptType="sibTrans" st="4" cnt="1"/>
+                          <dgm:constrLst>
+                            <dgm:constr type="lMarg" refType="primFontSz" fact="0.1"/>
+                            <dgm:constr type="rMarg" refType="primFontSz" fact="0.1"/>
+                            <dgm:constr type="tMarg" refType="primFontSz" fact="0.1"/>
+                            <dgm:constr type="bMarg" refType="primFontSz" fact="0.1"/>
+                          </dgm:constrLst>
+                          <dgm:ruleLst>
+                            <dgm:rule type="primFontSz" val="5" fact="NaN" max="NaN"/>
+                          </dgm:ruleLst>
+                        </dgm:layoutNode>
+                        <dgm:layoutNode name="FiveNodes_1_text">
+                          <dgm:varLst>
+                            <dgm:bulletEnabled val="1"/>
+                          </dgm:varLst>
+                          <dgm:alg type="tx">
+                            <dgm:param type="parTxLTRAlign" val="l"/>
+                            <dgm:param type="txAnchorVertCh" val="mid"/>
+                          </dgm:alg>
+                          <dgm:shape xmlns:r="http://schemas.openxmlformats.org/officeDocument/2006/relationships" type="roundRect" r:blip="" hideGeom="1">
+                            <dgm:adjLst>
+                              <dgm:adj idx="1" val="0.1"/>
+                            </dgm:adjLst>
+                          </dgm:shape>
+                          <dgm:presOf axis="ch desOrSelf" ptType="node node" st="1 1" cnt="1 0"/>
+                          <dgm:constrLst>
+                            <dgm:constr type="lMarg" refType="primFontSz" fact="0.3"/>
+                            <dgm:constr type="rMarg" refType="primFontSz" fact="0.3"/>
+                            <dgm:constr type="tMarg" refType="primFontSz" fact="0.3"/>
+                            <dgm:constr type="bMarg" refType="primFontSz" fact="0.3"/>
+                          </dgm:constrLst>
+                          <dgm:ruleLst>
+                            <dgm:rule type="primFontSz" val="5" fact="NaN" max="NaN"/>
+                          </dgm:ruleLst>
+                        </dgm:layoutNode>
+                        <dgm:layoutNode name="FiveNodes_2_text">
+                          <dgm:varLst>
+                            <dgm:bulletEnabled val="1"/>
+                          </dgm:varLst>
+                          <dgm:alg type="tx">
+                            <dgm:param type="parTxLTRAlign" val="l"/>
+                            <dgm:param type="txAnchorVertCh" val="mid"/>
+                          </dgm:alg>
+                          <dgm:shape xmlns:r="http://schemas.openxmlformats.org/officeDocument/2006/relationships" type="roundRect" r:blip="" hideGeom="1">
+                            <dgm:adjLst>
+                              <dgm:adj idx="1" val="0.1"/>
+                            </dgm:adjLst>
+                          </dgm:shape>
+                          <dgm:presOf axis="ch desOrSelf" ptType="node node" st="2 1" cnt="1 0"/>
+                          <dgm:constrLst>
+                            <dgm:constr type="lMarg" refType="primFontSz" fact="0.3"/>
+                            <dgm:constr type="rMarg" refType="primFontSz" fact="0.3"/>
+                            <dgm:constr type="tMarg" refType="primFontSz" fact="0.3"/>
+                            <dgm:constr type="bMarg" refType="primFontSz" fact="0.3"/>
+                          </dgm:constrLst>
+                          <dgm:ruleLst>
+                            <dgm:rule type="primFontSz" val="5" fact="NaN" max="NaN"/>
+                          </dgm:ruleLst>
+                        </dgm:layoutNode>
+                        <dgm:layoutNode name="FiveNodes_3_text">
+                          <dgm:varLst>
+                            <dgm:bulletEnabled val="1"/>
+                          </dgm:varLst>
+                          <dgm:alg type="tx">
+                            <dgm:param type="parTxLTRAlign" val="l"/>
+                            <dgm:param type="txAnchorVertCh" val="mid"/>
+                          </dgm:alg>
+                          <dgm:shape xmlns:r="http://schemas.openxmlformats.org/officeDocument/2006/relationships" type="roundRect" r:blip="" hideGeom="1">
+                            <dgm:adjLst>
+                              <dgm:adj idx="1" val="0.1"/>
+                            </dgm:adjLst>
+                          </dgm:shape>
+                          <dgm:presOf axis="ch desOrSelf" ptType="node node" st="3 1" cnt="1 0"/>
+                          <dgm:constrLst>
+                            <dgm:constr type="lMarg" refType="primFontSz" fact="0.3"/>
+                            <dgm:constr type="rMarg" refType="primFontSz" fact="0.3"/>
+                            <dgm:constr type="tMarg" refType="primFontSz" fact="0.3"/>
+                            <dgm:constr type="bMarg" refType="primFontSz" fact="0.3"/>
+                          </dgm:constrLst>
+                          <dgm:ruleLst>
+                            <dgm:rule type="primFontSz" val="5" fact="NaN" max="NaN"/>
+                          </dgm:ruleLst>
+                        </dgm:layoutNode>
+                        <dgm:layoutNode name="FiveNodes_4_text">
+                          <dgm:varLst>
+                            <dgm:bulletEnabled val="1"/>
+                          </dgm:varLst>
+                          <dgm:alg type="tx">
+                            <dgm:param type="parTxLTRAlign" val="l"/>
+                            <dgm:param type="txAnchorVertCh" val="mid"/>
+                          </dgm:alg>
+                          <dgm:shape xmlns:r="http://schemas.openxmlformats.org/officeDocument/2006/relationships" type="roundRect" r:blip="" hideGeom="1">
+                            <dgm:adjLst>
+                              <dgm:adj idx="1" val="0.1"/>
+                            </dgm:adjLst>
+                          </dgm:shape>
+                          <dgm:presOf axis="ch desOrSelf" ptType="node node" st="4 1" cnt="1 0"/>
+                          <dgm:constrLst>
+                            <dgm:constr type="lMarg" refType="primFontSz" fact="0.3"/>
+                            <dgm:constr type="rMarg" refType="primFontSz" fact="0.3"/>
+                            <dgm:constr type="tMarg" refType="primFontSz" fact="0.3"/>
+                            <dgm:constr type="bMarg" refType="primFontSz" fact="0.3"/>
+                          </dgm:constrLst>
+                          <dgm:ruleLst>
+                            <dgm:rule type="primFontSz" val="5" fact="NaN" max="NaN"/>
+                          </dgm:ruleLst>
+                        </dgm:layoutNode>
+                        <dgm:layoutNode name="FiveNodes_5_text">
+                          <dgm:varLst>
+                            <dgm:bulletEnabled val="1"/>
+                          </dgm:varLst>
+                          <dgm:alg type="tx">
+                            <dgm:param type="parTxLTRAlign" val="l"/>
+                            <dgm:param type="txAnchorVertCh" val="mid"/>
+                          </dgm:alg>
+                          <dgm:shape xmlns:r="http://schemas.openxmlformats.org/officeDocument/2006/relationships" type="roundRect" r:blip="" hideGeom="1">
+                            <dgm:adjLst>
+                              <dgm:adj idx="1" val="0.1"/>
+                            </dgm:adjLst>
+                          </dgm:shape>
+                          <dgm:presOf axis="ch desOrSelf" ptType="node node" st="5 1" cnt="1 0"/>
+                          <dgm:constrLst>
+                            <dgm:constr type="lMarg" refType="primFontSz" fact="0.3"/>
+                            <dgm:constr type="rMarg" refType="primFontSz" fact="0.3"/>
+                            <dgm:constr type="tMarg" refType="primFontSz" fact="0.3"/>
+                            <dgm:constr type="bMarg" refType="primFontSz" fact="0.3"/>
+                          </dgm:constrLst>
+                          <dgm:ruleLst>
+                            <dgm:rule type="primFontSz" val="5" fact="NaN" max="NaN"/>
+                          </dgm:ruleLst>
+                        </dgm:layoutNode>
+                      </dgm:if>
+                      <dgm:else name="Name17"/>
+                    </dgm:choose>
+                  </dgm:else>
+                </dgm:choose>
+              </dgm:else>
+            </dgm:choose>
+          </dgm:else>
+        </dgm:choose>
+      </dgm:else>
+    </dgm:choose>
+  </dgm:layoutNode>
+</dgm:layoutDef>
+</file>
+
 <file path=ppt/diagrams/quickStyle1.xml><?xml version="1.0" encoding="utf-8"?>
 <dgm:styleDef xmlns:dgm="http://schemas.openxmlformats.org/drawingml/2006/diagram" xmlns:a="http://schemas.openxmlformats.org/drawingml/2006/main" uniqueId="urn:microsoft.com/office/officeart/2005/8/quickstyle/simple4">
   <dgm:title val=""/>
@@ -3239,6 +6123,1040 @@
         <a:scrgbClr r="0" g="0" b="0"/>
       </a:fillRef>
       <a:effectRef idx="2">
+        <a:scrgbClr r="0" g="0" b="0"/>
+      </a:effectRef>
+      <a:fontRef idx="minor"/>
+    </dgm:style>
+  </dgm:styleLbl>
+  <dgm:styleLbl name="revTx">
+    <dgm:scene3d>
+      <a:camera prst="orthographicFront"/>
+      <a:lightRig rig="threePt" dir="t"/>
+    </dgm:scene3d>
+    <dgm:sp3d/>
+    <dgm:txPr/>
+    <dgm:style>
+      <a:lnRef idx="0">
+        <a:scrgbClr r="0" g="0" b="0"/>
+      </a:lnRef>
+      <a:fillRef idx="0">
+        <a:scrgbClr r="0" g="0" b="0"/>
+      </a:fillRef>
+      <a:effectRef idx="0">
+        <a:scrgbClr r="0" g="0" b="0"/>
+      </a:effectRef>
+      <a:fontRef idx="minor"/>
+    </dgm:style>
+  </dgm:styleLbl>
+</dgm:styleDef>
+</file>
+
+<file path=ppt/diagrams/quickStyle2.xml><?xml version="1.0" encoding="utf-8"?>
+<dgm:styleDef xmlns:dgm="http://schemas.openxmlformats.org/drawingml/2006/diagram" xmlns:a="http://schemas.openxmlformats.org/drawingml/2006/main" uniqueId="urn:microsoft.com/office/officeart/2005/8/quickstyle/simple5">
+  <dgm:title val=""/>
+  <dgm:desc val=""/>
+  <dgm:catLst>
+    <dgm:cat type="simple" pri="10500"/>
+  </dgm:catLst>
+  <dgm:scene3d>
+    <a:camera prst="orthographicFront"/>
+    <a:lightRig rig="threePt" dir="t"/>
+  </dgm:scene3d>
+  <dgm:styleLbl name="node0">
+    <dgm:scene3d>
+      <a:camera prst="orthographicFront"/>
+      <a:lightRig rig="threePt" dir="t"/>
+    </dgm:scene3d>
+    <dgm:sp3d/>
+    <dgm:txPr/>
+    <dgm:style>
+      <a:lnRef idx="0">
+        <a:scrgbClr r="0" g="0" b="0"/>
+      </a:lnRef>
+      <a:fillRef idx="3">
+        <a:scrgbClr r="0" g="0" b="0"/>
+      </a:fillRef>
+      <a:effectRef idx="3">
+        <a:scrgbClr r="0" g="0" b="0"/>
+      </a:effectRef>
+      <a:fontRef idx="minor">
+        <a:schemeClr val="lt1"/>
+      </a:fontRef>
+    </dgm:style>
+  </dgm:styleLbl>
+  <dgm:styleLbl name="lnNode1">
+    <dgm:scene3d>
+      <a:camera prst="orthographicFront"/>
+      <a:lightRig rig="threePt" dir="t"/>
+    </dgm:scene3d>
+    <dgm:sp3d/>
+    <dgm:txPr/>
+    <dgm:style>
+      <a:lnRef idx="0">
+        <a:scrgbClr r="0" g="0" b="0"/>
+      </a:lnRef>
+      <a:fillRef idx="3">
+        <a:scrgbClr r="0" g="0" b="0"/>
+      </a:fillRef>
+      <a:effectRef idx="3">
+        <a:scrgbClr r="0" g="0" b="0"/>
+      </a:effectRef>
+      <a:fontRef idx="minor">
+        <a:schemeClr val="lt1"/>
+      </a:fontRef>
+    </dgm:style>
+  </dgm:styleLbl>
+  <dgm:styleLbl name="vennNode1">
+    <dgm:scene3d>
+      <a:camera prst="orthographicFront"/>
+      <a:lightRig rig="threePt" dir="t"/>
+    </dgm:scene3d>
+    <dgm:sp3d/>
+    <dgm:txPr/>
+    <dgm:style>
+      <a:lnRef idx="0">
+        <a:scrgbClr r="0" g="0" b="0"/>
+      </a:lnRef>
+      <a:fillRef idx="3">
+        <a:scrgbClr r="0" g="0" b="0"/>
+      </a:fillRef>
+      <a:effectRef idx="3">
+        <a:scrgbClr r="0" g="0" b="0"/>
+      </a:effectRef>
+      <a:fontRef idx="minor">
+        <a:schemeClr val="tx1"/>
+      </a:fontRef>
+    </dgm:style>
+  </dgm:styleLbl>
+  <dgm:styleLbl name="alignNode1">
+    <dgm:scene3d>
+      <a:camera prst="orthographicFront"/>
+      <a:lightRig rig="threePt" dir="t"/>
+    </dgm:scene3d>
+    <dgm:sp3d/>
+    <dgm:txPr/>
+    <dgm:style>
+      <a:lnRef idx="1">
+        <a:scrgbClr r="0" g="0" b="0"/>
+      </a:lnRef>
+      <a:fillRef idx="3">
+        <a:scrgbClr r="0" g="0" b="0"/>
+      </a:fillRef>
+      <a:effectRef idx="3">
+        <a:scrgbClr r="0" g="0" b="0"/>
+      </a:effectRef>
+      <a:fontRef idx="minor">
+        <a:schemeClr val="lt1"/>
+      </a:fontRef>
+    </dgm:style>
+  </dgm:styleLbl>
+  <dgm:styleLbl name="node1">
+    <dgm:scene3d>
+      <a:camera prst="orthographicFront"/>
+      <a:lightRig rig="threePt" dir="t"/>
+    </dgm:scene3d>
+    <dgm:sp3d/>
+    <dgm:txPr/>
+    <dgm:style>
+      <a:lnRef idx="0">
+        <a:scrgbClr r="0" g="0" b="0"/>
+      </a:lnRef>
+      <a:fillRef idx="3">
+        <a:scrgbClr r="0" g="0" b="0"/>
+      </a:fillRef>
+      <a:effectRef idx="3">
+        <a:scrgbClr r="0" g="0" b="0"/>
+      </a:effectRef>
+      <a:fontRef idx="minor">
+        <a:schemeClr val="lt1"/>
+      </a:fontRef>
+    </dgm:style>
+  </dgm:styleLbl>
+  <dgm:styleLbl name="node2">
+    <dgm:scene3d>
+      <a:camera prst="orthographicFront"/>
+      <a:lightRig rig="threePt" dir="t"/>
+    </dgm:scene3d>
+    <dgm:sp3d/>
+    <dgm:txPr/>
+    <dgm:style>
+      <a:lnRef idx="0">
+        <a:scrgbClr r="0" g="0" b="0"/>
+      </a:lnRef>
+      <a:fillRef idx="3">
+        <a:scrgbClr r="0" g="0" b="0"/>
+      </a:fillRef>
+      <a:effectRef idx="3">
+        <a:scrgbClr r="0" g="0" b="0"/>
+      </a:effectRef>
+      <a:fontRef idx="minor">
+        <a:schemeClr val="lt1"/>
+      </a:fontRef>
+    </dgm:style>
+  </dgm:styleLbl>
+  <dgm:styleLbl name="node3">
+    <dgm:scene3d>
+      <a:camera prst="orthographicFront"/>
+      <a:lightRig rig="threePt" dir="t"/>
+    </dgm:scene3d>
+    <dgm:sp3d/>
+    <dgm:txPr/>
+    <dgm:style>
+      <a:lnRef idx="0">
+        <a:scrgbClr r="0" g="0" b="0"/>
+      </a:lnRef>
+      <a:fillRef idx="3">
+        <a:scrgbClr r="0" g="0" b="0"/>
+      </a:fillRef>
+      <a:effectRef idx="3">
+        <a:scrgbClr r="0" g="0" b="0"/>
+      </a:effectRef>
+      <a:fontRef idx="minor">
+        <a:schemeClr val="lt1"/>
+      </a:fontRef>
+    </dgm:style>
+  </dgm:styleLbl>
+  <dgm:styleLbl name="node4">
+    <dgm:scene3d>
+      <a:camera prst="orthographicFront"/>
+      <a:lightRig rig="threePt" dir="t"/>
+    </dgm:scene3d>
+    <dgm:sp3d/>
+    <dgm:txPr/>
+    <dgm:style>
+      <a:lnRef idx="0">
+        <a:scrgbClr r="0" g="0" b="0"/>
+      </a:lnRef>
+      <a:fillRef idx="3">
+        <a:scrgbClr r="0" g="0" b="0"/>
+      </a:fillRef>
+      <a:effectRef idx="3">
+        <a:scrgbClr r="0" g="0" b="0"/>
+      </a:effectRef>
+      <a:fontRef idx="minor">
+        <a:schemeClr val="lt1"/>
+      </a:fontRef>
+    </dgm:style>
+  </dgm:styleLbl>
+  <dgm:styleLbl name="fgImgPlace1">
+    <dgm:scene3d>
+      <a:camera prst="orthographicFront"/>
+      <a:lightRig rig="threePt" dir="t"/>
+    </dgm:scene3d>
+    <dgm:sp3d/>
+    <dgm:txPr/>
+    <dgm:style>
+      <a:lnRef idx="0">
+        <a:scrgbClr r="0" g="0" b="0"/>
+      </a:lnRef>
+      <a:fillRef idx="1">
+        <a:scrgbClr r="0" g="0" b="0"/>
+      </a:fillRef>
+      <a:effectRef idx="3">
+        <a:scrgbClr r="0" g="0" b="0"/>
+      </a:effectRef>
+      <a:fontRef idx="minor"/>
+    </dgm:style>
+  </dgm:styleLbl>
+  <dgm:styleLbl name="alignImgPlace1">
+    <dgm:scene3d>
+      <a:camera prst="orthographicFront"/>
+      <a:lightRig rig="threePt" dir="t"/>
+    </dgm:scene3d>
+    <dgm:sp3d/>
+    <dgm:txPr/>
+    <dgm:style>
+      <a:lnRef idx="0">
+        <a:scrgbClr r="0" g="0" b="0"/>
+      </a:lnRef>
+      <a:fillRef idx="1">
+        <a:scrgbClr r="0" g="0" b="0"/>
+      </a:fillRef>
+      <a:effectRef idx="3">
+        <a:scrgbClr r="0" g="0" b="0"/>
+      </a:effectRef>
+      <a:fontRef idx="minor"/>
+    </dgm:style>
+  </dgm:styleLbl>
+  <dgm:styleLbl name="bgImgPlace1">
+    <dgm:scene3d>
+      <a:camera prst="orthographicFront"/>
+      <a:lightRig rig="threePt" dir="t"/>
+    </dgm:scene3d>
+    <dgm:sp3d/>
+    <dgm:txPr/>
+    <dgm:style>
+      <a:lnRef idx="0">
+        <a:scrgbClr r="0" g="0" b="0"/>
+      </a:lnRef>
+      <a:fillRef idx="1">
+        <a:scrgbClr r="0" g="0" b="0"/>
+      </a:fillRef>
+      <a:effectRef idx="3">
+        <a:scrgbClr r="0" g="0" b="0"/>
+      </a:effectRef>
+      <a:fontRef idx="minor"/>
+    </dgm:style>
+  </dgm:styleLbl>
+  <dgm:styleLbl name="sibTrans2D1">
+    <dgm:scene3d>
+      <a:camera prst="orthographicFront"/>
+      <a:lightRig rig="threePt" dir="t"/>
+    </dgm:scene3d>
+    <dgm:sp3d/>
+    <dgm:txPr/>
+    <dgm:style>
+      <a:lnRef idx="0">
+        <a:scrgbClr r="0" g="0" b="0"/>
+      </a:lnRef>
+      <a:fillRef idx="3">
+        <a:scrgbClr r="0" g="0" b="0"/>
+      </a:fillRef>
+      <a:effectRef idx="3">
+        <a:scrgbClr r="0" g="0" b="0"/>
+      </a:effectRef>
+      <a:fontRef idx="minor">
+        <a:schemeClr val="lt1"/>
+      </a:fontRef>
+    </dgm:style>
+  </dgm:styleLbl>
+  <dgm:styleLbl name="fgSibTrans2D1">
+    <dgm:scene3d>
+      <a:camera prst="orthographicFront"/>
+      <a:lightRig rig="threePt" dir="t"/>
+    </dgm:scene3d>
+    <dgm:sp3d/>
+    <dgm:txPr/>
+    <dgm:style>
+      <a:lnRef idx="0">
+        <a:scrgbClr r="0" g="0" b="0"/>
+      </a:lnRef>
+      <a:fillRef idx="3">
+        <a:scrgbClr r="0" g="0" b="0"/>
+      </a:fillRef>
+      <a:effectRef idx="3">
+        <a:scrgbClr r="0" g="0" b="0"/>
+      </a:effectRef>
+      <a:fontRef idx="minor">
+        <a:schemeClr val="lt1"/>
+      </a:fontRef>
+    </dgm:style>
+  </dgm:styleLbl>
+  <dgm:styleLbl name="bgSibTrans2D1">
+    <dgm:scene3d>
+      <a:camera prst="orthographicFront"/>
+      <a:lightRig rig="threePt" dir="t"/>
+    </dgm:scene3d>
+    <dgm:sp3d/>
+    <dgm:txPr/>
+    <dgm:style>
+      <a:lnRef idx="0">
+        <a:scrgbClr r="0" g="0" b="0"/>
+      </a:lnRef>
+      <a:fillRef idx="3">
+        <a:scrgbClr r="0" g="0" b="0"/>
+      </a:fillRef>
+      <a:effectRef idx="3">
+        <a:scrgbClr r="0" g="0" b="0"/>
+      </a:effectRef>
+      <a:fontRef idx="minor">
+        <a:schemeClr val="lt1"/>
+      </a:fontRef>
+    </dgm:style>
+  </dgm:styleLbl>
+  <dgm:styleLbl name="sibTrans1D1">
+    <dgm:scene3d>
+      <a:camera prst="orthographicFront"/>
+      <a:lightRig rig="threePt" dir="t"/>
+    </dgm:scene3d>
+    <dgm:sp3d/>
+    <dgm:txPr/>
+    <dgm:style>
+      <a:lnRef idx="1">
+        <a:scrgbClr r="0" g="0" b="0"/>
+      </a:lnRef>
+      <a:fillRef idx="0">
+        <a:scrgbClr r="0" g="0" b="0"/>
+      </a:fillRef>
+      <a:effectRef idx="0">
+        <a:scrgbClr r="0" g="0" b="0"/>
+      </a:effectRef>
+      <a:fontRef idx="minor"/>
+    </dgm:style>
+  </dgm:styleLbl>
+  <dgm:styleLbl name="callout">
+    <dgm:scene3d>
+      <a:camera prst="orthographicFront"/>
+      <a:lightRig rig="threePt" dir="t"/>
+    </dgm:scene3d>
+    <dgm:sp3d/>
+    <dgm:txPr/>
+    <dgm:style>
+      <a:lnRef idx="1">
+        <a:scrgbClr r="0" g="0" b="0"/>
+      </a:lnRef>
+      <a:fillRef idx="0">
+        <a:scrgbClr r="0" g="0" b="0"/>
+      </a:fillRef>
+      <a:effectRef idx="1">
+        <a:scrgbClr r="0" g="0" b="0"/>
+      </a:effectRef>
+      <a:fontRef idx="minor"/>
+    </dgm:style>
+  </dgm:styleLbl>
+  <dgm:styleLbl name="asst0">
+    <dgm:scene3d>
+      <a:camera prst="orthographicFront"/>
+      <a:lightRig rig="threePt" dir="t"/>
+    </dgm:scene3d>
+    <dgm:sp3d/>
+    <dgm:txPr/>
+    <dgm:style>
+      <a:lnRef idx="0">
+        <a:scrgbClr r="0" g="0" b="0"/>
+      </a:lnRef>
+      <a:fillRef idx="3">
+        <a:scrgbClr r="0" g="0" b="0"/>
+      </a:fillRef>
+      <a:effectRef idx="3">
+        <a:scrgbClr r="0" g="0" b="0"/>
+      </a:effectRef>
+      <a:fontRef idx="minor">
+        <a:schemeClr val="lt1"/>
+      </a:fontRef>
+    </dgm:style>
+  </dgm:styleLbl>
+  <dgm:styleLbl name="asst1">
+    <dgm:scene3d>
+      <a:camera prst="orthographicFront"/>
+      <a:lightRig rig="threePt" dir="t"/>
+    </dgm:scene3d>
+    <dgm:sp3d/>
+    <dgm:txPr/>
+    <dgm:style>
+      <a:lnRef idx="0">
+        <a:scrgbClr r="0" g="0" b="0"/>
+      </a:lnRef>
+      <a:fillRef idx="3">
+        <a:scrgbClr r="0" g="0" b="0"/>
+      </a:fillRef>
+      <a:effectRef idx="3">
+        <a:scrgbClr r="0" g="0" b="0"/>
+      </a:effectRef>
+      <a:fontRef idx="minor">
+        <a:schemeClr val="lt1"/>
+      </a:fontRef>
+    </dgm:style>
+  </dgm:styleLbl>
+  <dgm:styleLbl name="asst2">
+    <dgm:scene3d>
+      <a:camera prst="orthographicFront"/>
+      <a:lightRig rig="threePt" dir="t"/>
+    </dgm:scene3d>
+    <dgm:sp3d/>
+    <dgm:txPr/>
+    <dgm:style>
+      <a:lnRef idx="0">
+        <a:scrgbClr r="0" g="0" b="0"/>
+      </a:lnRef>
+      <a:fillRef idx="3">
+        <a:scrgbClr r="0" g="0" b="0"/>
+      </a:fillRef>
+      <a:effectRef idx="3">
+        <a:scrgbClr r="0" g="0" b="0"/>
+      </a:effectRef>
+      <a:fontRef idx="minor">
+        <a:schemeClr val="lt1"/>
+      </a:fontRef>
+    </dgm:style>
+  </dgm:styleLbl>
+  <dgm:styleLbl name="asst3">
+    <dgm:scene3d>
+      <a:camera prst="orthographicFront"/>
+      <a:lightRig rig="threePt" dir="t"/>
+    </dgm:scene3d>
+    <dgm:sp3d/>
+    <dgm:txPr/>
+    <dgm:style>
+      <a:lnRef idx="0">
+        <a:scrgbClr r="0" g="0" b="0"/>
+      </a:lnRef>
+      <a:fillRef idx="3">
+        <a:scrgbClr r="0" g="0" b="0"/>
+      </a:fillRef>
+      <a:effectRef idx="3">
+        <a:scrgbClr r="0" g="0" b="0"/>
+      </a:effectRef>
+      <a:fontRef idx="minor">
+        <a:schemeClr val="lt1"/>
+      </a:fontRef>
+    </dgm:style>
+  </dgm:styleLbl>
+  <dgm:styleLbl name="asst4">
+    <dgm:scene3d>
+      <a:camera prst="orthographicFront"/>
+      <a:lightRig rig="threePt" dir="t"/>
+    </dgm:scene3d>
+    <dgm:sp3d/>
+    <dgm:txPr/>
+    <dgm:style>
+      <a:lnRef idx="0">
+        <a:scrgbClr r="0" g="0" b="0"/>
+      </a:lnRef>
+      <a:fillRef idx="3">
+        <a:scrgbClr r="0" g="0" b="0"/>
+      </a:fillRef>
+      <a:effectRef idx="3">
+        <a:scrgbClr r="0" g="0" b="0"/>
+      </a:effectRef>
+      <a:fontRef idx="minor">
+        <a:schemeClr val="lt1"/>
+      </a:fontRef>
+    </dgm:style>
+  </dgm:styleLbl>
+  <dgm:styleLbl name="parChTrans2D1">
+    <dgm:scene3d>
+      <a:camera prst="orthographicFront"/>
+      <a:lightRig rig="threePt" dir="t"/>
+    </dgm:scene3d>
+    <dgm:sp3d/>
+    <dgm:txPr/>
+    <dgm:style>
+      <a:lnRef idx="0">
+        <a:scrgbClr r="0" g="0" b="0"/>
+      </a:lnRef>
+      <a:fillRef idx="3">
+        <a:scrgbClr r="0" g="0" b="0"/>
+      </a:fillRef>
+      <a:effectRef idx="3">
+        <a:scrgbClr r="0" g="0" b="0"/>
+      </a:effectRef>
+      <a:fontRef idx="minor">
+        <a:schemeClr val="lt1"/>
+      </a:fontRef>
+    </dgm:style>
+  </dgm:styleLbl>
+  <dgm:styleLbl name="parChTrans2D2">
+    <dgm:scene3d>
+      <a:camera prst="orthographicFront"/>
+      <a:lightRig rig="threePt" dir="t"/>
+    </dgm:scene3d>
+    <dgm:sp3d/>
+    <dgm:txPr/>
+    <dgm:style>
+      <a:lnRef idx="0">
+        <a:scrgbClr r="0" g="0" b="0"/>
+      </a:lnRef>
+      <a:fillRef idx="3">
+        <a:scrgbClr r="0" g="0" b="0"/>
+      </a:fillRef>
+      <a:effectRef idx="3">
+        <a:scrgbClr r="0" g="0" b="0"/>
+      </a:effectRef>
+      <a:fontRef idx="minor">
+        <a:schemeClr val="lt1"/>
+      </a:fontRef>
+    </dgm:style>
+  </dgm:styleLbl>
+  <dgm:styleLbl name="parChTrans2D3">
+    <dgm:scene3d>
+      <a:camera prst="orthographicFront"/>
+      <a:lightRig rig="threePt" dir="t"/>
+    </dgm:scene3d>
+    <dgm:sp3d/>
+    <dgm:txPr/>
+    <dgm:style>
+      <a:lnRef idx="0">
+        <a:scrgbClr r="0" g="0" b="0"/>
+      </a:lnRef>
+      <a:fillRef idx="3">
+        <a:scrgbClr r="0" g="0" b="0"/>
+      </a:fillRef>
+      <a:effectRef idx="3">
+        <a:scrgbClr r="0" g="0" b="0"/>
+      </a:effectRef>
+      <a:fontRef idx="minor">
+        <a:schemeClr val="lt1"/>
+      </a:fontRef>
+    </dgm:style>
+  </dgm:styleLbl>
+  <dgm:styleLbl name="parChTrans2D4">
+    <dgm:scene3d>
+      <a:camera prst="orthographicFront"/>
+      <a:lightRig rig="threePt" dir="t"/>
+    </dgm:scene3d>
+    <dgm:sp3d/>
+    <dgm:txPr/>
+    <dgm:style>
+      <a:lnRef idx="0">
+        <a:scrgbClr r="0" g="0" b="0"/>
+      </a:lnRef>
+      <a:fillRef idx="3">
+        <a:scrgbClr r="0" g="0" b="0"/>
+      </a:fillRef>
+      <a:effectRef idx="3">
+        <a:scrgbClr r="0" g="0" b="0"/>
+      </a:effectRef>
+      <a:fontRef idx="minor">
+        <a:schemeClr val="lt1"/>
+      </a:fontRef>
+    </dgm:style>
+  </dgm:styleLbl>
+  <dgm:styleLbl name="parChTrans1D1">
+    <dgm:scene3d>
+      <a:camera prst="orthographicFront"/>
+      <a:lightRig rig="threePt" dir="t"/>
+    </dgm:scene3d>
+    <dgm:sp3d/>
+    <dgm:txPr/>
+    <dgm:style>
+      <a:lnRef idx="2">
+        <a:scrgbClr r="0" g="0" b="0"/>
+      </a:lnRef>
+      <a:fillRef idx="0">
+        <a:scrgbClr r="0" g="0" b="0"/>
+      </a:fillRef>
+      <a:effectRef idx="0">
+        <a:scrgbClr r="0" g="0" b="0"/>
+      </a:effectRef>
+      <a:fontRef idx="minor"/>
+    </dgm:style>
+  </dgm:styleLbl>
+  <dgm:styleLbl name="parChTrans1D2">
+    <dgm:scene3d>
+      <a:camera prst="orthographicFront"/>
+      <a:lightRig rig="threePt" dir="t"/>
+    </dgm:scene3d>
+    <dgm:sp3d/>
+    <dgm:txPr/>
+    <dgm:style>
+      <a:lnRef idx="2">
+        <a:scrgbClr r="0" g="0" b="0"/>
+      </a:lnRef>
+      <a:fillRef idx="0">
+        <a:scrgbClr r="0" g="0" b="0"/>
+      </a:fillRef>
+      <a:effectRef idx="0">
+        <a:scrgbClr r="0" g="0" b="0"/>
+      </a:effectRef>
+      <a:fontRef idx="minor"/>
+    </dgm:style>
+  </dgm:styleLbl>
+  <dgm:styleLbl name="parChTrans1D3">
+    <dgm:scene3d>
+      <a:camera prst="orthographicFront"/>
+      <a:lightRig rig="threePt" dir="t"/>
+    </dgm:scene3d>
+    <dgm:sp3d/>
+    <dgm:txPr/>
+    <dgm:style>
+      <a:lnRef idx="2">
+        <a:scrgbClr r="0" g="0" b="0"/>
+      </a:lnRef>
+      <a:fillRef idx="0">
+        <a:scrgbClr r="0" g="0" b="0"/>
+      </a:fillRef>
+      <a:effectRef idx="0">
+        <a:scrgbClr r="0" g="0" b="0"/>
+      </a:effectRef>
+      <a:fontRef idx="minor"/>
+    </dgm:style>
+  </dgm:styleLbl>
+  <dgm:styleLbl name="parChTrans1D4">
+    <dgm:scene3d>
+      <a:camera prst="orthographicFront"/>
+      <a:lightRig rig="threePt" dir="t"/>
+    </dgm:scene3d>
+    <dgm:sp3d/>
+    <dgm:txPr/>
+    <dgm:style>
+      <a:lnRef idx="2">
+        <a:scrgbClr r="0" g="0" b="0"/>
+      </a:lnRef>
+      <a:fillRef idx="0">
+        <a:scrgbClr r="0" g="0" b="0"/>
+      </a:fillRef>
+      <a:effectRef idx="0">
+        <a:scrgbClr r="0" g="0" b="0"/>
+      </a:effectRef>
+      <a:fontRef idx="minor"/>
+    </dgm:style>
+  </dgm:styleLbl>
+  <dgm:styleLbl name="fgAcc1">
+    <dgm:scene3d>
+      <a:camera prst="orthographicFront"/>
+      <a:lightRig rig="threePt" dir="t"/>
+    </dgm:scene3d>
+    <dgm:sp3d/>
+    <dgm:txPr/>
+    <dgm:style>
+      <a:lnRef idx="1">
+        <a:scrgbClr r="0" g="0" b="0"/>
+      </a:lnRef>
+      <a:fillRef idx="1">
+        <a:scrgbClr r="0" g="0" b="0"/>
+      </a:fillRef>
+      <a:effectRef idx="2">
+        <a:scrgbClr r="0" g="0" b="0"/>
+      </a:effectRef>
+      <a:fontRef idx="minor"/>
+    </dgm:style>
+  </dgm:styleLbl>
+  <dgm:styleLbl name="conFgAcc1">
+    <dgm:scene3d>
+      <a:camera prst="orthographicFront"/>
+      <a:lightRig rig="threePt" dir="t"/>
+    </dgm:scene3d>
+    <dgm:sp3d/>
+    <dgm:txPr/>
+    <dgm:style>
+      <a:lnRef idx="1">
+        <a:scrgbClr r="0" g="0" b="0"/>
+      </a:lnRef>
+      <a:fillRef idx="1">
+        <a:scrgbClr r="0" g="0" b="0"/>
+      </a:fillRef>
+      <a:effectRef idx="2">
+        <a:scrgbClr r="0" g="0" b="0"/>
+      </a:effectRef>
+      <a:fontRef idx="minor"/>
+    </dgm:style>
+  </dgm:styleLbl>
+  <dgm:styleLbl name="alignAcc1">
+    <dgm:scene3d>
+      <a:camera prst="orthographicFront"/>
+      <a:lightRig rig="threePt" dir="t"/>
+    </dgm:scene3d>
+    <dgm:sp3d/>
+    <dgm:txPr/>
+    <dgm:style>
+      <a:lnRef idx="1">
+        <a:scrgbClr r="0" g="0" b="0"/>
+      </a:lnRef>
+      <a:fillRef idx="1">
+        <a:scrgbClr r="0" g="0" b="0"/>
+      </a:fillRef>
+      <a:effectRef idx="2">
+        <a:scrgbClr r="0" g="0" b="0"/>
+      </a:effectRef>
+      <a:fontRef idx="minor"/>
+    </dgm:style>
+  </dgm:styleLbl>
+  <dgm:styleLbl name="trAlignAcc1">
+    <dgm:scene3d>
+      <a:camera prst="orthographicFront"/>
+      <a:lightRig rig="threePt" dir="t"/>
+    </dgm:scene3d>
+    <dgm:sp3d/>
+    <dgm:txPr/>
+    <dgm:style>
+      <a:lnRef idx="1">
+        <a:scrgbClr r="0" g="0" b="0"/>
+      </a:lnRef>
+      <a:fillRef idx="1">
+        <a:scrgbClr r="0" g="0" b="0"/>
+      </a:fillRef>
+      <a:effectRef idx="0">
+        <a:scrgbClr r="0" g="0" b="0"/>
+      </a:effectRef>
+      <a:fontRef idx="minor"/>
+    </dgm:style>
+  </dgm:styleLbl>
+  <dgm:styleLbl name="bgAcc1">
+    <dgm:scene3d>
+      <a:camera prst="orthographicFront"/>
+      <a:lightRig rig="threePt" dir="t"/>
+    </dgm:scene3d>
+    <dgm:sp3d/>
+    <dgm:txPr/>
+    <dgm:style>
+      <a:lnRef idx="1">
+        <a:scrgbClr r="0" g="0" b="0"/>
+      </a:lnRef>
+      <a:fillRef idx="1">
+        <a:scrgbClr r="0" g="0" b="0"/>
+      </a:fillRef>
+      <a:effectRef idx="2">
+        <a:scrgbClr r="0" g="0" b="0"/>
+      </a:effectRef>
+      <a:fontRef idx="minor"/>
+    </dgm:style>
+  </dgm:styleLbl>
+  <dgm:styleLbl name="solidFgAcc1">
+    <dgm:scene3d>
+      <a:camera prst="orthographicFront"/>
+      <a:lightRig rig="threePt" dir="t"/>
+    </dgm:scene3d>
+    <dgm:sp3d/>
+    <dgm:txPr/>
+    <dgm:style>
+      <a:lnRef idx="1">
+        <a:scrgbClr r="0" g="0" b="0"/>
+      </a:lnRef>
+      <a:fillRef idx="1">
+        <a:scrgbClr r="0" g="0" b="0"/>
+      </a:fillRef>
+      <a:effectRef idx="2">
+        <a:scrgbClr r="0" g="0" b="0"/>
+      </a:effectRef>
+      <a:fontRef idx="minor"/>
+    </dgm:style>
+  </dgm:styleLbl>
+  <dgm:styleLbl name="solidAlignAcc1">
+    <dgm:scene3d>
+      <a:camera prst="orthographicFront"/>
+      <a:lightRig rig="threePt" dir="t"/>
+    </dgm:scene3d>
+    <dgm:sp3d/>
+    <dgm:txPr/>
+    <dgm:style>
+      <a:lnRef idx="1">
+        <a:scrgbClr r="0" g="0" b="0"/>
+      </a:lnRef>
+      <a:fillRef idx="1">
+        <a:scrgbClr r="0" g="0" b="0"/>
+      </a:fillRef>
+      <a:effectRef idx="3">
+        <a:scrgbClr r="0" g="0" b="0"/>
+      </a:effectRef>
+      <a:fontRef idx="minor"/>
+    </dgm:style>
+  </dgm:styleLbl>
+  <dgm:styleLbl name="solidBgAcc1">
+    <dgm:scene3d>
+      <a:camera prst="orthographicFront"/>
+      <a:lightRig rig="threePt" dir="t"/>
+    </dgm:scene3d>
+    <dgm:sp3d/>
+    <dgm:txPr/>
+    <dgm:style>
+      <a:lnRef idx="1">
+        <a:scrgbClr r="0" g="0" b="0"/>
+      </a:lnRef>
+      <a:fillRef idx="1">
+        <a:scrgbClr r="0" g="0" b="0"/>
+      </a:fillRef>
+      <a:effectRef idx="3">
+        <a:scrgbClr r="0" g="0" b="0"/>
+      </a:effectRef>
+      <a:fontRef idx="minor"/>
+    </dgm:style>
+  </dgm:styleLbl>
+  <dgm:styleLbl name="fgAccFollowNode1">
+    <dgm:scene3d>
+      <a:camera prst="orthographicFront"/>
+      <a:lightRig rig="threePt" dir="t"/>
+    </dgm:scene3d>
+    <dgm:sp3d/>
+    <dgm:txPr/>
+    <dgm:style>
+      <a:lnRef idx="1">
+        <a:scrgbClr r="0" g="0" b="0"/>
+      </a:lnRef>
+      <a:fillRef idx="1">
+        <a:scrgbClr r="0" g="0" b="0"/>
+      </a:fillRef>
+      <a:effectRef idx="2">
+        <a:scrgbClr r="0" g="0" b="0"/>
+      </a:effectRef>
+      <a:fontRef idx="minor"/>
+    </dgm:style>
+  </dgm:styleLbl>
+  <dgm:styleLbl name="alignAccFollowNode1">
+    <dgm:scene3d>
+      <a:camera prst="orthographicFront"/>
+      <a:lightRig rig="threePt" dir="t"/>
+    </dgm:scene3d>
+    <dgm:sp3d/>
+    <dgm:txPr/>
+    <dgm:style>
+      <a:lnRef idx="1">
+        <a:scrgbClr r="0" g="0" b="0"/>
+      </a:lnRef>
+      <a:fillRef idx="1">
+        <a:scrgbClr r="0" g="0" b="0"/>
+      </a:fillRef>
+      <a:effectRef idx="2">
+        <a:scrgbClr r="0" g="0" b="0"/>
+      </a:effectRef>
+      <a:fontRef idx="minor"/>
+    </dgm:style>
+  </dgm:styleLbl>
+  <dgm:styleLbl name="bgAccFollowNode1">
+    <dgm:scene3d>
+      <a:camera prst="orthographicFront"/>
+      <a:lightRig rig="threePt" dir="t"/>
+    </dgm:scene3d>
+    <dgm:sp3d/>
+    <dgm:txPr/>
+    <dgm:style>
+      <a:lnRef idx="1">
+        <a:scrgbClr r="0" g="0" b="0"/>
+      </a:lnRef>
+      <a:fillRef idx="1">
+        <a:scrgbClr r="0" g="0" b="0"/>
+      </a:fillRef>
+      <a:effectRef idx="2">
+        <a:scrgbClr r="0" g="0" b="0"/>
+      </a:effectRef>
+      <a:fontRef idx="minor"/>
+    </dgm:style>
+  </dgm:styleLbl>
+  <dgm:styleLbl name="fgAcc0">
+    <dgm:scene3d>
+      <a:camera prst="orthographicFront"/>
+      <a:lightRig rig="threePt" dir="t"/>
+    </dgm:scene3d>
+    <dgm:sp3d/>
+    <dgm:txPr/>
+    <dgm:style>
+      <a:lnRef idx="1">
+        <a:scrgbClr r="0" g="0" b="0"/>
+      </a:lnRef>
+      <a:fillRef idx="1">
+        <a:scrgbClr r="0" g="0" b="0"/>
+      </a:fillRef>
+      <a:effectRef idx="2">
+        <a:scrgbClr r="0" g="0" b="0"/>
+      </a:effectRef>
+      <a:fontRef idx="minor"/>
+    </dgm:style>
+  </dgm:styleLbl>
+  <dgm:styleLbl name="fgAcc2">
+    <dgm:scene3d>
+      <a:camera prst="orthographicFront"/>
+      <a:lightRig rig="threePt" dir="t"/>
+    </dgm:scene3d>
+    <dgm:sp3d/>
+    <dgm:txPr/>
+    <dgm:style>
+      <a:lnRef idx="1">
+        <a:scrgbClr r="0" g="0" b="0"/>
+      </a:lnRef>
+      <a:fillRef idx="1">
+        <a:scrgbClr r="0" g="0" b="0"/>
+      </a:fillRef>
+      <a:effectRef idx="2">
+        <a:scrgbClr r="0" g="0" b="0"/>
+      </a:effectRef>
+      <a:fontRef idx="minor"/>
+    </dgm:style>
+  </dgm:styleLbl>
+  <dgm:styleLbl name="fgAcc3">
+    <dgm:scene3d>
+      <a:camera prst="orthographicFront"/>
+      <a:lightRig rig="threePt" dir="t"/>
+    </dgm:scene3d>
+    <dgm:sp3d/>
+    <dgm:txPr/>
+    <dgm:style>
+      <a:lnRef idx="1">
+        <a:scrgbClr r="0" g="0" b="0"/>
+      </a:lnRef>
+      <a:fillRef idx="1">
+        <a:scrgbClr r="0" g="0" b="0"/>
+      </a:fillRef>
+      <a:effectRef idx="2">
+        <a:scrgbClr r="0" g="0" b="0"/>
+      </a:effectRef>
+      <a:fontRef idx="minor"/>
+    </dgm:style>
+  </dgm:styleLbl>
+  <dgm:styleLbl name="fgAcc4">
+    <dgm:scene3d>
+      <a:camera prst="orthographicFront"/>
+      <a:lightRig rig="threePt" dir="t"/>
+    </dgm:scene3d>
+    <dgm:sp3d/>
+    <dgm:txPr/>
+    <dgm:style>
+      <a:lnRef idx="1">
+        <a:scrgbClr r="0" g="0" b="0"/>
+      </a:lnRef>
+      <a:fillRef idx="1">
+        <a:scrgbClr r="0" g="0" b="0"/>
+      </a:fillRef>
+      <a:effectRef idx="2">
+        <a:scrgbClr r="0" g="0" b="0"/>
+      </a:effectRef>
+      <a:fontRef idx="minor"/>
+    </dgm:style>
+  </dgm:styleLbl>
+  <dgm:styleLbl name="bgShp">
+    <dgm:scene3d>
+      <a:camera prst="orthographicFront"/>
+      <a:lightRig rig="threePt" dir="t"/>
+    </dgm:scene3d>
+    <dgm:sp3d/>
+    <dgm:txPr/>
+    <dgm:style>
+      <a:lnRef idx="0">
+        <a:scrgbClr r="0" g="0" b="0"/>
+      </a:lnRef>
+      <a:fillRef idx="1">
+        <a:scrgbClr r="0" g="0" b="0"/>
+      </a:fillRef>
+      <a:effectRef idx="2">
+        <a:scrgbClr r="0" g="0" b="0"/>
+      </a:effectRef>
+      <a:fontRef idx="minor"/>
+    </dgm:style>
+  </dgm:styleLbl>
+  <dgm:styleLbl name="dkBgShp">
+    <dgm:scene3d>
+      <a:camera prst="orthographicFront"/>
+      <a:lightRig rig="threePt" dir="t"/>
+    </dgm:scene3d>
+    <dgm:sp3d/>
+    <dgm:txPr/>
+    <dgm:style>
+      <a:lnRef idx="0">
+        <a:scrgbClr r="0" g="0" b="0"/>
+      </a:lnRef>
+      <a:fillRef idx="1">
+        <a:scrgbClr r="0" g="0" b="0"/>
+      </a:fillRef>
+      <a:effectRef idx="3">
+        <a:scrgbClr r="0" g="0" b="0"/>
+      </a:effectRef>
+      <a:fontRef idx="minor"/>
+    </dgm:style>
+  </dgm:styleLbl>
+  <dgm:styleLbl name="trBgShp">
+    <dgm:scene3d>
+      <a:camera prst="orthographicFront"/>
+      <a:lightRig rig="threePt" dir="t"/>
+    </dgm:scene3d>
+    <dgm:sp3d/>
+    <dgm:txPr/>
+    <dgm:style>
+      <a:lnRef idx="0">
+        <a:scrgbClr r="0" g="0" b="0"/>
+      </a:lnRef>
+      <a:fillRef idx="1">
+        <a:scrgbClr r="0" g="0" b="0"/>
+      </a:fillRef>
+      <a:effectRef idx="0">
+        <a:scrgbClr r="0" g="0" b="0"/>
+      </a:effectRef>
+      <a:fontRef idx="minor"/>
+    </dgm:style>
+  </dgm:styleLbl>
+  <dgm:styleLbl name="fgShp">
+    <dgm:scene3d>
+      <a:camera prst="orthographicFront"/>
+      <a:lightRig rig="threePt" dir="t"/>
+    </dgm:scene3d>
+    <dgm:sp3d/>
+    <dgm:txPr/>
+    <dgm:style>
+      <a:lnRef idx="0">
+        <a:scrgbClr r="0" g="0" b="0"/>
+      </a:lnRef>
+      <a:fillRef idx="3">
+        <a:scrgbClr r="0" g="0" b="0"/>
+      </a:fillRef>
+      <a:effectRef idx="3">
         <a:scrgbClr r="0" g="0" b="0"/>
       </a:effectRef>
       <a:fontRef idx="minor"/>
@@ -3463,7 +7381,7 @@
           <a:p>
             <a:fld id="{ECD19FB2-3AAB-4D03-B13A-2960828C78E3}" type="datetimeFigureOut">
               <a:rPr lang="en-US" dirty="0"/>
-              <a:t>7/31/2021</a:t>
+              <a:t>8/1/2021</a:t>
             </a:fld>
             <a:endParaRPr lang="en-US" dirty="0"/>
           </a:p>
@@ -3740,7 +7658,7 @@
           <a:p>
             <a:fld id="{1B80C674-7DFC-42FE-B9CD-82963CDB1557}" type="datetimeFigureOut">
               <a:rPr lang="en-US" dirty="0"/>
-              <a:t>7/31/2021</a:t>
+              <a:t>8/1/2021</a:t>
             </a:fld>
             <a:endParaRPr lang="en-US" dirty="0"/>
           </a:p>
@@ -3927,7 +7845,7 @@
           <a:p>
             <a:fld id="{2076456F-F47D-4F25-8053-2A695DA0CA7D}" type="datetimeFigureOut">
               <a:rPr lang="en-US" dirty="0"/>
-              <a:t>7/31/2021</a:t>
+              <a:t>8/1/2021</a:t>
             </a:fld>
             <a:endParaRPr lang="en-US" dirty="0"/>
           </a:p>
@@ -4183,7 +8101,7 @@
           <a:p>
             <a:fld id="{5D6C7379-69CC-4837-9905-BEBA22830C8A}" type="datetimeFigureOut">
               <a:rPr lang="en-US" dirty="0"/>
-              <a:t>7/31/2021</a:t>
+              <a:t>8/1/2021</a:t>
             </a:fld>
             <a:endParaRPr lang="en-US" dirty="0"/>
           </a:p>
@@ -4604,7 +8522,7 @@
           <a:p>
             <a:fld id="{49EB8B7E-8AEE-4F10-BFEE-C999AD004D36}" type="datetimeFigureOut">
               <a:rPr lang="en-US" dirty="0"/>
-              <a:t>7/31/2021</a:t>
+              <a:t>8/1/2021</a:t>
             </a:fld>
             <a:endParaRPr lang="en-US" dirty="0"/>
           </a:p>
@@ -5145,7 +9063,7 @@
           <a:p>
             <a:fld id="{8668F3F9-58BC-440B-B37B-805B9055EF92}" type="datetimeFigureOut">
               <a:rPr lang="en-US" dirty="0"/>
-              <a:t>7/31/2021</a:t>
+              <a:t>8/1/2021</a:t>
             </a:fld>
             <a:endParaRPr lang="en-US" dirty="0"/>
           </a:p>
@@ -5971,7 +9889,7 @@
           <a:p>
             <a:fld id="{0D5A53AF-48EA-489D-8260-9DCAB666386A}" type="datetimeFigureOut">
               <a:rPr lang="en-US" dirty="0"/>
-              <a:t>7/31/2021</a:t>
+              <a:t>8/1/2021</a:t>
             </a:fld>
             <a:endParaRPr lang="en-US" dirty="0"/>
           </a:p>
@@ -6136,7 +10054,7 @@
           <a:p>
             <a:fld id="{0DED02AE-B9A4-47BD-AF8E-97E16144138B}" type="datetimeFigureOut">
               <a:rPr lang="en-US" dirty="0"/>
-              <a:t>7/31/2021</a:t>
+              <a:t>8/1/2021</a:t>
             </a:fld>
             <a:endParaRPr lang="en-US" dirty="0"/>
           </a:p>
@@ -6311,7 +10229,7 @@
           <a:p>
             <a:fld id="{CF0FD78B-DB02-4362-BCDC-98A55456977C}" type="datetimeFigureOut">
               <a:rPr lang="en-US" dirty="0"/>
-              <a:t>7/31/2021</a:t>
+              <a:t>8/1/2021</a:t>
             </a:fld>
             <a:endParaRPr lang="en-US" dirty="0"/>
           </a:p>
@@ -6476,7 +10394,7 @@
           <a:p>
             <a:fld id="{99916976-5D93-46E4-A98A-FAD63E4D0EA8}" type="datetimeFigureOut">
               <a:rPr lang="en-US" dirty="0"/>
-              <a:t>7/31/2021</a:t>
+              <a:t>8/1/2021</a:t>
             </a:fld>
             <a:endParaRPr lang="en-US" dirty="0"/>
           </a:p>
@@ -6728,7 +10646,7 @@
           <a:p>
             <a:fld id="{0F39F4F5-F4D2-4D2A-AB60-88D37ADCB869}" type="datetimeFigureOut">
               <a:rPr lang="en-US" dirty="0"/>
-              <a:t>7/31/2021</a:t>
+              <a:t>8/1/2021</a:t>
             </a:fld>
             <a:endParaRPr lang="en-US" dirty="0"/>
           </a:p>
@@ -6955,7 +10873,7 @@
           <a:p>
             <a:fld id="{D23BC6CE-6D1E-47E5-8859-F31AC5380EB2}" type="datetimeFigureOut">
               <a:rPr lang="en-US" dirty="0"/>
-              <a:t>7/31/2021</a:t>
+              <a:t>8/1/2021</a:t>
             </a:fld>
             <a:endParaRPr lang="en-US" dirty="0"/>
           </a:p>
@@ -7343,7 +11261,7 @@
           <a:p>
             <a:fld id="{B1B4E7C4-4DA4-404D-9965-B13F2DD7D8BF}" type="datetimeFigureOut">
               <a:rPr lang="en-US" dirty="0"/>
-              <a:t>7/31/2021</a:t>
+              <a:t>8/1/2021</a:t>
             </a:fld>
             <a:endParaRPr lang="en-US" dirty="0"/>
           </a:p>
@@ -7456,7 +11374,7 @@
           <a:p>
             <a:fld id="{476FB7AA-4A53-424F-AD41-70827B6504BA}" type="datetimeFigureOut">
               <a:rPr lang="en-US" dirty="0"/>
-              <a:t>7/31/2021</a:t>
+              <a:t>8/1/2021</a:t>
             </a:fld>
             <a:endParaRPr lang="en-US" dirty="0"/>
           </a:p>
@@ -7546,7 +11464,7 @@
           <a:p>
             <a:fld id="{E7884882-FB12-4BC8-9960-9AD8104D7FAE}" type="datetimeFigureOut">
               <a:rPr lang="en-US" dirty="0"/>
-              <a:t>7/31/2021</a:t>
+              <a:t>8/1/2021</a:t>
             </a:fld>
             <a:endParaRPr lang="en-US" dirty="0"/>
           </a:p>
@@ -7814,7 +11732,7 @@
           <a:p>
             <a:fld id="{F7D1BD23-6E54-4D9D-AD88-A2813C73CC25}" type="datetimeFigureOut">
               <a:rPr lang="en-US" dirty="0"/>
-              <a:t>7/31/2021</a:t>
+              <a:t>8/1/2021</a:t>
             </a:fld>
             <a:endParaRPr lang="en-US" dirty="0"/>
           </a:p>
@@ -8090,7 +12008,7 @@
           <a:p>
             <a:fld id="{1471A834-4F3C-4AF9-9C74-05EC35A0F292}" type="datetimeFigureOut">
               <a:rPr lang="en-US" dirty="0"/>
-              <a:t>7/31/2021</a:t>
+              <a:t>8/1/2021</a:t>
             </a:fld>
             <a:endParaRPr lang="en-US" dirty="0"/>
           </a:p>
@@ -8325,7 +12243,7 @@
           <a:p>
             <a:fld id="{51CF1133-3259-4C45-BABA-5B62D9C6F78D}" type="datetimeFigureOut">
               <a:rPr lang="en-US" dirty="0"/>
-              <a:t>7/31/2021</a:t>
+              <a:t>8/1/2021</a:t>
             </a:fld>
             <a:endParaRPr lang="en-US" dirty="0"/>
           </a:p>
@@ -9241,6 +13159,172 @@
 </p:sld>
 </file>
 
+<file path=ppt/slides/slide10.xml><?xml version="1.0" encoding="utf-8"?>
+<p:sld xmlns:a="http://schemas.openxmlformats.org/drawingml/2006/main" xmlns:r="http://schemas.openxmlformats.org/officeDocument/2006/relationships" xmlns:p="http://schemas.openxmlformats.org/presentationml/2006/main">
+  <p:cSld>
+    <p:spTree>
+      <p:nvGrpSpPr>
+        <p:cNvPr id="1" name=""/>
+        <p:cNvGrpSpPr/>
+        <p:nvPr/>
+      </p:nvGrpSpPr>
+      <p:grpSpPr>
+        <a:xfrm>
+          <a:off x="0" y="0"/>
+          <a:ext cx="0" cy="0"/>
+          <a:chOff x="0" y="0"/>
+          <a:chExt cx="0" cy="0"/>
+        </a:xfrm>
+      </p:grpSpPr>
+      <p:sp>
+        <p:nvSpPr>
+          <p:cNvPr id="2" name="Title 1">
+            <a:extLst>
+              <a:ext uri="{FF2B5EF4-FFF2-40B4-BE49-F238E27FC236}">
+                <a16:creationId xmlns:a16="http://schemas.microsoft.com/office/drawing/2014/main" id="{7FD46AC0-DF8A-4540-8DF3-3F33343FF468}"/>
+              </a:ext>
+            </a:extLst>
+          </p:cNvPr>
+          <p:cNvSpPr>
+            <a:spLocks noGrp="1"/>
+          </p:cNvSpPr>
+          <p:nvPr>
+            <p:ph type="title"/>
+          </p:nvPr>
+        </p:nvSpPr>
+        <p:spPr/>
+        <p:txBody>
+          <a:bodyPr/>
+          <a:lstStyle/>
+          <a:p>
+            <a:r>
+              <a:rPr lang="en-US" dirty="0"/>
+              <a:t>Shark Types</a:t>
+            </a:r>
+          </a:p>
+        </p:txBody>
+      </p:sp>
+      <p:sp>
+        <p:nvSpPr>
+          <p:cNvPr id="3" name="Content Placeholder 2">
+            <a:extLst>
+              <a:ext uri="{FF2B5EF4-FFF2-40B4-BE49-F238E27FC236}">
+                <a16:creationId xmlns:a16="http://schemas.microsoft.com/office/drawing/2014/main" id="{E26AEC00-AC22-4ECA-B9F3-2A639DB70FEC}"/>
+              </a:ext>
+            </a:extLst>
+          </p:cNvPr>
+          <p:cNvSpPr>
+            <a:spLocks noGrp="1"/>
+          </p:cNvSpPr>
+          <p:nvPr>
+            <p:ph idx="1"/>
+          </p:nvPr>
+        </p:nvSpPr>
+        <p:spPr/>
+        <p:txBody>
+          <a:bodyPr/>
+          <a:lstStyle/>
+          <a:p>
+            <a:endParaRPr lang="en-US"/>
+          </a:p>
+        </p:txBody>
+      </p:sp>
+    </p:spTree>
+    <p:extLst>
+      <p:ext uri="{BB962C8B-B14F-4D97-AF65-F5344CB8AC3E}">
+        <p14:creationId xmlns:p14="http://schemas.microsoft.com/office/powerpoint/2010/main" val="3759120689"/>
+      </p:ext>
+    </p:extLst>
+  </p:cSld>
+  <p:clrMapOvr>
+    <a:masterClrMapping/>
+  </p:clrMapOvr>
+</p:sld>
+</file>
+
+<file path=ppt/slides/slide11.xml><?xml version="1.0" encoding="utf-8"?>
+<p:sld xmlns:a="http://schemas.openxmlformats.org/drawingml/2006/main" xmlns:r="http://schemas.openxmlformats.org/officeDocument/2006/relationships" xmlns:p="http://schemas.openxmlformats.org/presentationml/2006/main">
+  <p:cSld>
+    <p:spTree>
+      <p:nvGrpSpPr>
+        <p:cNvPr id="1" name=""/>
+        <p:cNvGrpSpPr/>
+        <p:nvPr/>
+      </p:nvGrpSpPr>
+      <p:grpSpPr>
+        <a:xfrm>
+          <a:off x="0" y="0"/>
+          <a:ext cx="0" cy="0"/>
+          <a:chOff x="0" y="0"/>
+          <a:chExt cx="0" cy="0"/>
+        </a:xfrm>
+      </p:grpSpPr>
+      <p:sp>
+        <p:nvSpPr>
+          <p:cNvPr id="2" name="Title 1">
+            <a:extLst>
+              <a:ext uri="{FF2B5EF4-FFF2-40B4-BE49-F238E27FC236}">
+                <a16:creationId xmlns:a16="http://schemas.microsoft.com/office/drawing/2014/main" id="{D14BF098-963A-4820-B9E5-5B3FB8EF4081}"/>
+              </a:ext>
+            </a:extLst>
+          </p:cNvPr>
+          <p:cNvSpPr>
+            <a:spLocks noGrp="1"/>
+          </p:cNvSpPr>
+          <p:nvPr>
+            <p:ph type="title"/>
+          </p:nvPr>
+        </p:nvSpPr>
+        <p:spPr/>
+        <p:txBody>
+          <a:bodyPr/>
+          <a:lstStyle/>
+          <a:p>
+            <a:r>
+              <a:rPr lang="en-US" dirty="0"/>
+              <a:t>Weather</a:t>
+            </a:r>
+          </a:p>
+        </p:txBody>
+      </p:sp>
+      <p:sp>
+        <p:nvSpPr>
+          <p:cNvPr id="3" name="Content Placeholder 2">
+            <a:extLst>
+              <a:ext uri="{FF2B5EF4-FFF2-40B4-BE49-F238E27FC236}">
+                <a16:creationId xmlns:a16="http://schemas.microsoft.com/office/drawing/2014/main" id="{99973DBA-F8FD-4DA5-A5AF-FDC5469BF136}"/>
+              </a:ext>
+            </a:extLst>
+          </p:cNvPr>
+          <p:cNvSpPr>
+            <a:spLocks noGrp="1"/>
+          </p:cNvSpPr>
+          <p:nvPr>
+            <p:ph idx="1"/>
+          </p:nvPr>
+        </p:nvSpPr>
+        <p:spPr/>
+        <p:txBody>
+          <a:bodyPr/>
+          <a:lstStyle/>
+          <a:p>
+            <a:endParaRPr lang="en-US"/>
+          </a:p>
+        </p:txBody>
+      </p:sp>
+    </p:spTree>
+    <p:extLst>
+      <p:ext uri="{BB962C8B-B14F-4D97-AF65-F5344CB8AC3E}">
+        <p14:creationId xmlns:p14="http://schemas.microsoft.com/office/powerpoint/2010/main" val="143478653"/>
+      </p:ext>
+    </p:extLst>
+  </p:cSld>
+  <p:clrMapOvr>
+    <a:masterClrMapping/>
+  </p:clrMapOvr>
+</p:sld>
+</file>
+
 <file path=ppt/slides/slide2.xml><?xml version="1.0" encoding="utf-8"?>
 <p:sld xmlns:a="http://schemas.openxmlformats.org/drawingml/2006/main" xmlns:r="http://schemas.openxmlformats.org/officeDocument/2006/relationships" xmlns:p="http://schemas.openxmlformats.org/presentationml/2006/main">
   <p:cSld>
@@ -9497,6 +13581,120 @@
 <file path=ppt/slides/slide3.xml><?xml version="1.0" encoding="utf-8"?>
 <p:sld xmlns:a="http://schemas.openxmlformats.org/drawingml/2006/main" xmlns:r="http://schemas.openxmlformats.org/officeDocument/2006/relationships" xmlns:p="http://schemas.openxmlformats.org/presentationml/2006/main">
   <p:cSld>
+    <p:bg>
+      <p:bgPr>
+        <a:blipFill dpi="0" rotWithShape="1">
+          <a:blip r:embed="rId2">
+            <a:lum/>
+          </a:blip>
+          <a:srcRect/>
+          <a:stretch>
+            <a:fillRect/>
+          </a:stretch>
+        </a:blipFill>
+        <a:effectLst/>
+      </p:bgPr>
+    </p:bg>
+    <p:spTree>
+      <p:nvGrpSpPr>
+        <p:cNvPr id="1" name=""/>
+        <p:cNvGrpSpPr/>
+        <p:nvPr/>
+      </p:nvGrpSpPr>
+      <p:grpSpPr>
+        <a:xfrm>
+          <a:off x="0" y="0"/>
+          <a:ext cx="0" cy="0"/>
+          <a:chOff x="0" y="0"/>
+          <a:chExt cx="0" cy="0"/>
+        </a:xfrm>
+      </p:grpSpPr>
+      <p:sp>
+        <p:nvSpPr>
+          <p:cNvPr id="2" name="Title 1">
+            <a:extLst>
+              <a:ext uri="{FF2B5EF4-FFF2-40B4-BE49-F238E27FC236}">
+                <a16:creationId xmlns:a16="http://schemas.microsoft.com/office/drawing/2014/main" id="{30566A63-2DC8-41A3-9943-E284E59976C7}"/>
+              </a:ext>
+            </a:extLst>
+          </p:cNvPr>
+          <p:cNvSpPr>
+            <a:spLocks noGrp="1"/>
+          </p:cNvSpPr>
+          <p:nvPr>
+            <p:ph type="title"/>
+          </p:nvPr>
+        </p:nvSpPr>
+        <p:spPr>
+          <a:xfrm>
+            <a:off x="838200" y="365125"/>
+            <a:ext cx="10515600" cy="1325563"/>
+          </a:xfrm>
+        </p:spPr>
+        <p:txBody>
+          <a:bodyPr>
+            <a:normAutofit/>
+          </a:bodyPr>
+          <a:lstStyle/>
+          <a:p>
+            <a:r>
+              <a:rPr lang="en-US">
+                <a:solidFill>
+                  <a:schemeClr val="tx1"/>
+                </a:solidFill>
+              </a:rPr>
+              <a:t>Cleansing the Data</a:t>
+            </a:r>
+          </a:p>
+        </p:txBody>
+      </p:sp>
+      <p:graphicFrame>
+        <p:nvGraphicFramePr>
+          <p:cNvPr id="5" name="Content Placeholder 2">
+            <a:extLst>
+              <a:ext uri="{FF2B5EF4-FFF2-40B4-BE49-F238E27FC236}">
+                <a16:creationId xmlns:a16="http://schemas.microsoft.com/office/drawing/2014/main" id="{117F7194-934E-4E51-A3CC-1751FE3A989F}"/>
+              </a:ext>
+            </a:extLst>
+          </p:cNvPr>
+          <p:cNvGraphicFramePr>
+            <a:graphicFrameLocks noGrp="1"/>
+          </p:cNvGraphicFramePr>
+          <p:nvPr>
+            <p:ph idx="1"/>
+            <p:extLst>
+              <p:ext uri="{D42A27DB-BD31-4B8C-83A1-F6EECF244321}">
+                <p14:modId xmlns:p14="http://schemas.microsoft.com/office/powerpoint/2010/main" val="3507571495"/>
+              </p:ext>
+            </p:extLst>
+          </p:nvPr>
+        </p:nvGraphicFramePr>
+        <p:xfrm>
+          <a:off x="979488" y="1825625"/>
+          <a:ext cx="10233025" cy="4351338"/>
+        </p:xfrm>
+        <a:graphic>
+          <a:graphicData uri="http://schemas.openxmlformats.org/drawingml/2006/diagram">
+            <dgm:relIds xmlns:dgm="http://schemas.openxmlformats.org/drawingml/2006/diagram" xmlns:r="http://schemas.openxmlformats.org/officeDocument/2006/relationships" r:dm="rId3" r:lo="rId4" r:qs="rId5" r:cs="rId6"/>
+          </a:graphicData>
+        </a:graphic>
+      </p:graphicFrame>
+    </p:spTree>
+    <p:extLst>
+      <p:ext uri="{BB962C8B-B14F-4D97-AF65-F5344CB8AC3E}">
+        <p14:creationId xmlns:p14="http://schemas.microsoft.com/office/powerpoint/2010/main" val="3979823225"/>
+      </p:ext>
+    </p:extLst>
+  </p:cSld>
+  <p:clrMapOvr>
+    <a:masterClrMapping/>
+  </p:clrMapOvr>
+</p:sld>
+</file>
+
+<file path=ppt/slides/slide4.xml><?xml version="1.0" encoding="utf-8"?>
+<p:sld xmlns:a="http://schemas.openxmlformats.org/drawingml/2006/main" xmlns:r="http://schemas.openxmlformats.org/officeDocument/2006/relationships" xmlns:p="http://schemas.openxmlformats.org/presentationml/2006/main">
+  <p:cSld>
     <p:spTree>
       <p:nvGrpSpPr>
         <p:cNvPr id="1" name=""/>
@@ -9567,7 +13765,7 @@
     </p:spTree>
     <p:extLst>
       <p:ext uri="{BB962C8B-B14F-4D97-AF65-F5344CB8AC3E}">
-        <p14:creationId xmlns:p14="http://schemas.microsoft.com/office/powerpoint/2010/main" val="3979823225"/>
+        <p14:creationId xmlns:p14="http://schemas.microsoft.com/office/powerpoint/2010/main" val="777779433"/>
       </p:ext>
     </p:extLst>
   </p:cSld>
@@ -9577,7 +13775,90 @@
 </p:sld>
 </file>
 
-<file path=ppt/slides/slide4.xml><?xml version="1.0" encoding="utf-8"?>
+<file path=ppt/slides/slide5.xml><?xml version="1.0" encoding="utf-8"?>
+<p:sld xmlns:a="http://schemas.openxmlformats.org/drawingml/2006/main" xmlns:r="http://schemas.openxmlformats.org/officeDocument/2006/relationships" xmlns:p="http://schemas.openxmlformats.org/presentationml/2006/main">
+  <p:cSld>
+    <p:spTree>
+      <p:nvGrpSpPr>
+        <p:cNvPr id="1" name=""/>
+        <p:cNvGrpSpPr/>
+        <p:nvPr/>
+      </p:nvGrpSpPr>
+      <p:grpSpPr>
+        <a:xfrm>
+          <a:off x="0" y="0"/>
+          <a:ext cx="0" cy="0"/>
+          <a:chOff x="0" y="0"/>
+          <a:chExt cx="0" cy="0"/>
+        </a:xfrm>
+      </p:grpSpPr>
+      <p:sp>
+        <p:nvSpPr>
+          <p:cNvPr id="2" name="Title 1">
+            <a:extLst>
+              <a:ext uri="{FF2B5EF4-FFF2-40B4-BE49-F238E27FC236}">
+                <a16:creationId xmlns:a16="http://schemas.microsoft.com/office/drawing/2014/main" id="{30566A63-2DC8-41A3-9943-E284E59976C7}"/>
+              </a:ext>
+            </a:extLst>
+          </p:cNvPr>
+          <p:cNvSpPr>
+            <a:spLocks noGrp="1"/>
+          </p:cNvSpPr>
+          <p:nvPr>
+            <p:ph type="title"/>
+          </p:nvPr>
+        </p:nvSpPr>
+        <p:spPr/>
+        <p:txBody>
+          <a:bodyPr/>
+          <a:lstStyle/>
+          <a:p>
+            <a:r>
+              <a:rPr lang="en-US" dirty="0"/>
+              <a:t>Location </a:t>
+            </a:r>
+          </a:p>
+        </p:txBody>
+      </p:sp>
+      <p:sp>
+        <p:nvSpPr>
+          <p:cNvPr id="3" name="Content Placeholder 2">
+            <a:extLst>
+              <a:ext uri="{FF2B5EF4-FFF2-40B4-BE49-F238E27FC236}">
+                <a16:creationId xmlns:a16="http://schemas.microsoft.com/office/drawing/2014/main" id="{3CF170D7-BFAF-4A4E-A945-4956C27AE002}"/>
+              </a:ext>
+            </a:extLst>
+          </p:cNvPr>
+          <p:cNvSpPr>
+            <a:spLocks noGrp="1"/>
+          </p:cNvSpPr>
+          <p:nvPr>
+            <p:ph idx="1"/>
+          </p:nvPr>
+        </p:nvSpPr>
+        <p:spPr/>
+        <p:txBody>
+          <a:bodyPr/>
+          <a:lstStyle/>
+          <a:p>
+            <a:endParaRPr lang="en-US"/>
+          </a:p>
+        </p:txBody>
+      </p:sp>
+    </p:spTree>
+    <p:extLst>
+      <p:ext uri="{BB962C8B-B14F-4D97-AF65-F5344CB8AC3E}">
+        <p14:creationId xmlns:p14="http://schemas.microsoft.com/office/powerpoint/2010/main" val="2729291996"/>
+      </p:ext>
+    </p:extLst>
+  </p:cSld>
+  <p:clrMapOvr>
+    <a:masterClrMapping/>
+  </p:clrMapOvr>
+</p:sld>
+</file>
+
+<file path=ppt/slides/slide6.xml><?xml version="1.0" encoding="utf-8"?>
 <p:sld xmlns:a="http://schemas.openxmlformats.org/drawingml/2006/main" xmlns:r="http://schemas.openxmlformats.org/officeDocument/2006/relationships" xmlns:p="http://schemas.openxmlformats.org/presentationml/2006/main">
   <p:cSld>
     <p:spTree>
@@ -9643,7 +13924,68 @@
           <a:bodyPr/>
           <a:lstStyle/>
           <a:p>
-            <a:endParaRPr lang="en-US"/>
+            <a:r>
+              <a:rPr lang="en-US" dirty="0"/>
+              <a:t>Finalized cleaning of Type, Activity, Sex, Age, and Fatal columns</a:t>
+            </a:r>
+          </a:p>
+          <a:p>
+            <a:pPr marL="0" indent="0">
+              <a:buNone/>
+            </a:pPr>
+            <a:r>
+              <a:rPr lang="en-US" dirty="0"/>
+              <a:t> </a:t>
+            </a:r>
+          </a:p>
+          <a:p>
+            <a:r>
+              <a:rPr lang="en-US" dirty="0"/>
+              <a:t>Questions to answer: </a:t>
+            </a:r>
+          </a:p>
+          <a:p>
+            <a:pPr lvl="1"/>
+            <a:r>
+              <a:rPr lang="en-US" dirty="0"/>
+              <a:t>Which activity results in the most shark attacks? </a:t>
+            </a:r>
+          </a:p>
+          <a:p>
+            <a:pPr lvl="1"/>
+            <a:r>
+              <a:rPr lang="en-US" dirty="0"/>
+              <a:t>Which gender is attacked the most? </a:t>
+            </a:r>
+          </a:p>
+          <a:p>
+            <a:pPr lvl="1"/>
+            <a:r>
+              <a:rPr lang="en-US" dirty="0"/>
+              <a:t>Which gender provokes attacks the most? </a:t>
+            </a:r>
+          </a:p>
+          <a:p>
+            <a:pPr lvl="1"/>
+            <a:r>
+              <a:rPr lang="en-US" dirty="0"/>
+              <a:t>Which age group have the most fatalities? </a:t>
+            </a:r>
+          </a:p>
+          <a:p>
+            <a:pPr lvl="1"/>
+            <a:r>
+              <a:rPr lang="en-US" dirty="0"/>
+              <a:t>Are there more injuries when </a:t>
+            </a:r>
+            <a:r>
+              <a:rPr lang="en-US"/>
+              <a:t>attacks are </a:t>
+            </a:r>
+            <a:r>
+              <a:rPr lang="en-US" dirty="0"/>
+              <a:t>provoked? </a:t>
+            </a:r>
           </a:p>
         </p:txBody>
       </p:sp>
@@ -9660,7 +14002,173 @@
 </p:sld>
 </file>
 
-<file path=ppt/slides/slide5.xml><?xml version="1.0" encoding="utf-8"?>
+<file path=ppt/slides/slide7.xml><?xml version="1.0" encoding="utf-8"?>
+<p:sld xmlns:a="http://schemas.openxmlformats.org/drawingml/2006/main" xmlns:r="http://schemas.openxmlformats.org/officeDocument/2006/relationships" xmlns:p="http://schemas.openxmlformats.org/presentationml/2006/main">
+  <p:cSld>
+    <p:spTree>
+      <p:nvGrpSpPr>
+        <p:cNvPr id="1" name=""/>
+        <p:cNvGrpSpPr/>
+        <p:nvPr/>
+      </p:nvGrpSpPr>
+      <p:grpSpPr>
+        <a:xfrm>
+          <a:off x="0" y="0"/>
+          <a:ext cx="0" cy="0"/>
+          <a:chOff x="0" y="0"/>
+          <a:chExt cx="0" cy="0"/>
+        </a:xfrm>
+      </p:grpSpPr>
+      <p:sp>
+        <p:nvSpPr>
+          <p:cNvPr id="2" name="Title 1">
+            <a:extLst>
+              <a:ext uri="{FF2B5EF4-FFF2-40B4-BE49-F238E27FC236}">
+                <a16:creationId xmlns:a16="http://schemas.microsoft.com/office/drawing/2014/main" id="{6990B7C3-9CC1-48A0-9619-208FA5F599F0}"/>
+              </a:ext>
+            </a:extLst>
+          </p:cNvPr>
+          <p:cNvSpPr>
+            <a:spLocks noGrp="1"/>
+          </p:cNvSpPr>
+          <p:nvPr>
+            <p:ph type="title"/>
+          </p:nvPr>
+        </p:nvSpPr>
+        <p:spPr/>
+        <p:txBody>
+          <a:bodyPr/>
+          <a:lstStyle/>
+          <a:p>
+            <a:r>
+              <a:rPr lang="en-US" dirty="0"/>
+              <a:t>Victim </a:t>
+            </a:r>
+          </a:p>
+        </p:txBody>
+      </p:sp>
+      <p:sp>
+        <p:nvSpPr>
+          <p:cNvPr id="3" name="Content Placeholder 2">
+            <a:extLst>
+              <a:ext uri="{FF2B5EF4-FFF2-40B4-BE49-F238E27FC236}">
+                <a16:creationId xmlns:a16="http://schemas.microsoft.com/office/drawing/2014/main" id="{6E5895FC-E870-407B-90BF-2AD93030C96A}"/>
+              </a:ext>
+            </a:extLst>
+          </p:cNvPr>
+          <p:cNvSpPr>
+            <a:spLocks noGrp="1"/>
+          </p:cNvSpPr>
+          <p:nvPr>
+            <p:ph idx="1"/>
+          </p:nvPr>
+        </p:nvSpPr>
+        <p:spPr/>
+        <p:txBody>
+          <a:bodyPr/>
+          <a:lstStyle/>
+          <a:p>
+            <a:endParaRPr lang="en-US"/>
+          </a:p>
+        </p:txBody>
+      </p:sp>
+    </p:spTree>
+    <p:extLst>
+      <p:ext uri="{BB962C8B-B14F-4D97-AF65-F5344CB8AC3E}">
+        <p14:creationId xmlns:p14="http://schemas.microsoft.com/office/powerpoint/2010/main" val="2113385708"/>
+      </p:ext>
+    </p:extLst>
+  </p:cSld>
+  <p:clrMapOvr>
+    <a:masterClrMapping/>
+  </p:clrMapOvr>
+</p:sld>
+</file>
+
+<file path=ppt/slides/slide8.xml><?xml version="1.0" encoding="utf-8"?>
+<p:sld xmlns:a="http://schemas.openxmlformats.org/drawingml/2006/main" xmlns:r="http://schemas.openxmlformats.org/officeDocument/2006/relationships" xmlns:p="http://schemas.openxmlformats.org/presentationml/2006/main">
+  <p:cSld>
+    <p:spTree>
+      <p:nvGrpSpPr>
+        <p:cNvPr id="1" name=""/>
+        <p:cNvGrpSpPr/>
+        <p:nvPr/>
+      </p:nvGrpSpPr>
+      <p:grpSpPr>
+        <a:xfrm>
+          <a:off x="0" y="0"/>
+          <a:ext cx="0" cy="0"/>
+          <a:chOff x="0" y="0"/>
+          <a:chExt cx="0" cy="0"/>
+        </a:xfrm>
+      </p:grpSpPr>
+      <p:sp>
+        <p:nvSpPr>
+          <p:cNvPr id="2" name="Title 1">
+            <a:extLst>
+              <a:ext uri="{FF2B5EF4-FFF2-40B4-BE49-F238E27FC236}">
+                <a16:creationId xmlns:a16="http://schemas.microsoft.com/office/drawing/2014/main" id="{6990B7C3-9CC1-48A0-9619-208FA5F599F0}"/>
+              </a:ext>
+            </a:extLst>
+          </p:cNvPr>
+          <p:cNvSpPr>
+            <a:spLocks noGrp="1"/>
+          </p:cNvSpPr>
+          <p:nvPr>
+            <p:ph type="title"/>
+          </p:nvPr>
+        </p:nvSpPr>
+        <p:spPr/>
+        <p:txBody>
+          <a:bodyPr/>
+          <a:lstStyle/>
+          <a:p>
+            <a:r>
+              <a:rPr lang="en-US" dirty="0"/>
+              <a:t>Victim </a:t>
+            </a:r>
+          </a:p>
+        </p:txBody>
+      </p:sp>
+      <p:sp>
+        <p:nvSpPr>
+          <p:cNvPr id="3" name="Content Placeholder 2">
+            <a:extLst>
+              <a:ext uri="{FF2B5EF4-FFF2-40B4-BE49-F238E27FC236}">
+                <a16:creationId xmlns:a16="http://schemas.microsoft.com/office/drawing/2014/main" id="{6E5895FC-E870-407B-90BF-2AD93030C96A}"/>
+              </a:ext>
+            </a:extLst>
+          </p:cNvPr>
+          <p:cNvSpPr>
+            <a:spLocks noGrp="1"/>
+          </p:cNvSpPr>
+          <p:nvPr>
+            <p:ph idx="1"/>
+          </p:nvPr>
+        </p:nvSpPr>
+        <p:spPr/>
+        <p:txBody>
+          <a:bodyPr/>
+          <a:lstStyle/>
+          <a:p>
+            <a:endParaRPr lang="en-US"/>
+          </a:p>
+        </p:txBody>
+      </p:sp>
+    </p:spTree>
+    <p:extLst>
+      <p:ext uri="{BB962C8B-B14F-4D97-AF65-F5344CB8AC3E}">
+        <p14:creationId xmlns:p14="http://schemas.microsoft.com/office/powerpoint/2010/main" val="3188215547"/>
+      </p:ext>
+    </p:extLst>
+  </p:cSld>
+  <p:clrMapOvr>
+    <a:masterClrMapping/>
+  </p:clrMapOvr>
+</p:sld>
+</file>
+
+<file path=ppt/slides/slide9.xml><?xml version="1.0" encoding="utf-8"?>
 <p:sld xmlns:a="http://schemas.openxmlformats.org/drawingml/2006/main" xmlns:r="http://schemas.openxmlformats.org/officeDocument/2006/relationships" xmlns:p="http://schemas.openxmlformats.org/presentationml/2006/main">
   <p:cSld>
     <p:spTree>
@@ -9734,89 +14242,6 @@
     <p:extLst>
       <p:ext uri="{BB962C8B-B14F-4D97-AF65-F5344CB8AC3E}">
         <p14:creationId xmlns:p14="http://schemas.microsoft.com/office/powerpoint/2010/main" val="2967827184"/>
-      </p:ext>
-    </p:extLst>
-  </p:cSld>
-  <p:clrMapOvr>
-    <a:masterClrMapping/>
-  </p:clrMapOvr>
-</p:sld>
-</file>
-
-<file path=ppt/slides/slide6.xml><?xml version="1.0" encoding="utf-8"?>
-<p:sld xmlns:a="http://schemas.openxmlformats.org/drawingml/2006/main" xmlns:r="http://schemas.openxmlformats.org/officeDocument/2006/relationships" xmlns:p="http://schemas.openxmlformats.org/presentationml/2006/main">
-  <p:cSld>
-    <p:spTree>
-      <p:nvGrpSpPr>
-        <p:cNvPr id="1" name=""/>
-        <p:cNvGrpSpPr/>
-        <p:nvPr/>
-      </p:nvGrpSpPr>
-      <p:grpSpPr>
-        <a:xfrm>
-          <a:off x="0" y="0"/>
-          <a:ext cx="0" cy="0"/>
-          <a:chOff x="0" y="0"/>
-          <a:chExt cx="0" cy="0"/>
-        </a:xfrm>
-      </p:grpSpPr>
-      <p:sp>
-        <p:nvSpPr>
-          <p:cNvPr id="2" name="Title 1">
-            <a:extLst>
-              <a:ext uri="{FF2B5EF4-FFF2-40B4-BE49-F238E27FC236}">
-                <a16:creationId xmlns:a16="http://schemas.microsoft.com/office/drawing/2014/main" id="{D14BF098-963A-4820-B9E5-5B3FB8EF4081}"/>
-              </a:ext>
-            </a:extLst>
-          </p:cNvPr>
-          <p:cNvSpPr>
-            <a:spLocks noGrp="1"/>
-          </p:cNvSpPr>
-          <p:nvPr>
-            <p:ph type="title"/>
-          </p:nvPr>
-        </p:nvSpPr>
-        <p:spPr/>
-        <p:txBody>
-          <a:bodyPr/>
-          <a:lstStyle/>
-          <a:p>
-            <a:r>
-              <a:rPr lang="en-US" dirty="0"/>
-              <a:t>Weather</a:t>
-            </a:r>
-          </a:p>
-        </p:txBody>
-      </p:sp>
-      <p:sp>
-        <p:nvSpPr>
-          <p:cNvPr id="3" name="Content Placeholder 2">
-            <a:extLst>
-              <a:ext uri="{FF2B5EF4-FFF2-40B4-BE49-F238E27FC236}">
-                <a16:creationId xmlns:a16="http://schemas.microsoft.com/office/drawing/2014/main" id="{99973DBA-F8FD-4DA5-A5AF-FDC5469BF136}"/>
-              </a:ext>
-            </a:extLst>
-          </p:cNvPr>
-          <p:cNvSpPr>
-            <a:spLocks noGrp="1"/>
-          </p:cNvSpPr>
-          <p:nvPr>
-            <p:ph idx="1"/>
-          </p:nvPr>
-        </p:nvSpPr>
-        <p:spPr/>
-        <p:txBody>
-          <a:bodyPr/>
-          <a:lstStyle/>
-          <a:p>
-            <a:endParaRPr lang="en-US"/>
-          </a:p>
-        </p:txBody>
-      </p:sp>
-    </p:spTree>
-    <p:extLst>
-      <p:ext uri="{BB962C8B-B14F-4D97-AF65-F5344CB8AC3E}">
-        <p14:creationId xmlns:p14="http://schemas.microsoft.com/office/powerpoint/2010/main" val="143478653"/>
       </p:ext>
     </p:extLst>
   </p:cSld>

</xml_diff>

<commit_message>
victim edits, presentation edits
</commit_message>
<xml_diff>
--- a/Presentation.pptx
+++ b/Presentation.pptx
@@ -8,14 +8,16 @@
     <p:sldId id="256" r:id="rId2"/>
     <p:sldId id="257" r:id="rId3"/>
     <p:sldId id="258" r:id="rId4"/>
-    <p:sldId id="262" r:id="rId5"/>
-    <p:sldId id="263" r:id="rId6"/>
-    <p:sldId id="259" r:id="rId7"/>
-    <p:sldId id="264" r:id="rId8"/>
-    <p:sldId id="265" r:id="rId9"/>
-    <p:sldId id="260" r:id="rId10"/>
-    <p:sldId id="266" r:id="rId11"/>
-    <p:sldId id="261" r:id="rId12"/>
+    <p:sldId id="268" r:id="rId5"/>
+    <p:sldId id="262" r:id="rId6"/>
+    <p:sldId id="263" r:id="rId7"/>
+    <p:sldId id="259" r:id="rId8"/>
+    <p:sldId id="264" r:id="rId9"/>
+    <p:sldId id="265" r:id="rId10"/>
+    <p:sldId id="267" r:id="rId11"/>
+    <p:sldId id="260" r:id="rId12"/>
+    <p:sldId id="266" r:id="rId13"/>
+    <p:sldId id="261" r:id="rId14"/>
   </p:sldIdLst>
   <p:sldSz cx="12192000" cy="6858000"/>
   <p:notesSz cx="6858000" cy="9144000"/>
@@ -7381,7 +7383,7 @@
           <a:p>
             <a:fld id="{ECD19FB2-3AAB-4D03-B13A-2960828C78E3}" type="datetimeFigureOut">
               <a:rPr lang="en-US" dirty="0"/>
-              <a:t>8/1/2021</a:t>
+              <a:t>8/2/2021</a:t>
             </a:fld>
             <a:endParaRPr lang="en-US" dirty="0"/>
           </a:p>
@@ -7658,7 +7660,7 @@
           <a:p>
             <a:fld id="{1B80C674-7DFC-42FE-B9CD-82963CDB1557}" type="datetimeFigureOut">
               <a:rPr lang="en-US" dirty="0"/>
-              <a:t>8/1/2021</a:t>
+              <a:t>8/2/2021</a:t>
             </a:fld>
             <a:endParaRPr lang="en-US" dirty="0"/>
           </a:p>
@@ -7845,7 +7847,7 @@
           <a:p>
             <a:fld id="{2076456F-F47D-4F25-8053-2A695DA0CA7D}" type="datetimeFigureOut">
               <a:rPr lang="en-US" dirty="0"/>
-              <a:t>8/1/2021</a:t>
+              <a:t>8/2/2021</a:t>
             </a:fld>
             <a:endParaRPr lang="en-US" dirty="0"/>
           </a:p>
@@ -8101,7 +8103,7 @@
           <a:p>
             <a:fld id="{5D6C7379-69CC-4837-9905-BEBA22830C8A}" type="datetimeFigureOut">
               <a:rPr lang="en-US" dirty="0"/>
-              <a:t>8/1/2021</a:t>
+              <a:t>8/2/2021</a:t>
             </a:fld>
             <a:endParaRPr lang="en-US" dirty="0"/>
           </a:p>
@@ -8522,7 +8524,7 @@
           <a:p>
             <a:fld id="{49EB8B7E-8AEE-4F10-BFEE-C999AD004D36}" type="datetimeFigureOut">
               <a:rPr lang="en-US" dirty="0"/>
-              <a:t>8/1/2021</a:t>
+              <a:t>8/2/2021</a:t>
             </a:fld>
             <a:endParaRPr lang="en-US" dirty="0"/>
           </a:p>
@@ -9063,7 +9065,7 @@
           <a:p>
             <a:fld id="{8668F3F9-58BC-440B-B37B-805B9055EF92}" type="datetimeFigureOut">
               <a:rPr lang="en-US" dirty="0"/>
-              <a:t>8/1/2021</a:t>
+              <a:t>8/2/2021</a:t>
             </a:fld>
             <a:endParaRPr lang="en-US" dirty="0"/>
           </a:p>
@@ -9889,7 +9891,7 @@
           <a:p>
             <a:fld id="{0D5A53AF-48EA-489D-8260-9DCAB666386A}" type="datetimeFigureOut">
               <a:rPr lang="en-US" dirty="0"/>
-              <a:t>8/1/2021</a:t>
+              <a:t>8/2/2021</a:t>
             </a:fld>
             <a:endParaRPr lang="en-US" dirty="0"/>
           </a:p>
@@ -10054,7 +10056,7 @@
           <a:p>
             <a:fld id="{0DED02AE-B9A4-47BD-AF8E-97E16144138B}" type="datetimeFigureOut">
               <a:rPr lang="en-US" dirty="0"/>
-              <a:t>8/1/2021</a:t>
+              <a:t>8/2/2021</a:t>
             </a:fld>
             <a:endParaRPr lang="en-US" dirty="0"/>
           </a:p>
@@ -10229,7 +10231,7 @@
           <a:p>
             <a:fld id="{CF0FD78B-DB02-4362-BCDC-98A55456977C}" type="datetimeFigureOut">
               <a:rPr lang="en-US" dirty="0"/>
-              <a:t>8/1/2021</a:t>
+              <a:t>8/2/2021</a:t>
             </a:fld>
             <a:endParaRPr lang="en-US" dirty="0"/>
           </a:p>
@@ -10394,7 +10396,7 @@
           <a:p>
             <a:fld id="{99916976-5D93-46E4-A98A-FAD63E4D0EA8}" type="datetimeFigureOut">
               <a:rPr lang="en-US" dirty="0"/>
-              <a:t>8/1/2021</a:t>
+              <a:t>8/2/2021</a:t>
             </a:fld>
             <a:endParaRPr lang="en-US" dirty="0"/>
           </a:p>
@@ -10646,7 +10648,7 @@
           <a:p>
             <a:fld id="{0F39F4F5-F4D2-4D2A-AB60-88D37ADCB869}" type="datetimeFigureOut">
               <a:rPr lang="en-US" dirty="0"/>
-              <a:t>8/1/2021</a:t>
+              <a:t>8/2/2021</a:t>
             </a:fld>
             <a:endParaRPr lang="en-US" dirty="0"/>
           </a:p>
@@ -10873,7 +10875,7 @@
           <a:p>
             <a:fld id="{D23BC6CE-6D1E-47E5-8859-F31AC5380EB2}" type="datetimeFigureOut">
               <a:rPr lang="en-US" dirty="0"/>
-              <a:t>8/1/2021</a:t>
+              <a:t>8/2/2021</a:t>
             </a:fld>
             <a:endParaRPr lang="en-US" dirty="0"/>
           </a:p>
@@ -11261,7 +11263,7 @@
           <a:p>
             <a:fld id="{B1B4E7C4-4DA4-404D-9965-B13F2DD7D8BF}" type="datetimeFigureOut">
               <a:rPr lang="en-US" dirty="0"/>
-              <a:t>8/1/2021</a:t>
+              <a:t>8/2/2021</a:t>
             </a:fld>
             <a:endParaRPr lang="en-US" dirty="0"/>
           </a:p>
@@ -11374,7 +11376,7 @@
           <a:p>
             <a:fld id="{476FB7AA-4A53-424F-AD41-70827B6504BA}" type="datetimeFigureOut">
               <a:rPr lang="en-US" dirty="0"/>
-              <a:t>8/1/2021</a:t>
+              <a:t>8/2/2021</a:t>
             </a:fld>
             <a:endParaRPr lang="en-US" dirty="0"/>
           </a:p>
@@ -11464,7 +11466,7 @@
           <a:p>
             <a:fld id="{E7884882-FB12-4BC8-9960-9AD8104D7FAE}" type="datetimeFigureOut">
               <a:rPr lang="en-US" dirty="0"/>
-              <a:t>8/1/2021</a:t>
+              <a:t>8/2/2021</a:t>
             </a:fld>
             <a:endParaRPr lang="en-US" dirty="0"/>
           </a:p>
@@ -11732,7 +11734,7 @@
           <a:p>
             <a:fld id="{F7D1BD23-6E54-4D9D-AD88-A2813C73CC25}" type="datetimeFigureOut">
               <a:rPr lang="en-US" dirty="0"/>
-              <a:t>8/1/2021</a:t>
+              <a:t>8/2/2021</a:t>
             </a:fld>
             <a:endParaRPr lang="en-US" dirty="0"/>
           </a:p>
@@ -12008,7 +12010,7 @@
           <a:p>
             <a:fld id="{1471A834-4F3C-4AF9-9C74-05EC35A0F292}" type="datetimeFigureOut">
               <a:rPr lang="en-US" dirty="0"/>
-              <a:t>8/1/2021</a:t>
+              <a:t>8/2/2021</a:t>
             </a:fld>
             <a:endParaRPr lang="en-US" dirty="0"/>
           </a:p>
@@ -12243,7 +12245,7 @@
           <a:p>
             <a:fld id="{51CF1133-3259-4C45-BABA-5B62D9C6F78D}" type="datetimeFigureOut">
               <a:rPr lang="en-US" dirty="0"/>
-              <a:t>8/1/2021</a:t>
+              <a:t>8/2/2021</a:t>
             </a:fld>
             <a:endParaRPr lang="en-US" dirty="0"/>
           </a:p>
@@ -13181,7 +13183,7 @@
           <p:cNvPr id="2" name="Title 1">
             <a:extLst>
               <a:ext uri="{FF2B5EF4-FFF2-40B4-BE49-F238E27FC236}">
-                <a16:creationId xmlns:a16="http://schemas.microsoft.com/office/drawing/2014/main" id="{7FD46AC0-DF8A-4540-8DF3-3F33343FF468}"/>
+                <a16:creationId xmlns:a16="http://schemas.microsoft.com/office/drawing/2014/main" id="{6990B7C3-9CC1-48A0-9619-208FA5F599F0}"/>
               </a:ext>
             </a:extLst>
           </p:cNvPr>
@@ -13199,7 +13201,7 @@
           <a:p>
             <a:r>
               <a:rPr lang="en-US" dirty="0"/>
-              <a:t>Shark Types</a:t>
+              <a:t>Shark Types </a:t>
             </a:r>
           </a:p>
         </p:txBody>
@@ -13209,7 +13211,7 @@
           <p:cNvPr id="3" name="Content Placeholder 2">
             <a:extLst>
               <a:ext uri="{FF2B5EF4-FFF2-40B4-BE49-F238E27FC236}">
-                <a16:creationId xmlns:a16="http://schemas.microsoft.com/office/drawing/2014/main" id="{E26AEC00-AC22-4ECA-B9F3-2A639DB70FEC}"/>
+                <a16:creationId xmlns:a16="http://schemas.microsoft.com/office/drawing/2014/main" id="{6E5895FC-E870-407B-90BF-2AD93030C96A}"/>
               </a:ext>
             </a:extLst>
           </p:cNvPr>
@@ -13222,17 +13224,51 @@
         </p:nvSpPr>
         <p:spPr/>
         <p:txBody>
-          <a:bodyPr/>
+          <a:bodyPr>
+            <a:normAutofit/>
+          </a:bodyPr>
           <a:lstStyle/>
           <a:p>
-            <a:endParaRPr lang="en-US"/>
+            <a:r>
+              <a:rPr lang="en-US" dirty="0"/>
+              <a:t>Finalized cleaning of Species columns, utilized cleaned Fatal column. </a:t>
+            </a:r>
+          </a:p>
+          <a:p>
+            <a:pPr marL="0" indent="0">
+              <a:buNone/>
+            </a:pPr>
+            <a:r>
+              <a:rPr lang="en-US" dirty="0"/>
+              <a:t> </a:t>
+            </a:r>
+          </a:p>
+          <a:p>
+            <a:r>
+              <a:rPr lang="en-US" dirty="0"/>
+              <a:t>Questions to answer: </a:t>
+            </a:r>
+          </a:p>
+          <a:p>
+            <a:pPr lvl="1"/>
+            <a:r>
+              <a:rPr lang="en-US" dirty="0"/>
+              <a:t>Which shark species attack the most? </a:t>
+            </a:r>
+          </a:p>
+          <a:p>
+            <a:pPr lvl="1"/>
+            <a:r>
+              <a:rPr lang="en-US" dirty="0"/>
+              <a:t>What shark types have the most fatalities? </a:t>
+            </a:r>
           </a:p>
         </p:txBody>
       </p:sp>
     </p:spTree>
     <p:extLst>
       <p:ext uri="{BB962C8B-B14F-4D97-AF65-F5344CB8AC3E}">
-        <p14:creationId xmlns:p14="http://schemas.microsoft.com/office/powerpoint/2010/main" val="3759120689"/>
+        <p14:creationId xmlns:p14="http://schemas.microsoft.com/office/powerpoint/2010/main" val="3825307186"/>
       </p:ext>
     </p:extLst>
   </p:cSld>
@@ -13243,6 +13279,708 @@
 </file>
 
 <file path=ppt/slides/slide11.xml><?xml version="1.0" encoding="utf-8"?>
+<p:sld xmlns:a="http://schemas.openxmlformats.org/drawingml/2006/main" xmlns:r="http://schemas.openxmlformats.org/officeDocument/2006/relationships" xmlns:p="http://schemas.openxmlformats.org/presentationml/2006/main">
+  <p:cSld>
+    <p:bg>
+      <p:bgPr>
+        <a:solidFill>
+          <a:schemeClr val="bg1"/>
+        </a:solidFill>
+        <a:effectLst/>
+      </p:bgPr>
+    </p:bg>
+    <p:spTree>
+      <p:nvGrpSpPr>
+        <p:cNvPr id="1" name=""/>
+        <p:cNvGrpSpPr/>
+        <p:nvPr/>
+      </p:nvGrpSpPr>
+      <p:grpSpPr>
+        <a:xfrm>
+          <a:off x="0" y="0"/>
+          <a:ext cx="0" cy="0"/>
+          <a:chOff x="0" y="0"/>
+          <a:chExt cx="0" cy="0"/>
+        </a:xfrm>
+      </p:grpSpPr>
+      <p:sp>
+        <p:nvSpPr>
+          <p:cNvPr id="73" name="Rectangle 72">
+            <a:extLst>
+              <a:ext uri="{FF2B5EF4-FFF2-40B4-BE49-F238E27FC236}">
+                <a16:creationId xmlns:a16="http://schemas.microsoft.com/office/drawing/2014/main" id="{04D65EFB-5E87-4639-A481-956B52E9D27C}"/>
+              </a:ext>
+              <a:ext uri="{C183D7F6-B498-43B3-948B-1728B52AA6E4}">
+                <adec:decorative xmlns:adec="http://schemas.microsoft.com/office/drawing/2017/decorative" val="1"/>
+              </a:ext>
+            </a:extLst>
+          </p:cNvPr>
+          <p:cNvSpPr>
+            <a:spLocks noGrp="1" noRot="1" noChangeAspect="1" noMove="1" noResize="1" noEditPoints="1" noAdjustHandles="1" noChangeArrowheads="1" noChangeShapeType="1" noTextEdit="1"/>
+          </p:cNvSpPr>
+          <p:nvPr>
+            <p:extLst>
+              <p:ext uri="{386F3935-93C4-4BCD-93E2-E3B085C9AB24}">
+                <p16:designElem xmlns:p16="http://schemas.microsoft.com/office/powerpoint/2015/main" val="1"/>
+              </p:ext>
+            </p:extLst>
+          </p:nvPr>
+        </p:nvSpPr>
+        <p:spPr>
+          <a:xfrm>
+            <a:off x="-1" y="0"/>
+            <a:ext cx="12192001" cy="6858000"/>
+          </a:xfrm>
+          <a:prstGeom prst="rect">
+            <a:avLst/>
+          </a:prstGeom>
+          <a:solidFill>
+            <a:schemeClr val="bg1"/>
+          </a:solidFill>
+          <a:ln>
+            <a:noFill/>
+          </a:ln>
+        </p:spPr>
+        <p:style>
+          <a:lnRef idx="2">
+            <a:schemeClr val="accent1">
+              <a:shade val="50000"/>
+            </a:schemeClr>
+          </a:lnRef>
+          <a:fillRef idx="1">
+            <a:schemeClr val="accent1"/>
+          </a:fillRef>
+          <a:effectRef idx="0">
+            <a:schemeClr val="accent1"/>
+          </a:effectRef>
+          <a:fontRef idx="minor">
+            <a:schemeClr val="lt1"/>
+          </a:fontRef>
+        </p:style>
+        <p:txBody>
+          <a:bodyPr rtlCol="0" anchor="ctr"/>
+          <a:lstStyle/>
+          <a:p>
+            <a:pPr algn="ctr"/>
+            <a:endParaRPr lang="en-US"/>
+          </a:p>
+        </p:txBody>
+      </p:sp>
+      <p:sp>
+        <p:nvSpPr>
+          <p:cNvPr id="75" name="Rectangle 74">
+            <a:extLst>
+              <a:ext uri="{FF2B5EF4-FFF2-40B4-BE49-F238E27FC236}">
+                <a16:creationId xmlns:a16="http://schemas.microsoft.com/office/drawing/2014/main" id="{2A3781C0-206F-4038-93FF-4CDA80B1D99C}"/>
+              </a:ext>
+              <a:ext uri="{C183D7F6-B498-43B3-948B-1728B52AA6E4}">
+                <adec:decorative xmlns:adec="http://schemas.microsoft.com/office/drawing/2017/decorative" val="1"/>
+              </a:ext>
+            </a:extLst>
+          </p:cNvPr>
+          <p:cNvSpPr>
+            <a:spLocks noGrp="1" noRot="1" noChangeAspect="1" noMove="1" noResize="1" noEditPoints="1" noAdjustHandles="1" noChangeArrowheads="1" noChangeShapeType="1" noTextEdit="1"/>
+          </p:cNvSpPr>
+          <p:nvPr>
+            <p:extLst>
+              <p:ext uri="{386F3935-93C4-4BCD-93E2-E3B085C9AB24}">
+                <p16:designElem xmlns:p16="http://schemas.microsoft.com/office/powerpoint/2015/main" val="1"/>
+              </p:ext>
+            </p:extLst>
+          </p:nvPr>
+        </p:nvSpPr>
+        <p:spPr>
+          <a:xfrm>
+            <a:off x="0" y="0"/>
+            <a:ext cx="6096000" cy="6858000"/>
+          </a:xfrm>
+          <a:prstGeom prst="rect">
+            <a:avLst/>
+          </a:prstGeom>
+          <a:blipFill>
+            <a:blip r:embed="rId2"/>
+            <a:stretch>
+              <a:fillRect r="-100000"/>
+            </a:stretch>
+          </a:blipFill>
+          <a:ln>
+            <a:noFill/>
+          </a:ln>
+          <a:effectLst>
+            <a:outerShdw blurRad="139700" dist="50800" algn="ctr" rotWithShape="0">
+              <a:srgbClr val="000000">
+                <a:alpha val="40000"/>
+              </a:srgbClr>
+            </a:outerShdw>
+          </a:effectLst>
+        </p:spPr>
+        <p:style>
+          <a:lnRef idx="2">
+            <a:schemeClr val="accent1">
+              <a:shade val="50000"/>
+            </a:schemeClr>
+          </a:lnRef>
+          <a:fillRef idx="1">
+            <a:schemeClr val="accent1"/>
+          </a:fillRef>
+          <a:effectRef idx="0">
+            <a:schemeClr val="accent1"/>
+          </a:effectRef>
+          <a:fontRef idx="minor">
+            <a:schemeClr val="lt1"/>
+          </a:fontRef>
+        </p:style>
+        <p:txBody>
+          <a:bodyPr rtlCol="0" anchor="ctr"/>
+          <a:lstStyle/>
+          <a:p>
+            <a:pPr algn="ctr"/>
+            <a:endParaRPr lang="en-US"/>
+          </a:p>
+        </p:txBody>
+      </p:sp>
+      <p:sp>
+        <p:nvSpPr>
+          <p:cNvPr id="2" name="Title 1">
+            <a:extLst>
+              <a:ext uri="{FF2B5EF4-FFF2-40B4-BE49-F238E27FC236}">
+                <a16:creationId xmlns:a16="http://schemas.microsoft.com/office/drawing/2014/main" id="{7FD46AC0-DF8A-4540-8DF3-3F33343FF468}"/>
+              </a:ext>
+            </a:extLst>
+          </p:cNvPr>
+          <p:cNvSpPr>
+            <a:spLocks noGrp="1"/>
+          </p:cNvSpPr>
+          <p:nvPr>
+            <p:ph type="title"/>
+          </p:nvPr>
+        </p:nvSpPr>
+        <p:spPr>
+          <a:xfrm>
+            <a:off x="838201" y="365125"/>
+            <a:ext cx="4827104" cy="1325563"/>
+          </a:xfrm>
+        </p:spPr>
+        <p:txBody>
+          <a:bodyPr>
+            <a:normAutofit fontScale="90000"/>
+          </a:bodyPr>
+          <a:lstStyle/>
+          <a:p>
+            <a:r>
+              <a:rPr lang="en-US" dirty="0">
+                <a:gradFill flip="none" rotWithShape="1">
+                  <a:gsLst>
+                    <a:gs pos="28000">
+                      <a:srgbClr val="EDEDED"/>
+                    </a:gs>
+                    <a:gs pos="0">
+                      <a:srgbClr val="BFBFBF"/>
+                    </a:gs>
+                    <a:gs pos="100000">
+                      <a:srgbClr val="FFFFFF"/>
+                    </a:gs>
+                  </a:gsLst>
+                  <a:lin ang="4800000" scaled="0"/>
+                  <a:tileRect/>
+                </a:gradFill>
+              </a:rPr>
+              <a:t>Shark by Species</a:t>
+            </a:r>
+          </a:p>
+        </p:txBody>
+      </p:sp>
+      <p:sp>
+        <p:nvSpPr>
+          <p:cNvPr id="1030" name="Content Placeholder 1029">
+            <a:extLst>
+              <a:ext uri="{FF2B5EF4-FFF2-40B4-BE49-F238E27FC236}">
+                <a16:creationId xmlns:a16="http://schemas.microsoft.com/office/drawing/2014/main" id="{B833AD0F-598F-4F83-B8DC-CECE3817A876}"/>
+              </a:ext>
+            </a:extLst>
+          </p:cNvPr>
+          <p:cNvSpPr>
+            <a:spLocks noGrp="1"/>
+          </p:cNvSpPr>
+          <p:nvPr>
+            <p:ph idx="1"/>
+          </p:nvPr>
+        </p:nvSpPr>
+        <p:spPr>
+          <a:xfrm>
+            <a:off x="1120000" y="1825625"/>
+            <a:ext cx="4545305" cy="4351338"/>
+          </a:xfrm>
+        </p:spPr>
+        <p:txBody>
+          <a:bodyPr>
+            <a:normAutofit/>
+          </a:bodyPr>
+          <a:lstStyle/>
+          <a:p>
+            <a:r>
+              <a:rPr lang="en-US" sz="2000" dirty="0">
+                <a:gradFill>
+                  <a:gsLst>
+                    <a:gs pos="34000">
+                      <a:srgbClr val="EDEDED"/>
+                    </a:gs>
+                    <a:gs pos="0">
+                      <a:srgbClr val="BFBFBF"/>
+                    </a:gs>
+                    <a:gs pos="100000">
+                      <a:srgbClr val="FFFFFF"/>
+                    </a:gs>
+                  </a:gsLst>
+                  <a:lin ang="4800000" scaled="0"/>
+                </a:gradFill>
+              </a:rPr>
+              <a:t>White Sharks had the most attacks, followed by Tiger Sharks</a:t>
+            </a:r>
+          </a:p>
+          <a:p>
+            <a:endParaRPr lang="en-US" sz="2000" dirty="0">
+              <a:gradFill>
+                <a:gsLst>
+                  <a:gs pos="34000">
+                    <a:srgbClr val="EDEDED"/>
+                  </a:gs>
+                  <a:gs pos="0">
+                    <a:srgbClr val="BFBFBF"/>
+                  </a:gs>
+                  <a:gs pos="100000">
+                    <a:srgbClr val="FFFFFF"/>
+                  </a:gs>
+                </a:gsLst>
+                <a:lin ang="4800000" scaled="0"/>
+              </a:gradFill>
+            </a:endParaRPr>
+          </a:p>
+          <a:p>
+            <a:r>
+              <a:rPr lang="en-US" sz="2000" dirty="0">
+                <a:gradFill>
+                  <a:gsLst>
+                    <a:gs pos="34000">
+                      <a:srgbClr val="EDEDED"/>
+                    </a:gs>
+                    <a:gs pos="0">
+                      <a:srgbClr val="BFBFBF"/>
+                    </a:gs>
+                    <a:gs pos="100000">
+                      <a:srgbClr val="FFFFFF"/>
+                    </a:gs>
+                  </a:gsLst>
+                  <a:lin ang="4800000" scaled="0"/>
+                </a:gradFill>
+              </a:rPr>
+              <a:t>Chart includes only species that had more than 3 attacks </a:t>
+            </a:r>
+          </a:p>
+        </p:txBody>
+      </p:sp>
+      <p:pic>
+        <p:nvPicPr>
+          <p:cNvPr id="1026" name="Picture 2">
+            <a:extLst>
+              <a:ext uri="{FF2B5EF4-FFF2-40B4-BE49-F238E27FC236}">
+                <a16:creationId xmlns:a16="http://schemas.microsoft.com/office/drawing/2014/main" id="{DA6710A9-1EE6-440C-8505-428A2B0C97C5}"/>
+              </a:ext>
+            </a:extLst>
+          </p:cNvPr>
+          <p:cNvPicPr>
+            <a:picLocks noChangeAspect="1" noChangeArrowheads="1"/>
+          </p:cNvPicPr>
+          <p:nvPr/>
+        </p:nvPicPr>
+        <p:blipFill>
+          <a:blip r:embed="rId3">
+            <a:extLst>
+              <a:ext uri="{28A0092B-C50C-407E-A947-70E740481C1C}">
+                <a14:useLocalDpi xmlns:a14="http://schemas.microsoft.com/office/drawing/2010/main" val="0"/>
+              </a:ext>
+            </a:extLst>
+          </a:blip>
+          <a:stretch>
+            <a:fillRect/>
+          </a:stretch>
+        </p:blipFill>
+        <p:spPr bwMode="auto">
+          <a:xfrm>
+            <a:off x="6319405" y="877824"/>
+            <a:ext cx="5716920" cy="5102351"/>
+          </a:xfrm>
+          <a:prstGeom prst="rect">
+            <a:avLst/>
+          </a:prstGeom>
+          <a:noFill/>
+          <a:extLst>
+            <a:ext uri="{909E8E84-426E-40DD-AFC4-6F175D3DCCD1}">
+              <a14:hiddenFill xmlns:a14="http://schemas.microsoft.com/office/drawing/2010/main">
+                <a:solidFill>
+                  <a:srgbClr val="FFFFFF"/>
+                </a:solidFill>
+              </a14:hiddenFill>
+            </a:ext>
+          </a:extLst>
+        </p:spPr>
+      </p:pic>
+    </p:spTree>
+    <p:extLst>
+      <p:ext uri="{BB962C8B-B14F-4D97-AF65-F5344CB8AC3E}">
+        <p14:creationId xmlns:p14="http://schemas.microsoft.com/office/powerpoint/2010/main" val="2967827184"/>
+      </p:ext>
+    </p:extLst>
+  </p:cSld>
+  <p:clrMapOvr>
+    <a:overrideClrMapping bg1="lt1" tx1="dk1" bg2="lt2" tx2="dk2" accent1="accent1" accent2="accent2" accent3="accent3" accent4="accent4" accent5="accent5" accent6="accent6" hlink="hlink" folHlink="folHlink"/>
+  </p:clrMapOvr>
+</p:sld>
+</file>
+
+<file path=ppt/slides/slide12.xml><?xml version="1.0" encoding="utf-8"?>
+<p:sld xmlns:a="http://schemas.openxmlformats.org/drawingml/2006/main" xmlns:r="http://schemas.openxmlformats.org/officeDocument/2006/relationships" xmlns:p="http://schemas.openxmlformats.org/presentationml/2006/main">
+  <p:cSld>
+    <p:bg>
+      <p:bgPr>
+        <a:solidFill>
+          <a:schemeClr val="bg1"/>
+        </a:solidFill>
+        <a:effectLst/>
+      </p:bgPr>
+    </p:bg>
+    <p:spTree>
+      <p:nvGrpSpPr>
+        <p:cNvPr id="1" name=""/>
+        <p:cNvGrpSpPr/>
+        <p:nvPr/>
+      </p:nvGrpSpPr>
+      <p:grpSpPr>
+        <a:xfrm>
+          <a:off x="0" y="0"/>
+          <a:ext cx="0" cy="0"/>
+          <a:chOff x="0" y="0"/>
+          <a:chExt cx="0" cy="0"/>
+        </a:xfrm>
+      </p:grpSpPr>
+      <p:sp>
+        <p:nvSpPr>
+          <p:cNvPr id="73" name="Rectangle 72">
+            <a:extLst>
+              <a:ext uri="{FF2B5EF4-FFF2-40B4-BE49-F238E27FC236}">
+                <a16:creationId xmlns:a16="http://schemas.microsoft.com/office/drawing/2014/main" id="{04D65EFB-5E87-4639-A481-956B52E9D27C}"/>
+              </a:ext>
+              <a:ext uri="{C183D7F6-B498-43B3-948B-1728B52AA6E4}">
+                <adec:decorative xmlns:adec="http://schemas.microsoft.com/office/drawing/2017/decorative" val="1"/>
+              </a:ext>
+            </a:extLst>
+          </p:cNvPr>
+          <p:cNvSpPr>
+            <a:spLocks noGrp="1" noRot="1" noChangeAspect="1" noMove="1" noResize="1" noEditPoints="1" noAdjustHandles="1" noChangeArrowheads="1" noChangeShapeType="1" noTextEdit="1"/>
+          </p:cNvSpPr>
+          <p:nvPr>
+            <p:extLst>
+              <p:ext uri="{386F3935-93C4-4BCD-93E2-E3B085C9AB24}">
+                <p16:designElem xmlns:p16="http://schemas.microsoft.com/office/powerpoint/2015/main" val="1"/>
+              </p:ext>
+            </p:extLst>
+          </p:nvPr>
+        </p:nvSpPr>
+        <p:spPr>
+          <a:xfrm>
+            <a:off x="-1" y="0"/>
+            <a:ext cx="12192001" cy="6858000"/>
+          </a:xfrm>
+          <a:prstGeom prst="rect">
+            <a:avLst/>
+          </a:prstGeom>
+          <a:solidFill>
+            <a:schemeClr val="bg1"/>
+          </a:solidFill>
+          <a:ln>
+            <a:noFill/>
+          </a:ln>
+        </p:spPr>
+        <p:style>
+          <a:lnRef idx="2">
+            <a:schemeClr val="accent1">
+              <a:shade val="50000"/>
+            </a:schemeClr>
+          </a:lnRef>
+          <a:fillRef idx="1">
+            <a:schemeClr val="accent1"/>
+          </a:fillRef>
+          <a:effectRef idx="0">
+            <a:schemeClr val="accent1"/>
+          </a:effectRef>
+          <a:fontRef idx="minor">
+            <a:schemeClr val="lt1"/>
+          </a:fontRef>
+        </p:style>
+        <p:txBody>
+          <a:bodyPr rtlCol="0" anchor="ctr"/>
+          <a:lstStyle/>
+          <a:p>
+            <a:pPr algn="ctr"/>
+            <a:endParaRPr lang="en-US"/>
+          </a:p>
+        </p:txBody>
+      </p:sp>
+      <p:sp>
+        <p:nvSpPr>
+          <p:cNvPr id="75" name="Rectangle 74">
+            <a:extLst>
+              <a:ext uri="{FF2B5EF4-FFF2-40B4-BE49-F238E27FC236}">
+                <a16:creationId xmlns:a16="http://schemas.microsoft.com/office/drawing/2014/main" id="{2A3781C0-206F-4038-93FF-4CDA80B1D99C}"/>
+              </a:ext>
+              <a:ext uri="{C183D7F6-B498-43B3-948B-1728B52AA6E4}">
+                <adec:decorative xmlns:adec="http://schemas.microsoft.com/office/drawing/2017/decorative" val="1"/>
+              </a:ext>
+            </a:extLst>
+          </p:cNvPr>
+          <p:cNvSpPr>
+            <a:spLocks noGrp="1" noRot="1" noChangeAspect="1" noMove="1" noResize="1" noEditPoints="1" noAdjustHandles="1" noChangeArrowheads="1" noChangeShapeType="1" noTextEdit="1"/>
+          </p:cNvSpPr>
+          <p:nvPr>
+            <p:extLst>
+              <p:ext uri="{386F3935-93C4-4BCD-93E2-E3B085C9AB24}">
+                <p16:designElem xmlns:p16="http://schemas.microsoft.com/office/powerpoint/2015/main" val="1"/>
+              </p:ext>
+            </p:extLst>
+          </p:nvPr>
+        </p:nvSpPr>
+        <p:spPr>
+          <a:xfrm>
+            <a:off x="0" y="0"/>
+            <a:ext cx="6096000" cy="6858000"/>
+          </a:xfrm>
+          <a:prstGeom prst="rect">
+            <a:avLst/>
+          </a:prstGeom>
+          <a:blipFill>
+            <a:blip r:embed="rId2"/>
+            <a:stretch>
+              <a:fillRect r="-100000"/>
+            </a:stretch>
+          </a:blipFill>
+          <a:ln>
+            <a:noFill/>
+          </a:ln>
+          <a:effectLst>
+            <a:outerShdw blurRad="139700" dist="50800" algn="ctr" rotWithShape="0">
+              <a:srgbClr val="000000">
+                <a:alpha val="40000"/>
+              </a:srgbClr>
+            </a:outerShdw>
+          </a:effectLst>
+        </p:spPr>
+        <p:style>
+          <a:lnRef idx="2">
+            <a:schemeClr val="accent1">
+              <a:shade val="50000"/>
+            </a:schemeClr>
+          </a:lnRef>
+          <a:fillRef idx="1">
+            <a:schemeClr val="accent1"/>
+          </a:fillRef>
+          <a:effectRef idx="0">
+            <a:schemeClr val="accent1"/>
+          </a:effectRef>
+          <a:fontRef idx="minor">
+            <a:schemeClr val="lt1"/>
+          </a:fontRef>
+        </p:style>
+        <p:txBody>
+          <a:bodyPr rtlCol="0" anchor="ctr"/>
+          <a:lstStyle/>
+          <a:p>
+            <a:pPr algn="ctr"/>
+            <a:endParaRPr lang="en-US"/>
+          </a:p>
+        </p:txBody>
+      </p:sp>
+      <p:sp>
+        <p:nvSpPr>
+          <p:cNvPr id="2" name="Title 1">
+            <a:extLst>
+              <a:ext uri="{FF2B5EF4-FFF2-40B4-BE49-F238E27FC236}">
+                <a16:creationId xmlns:a16="http://schemas.microsoft.com/office/drawing/2014/main" id="{7FD46AC0-DF8A-4540-8DF3-3F33343FF468}"/>
+              </a:ext>
+            </a:extLst>
+          </p:cNvPr>
+          <p:cNvSpPr>
+            <a:spLocks noGrp="1"/>
+          </p:cNvSpPr>
+          <p:nvPr>
+            <p:ph type="title"/>
+          </p:nvPr>
+        </p:nvSpPr>
+        <p:spPr>
+          <a:xfrm>
+            <a:off x="838201" y="365125"/>
+            <a:ext cx="4827104" cy="1325563"/>
+          </a:xfrm>
+        </p:spPr>
+        <p:txBody>
+          <a:bodyPr>
+            <a:normAutofit fontScale="90000"/>
+          </a:bodyPr>
+          <a:lstStyle/>
+          <a:p>
+            <a:r>
+              <a:rPr lang="en-US" dirty="0">
+                <a:gradFill flip="none" rotWithShape="1">
+                  <a:gsLst>
+                    <a:gs pos="28000">
+                      <a:srgbClr val="EDEDED"/>
+                    </a:gs>
+                    <a:gs pos="0">
+                      <a:srgbClr val="BFBFBF"/>
+                    </a:gs>
+                    <a:gs pos="100000">
+                      <a:srgbClr val="FFFFFF"/>
+                    </a:gs>
+                  </a:gsLst>
+                  <a:lin ang="4800000" scaled="0"/>
+                  <a:tileRect/>
+                </a:gradFill>
+              </a:rPr>
+              <a:t>Shark Species vs Fatality</a:t>
+            </a:r>
+          </a:p>
+        </p:txBody>
+      </p:sp>
+      <p:sp>
+        <p:nvSpPr>
+          <p:cNvPr id="2054" name="Content Placeholder 2053">
+            <a:extLst>
+              <a:ext uri="{FF2B5EF4-FFF2-40B4-BE49-F238E27FC236}">
+                <a16:creationId xmlns:a16="http://schemas.microsoft.com/office/drawing/2014/main" id="{EB2A0DA7-98EB-434D-9559-546A431B7C24}"/>
+              </a:ext>
+            </a:extLst>
+          </p:cNvPr>
+          <p:cNvSpPr>
+            <a:spLocks noGrp="1"/>
+          </p:cNvSpPr>
+          <p:nvPr>
+            <p:ph idx="1"/>
+          </p:nvPr>
+        </p:nvSpPr>
+        <p:spPr>
+          <a:xfrm>
+            <a:off x="1120000" y="1825625"/>
+            <a:ext cx="4545305" cy="4351338"/>
+          </a:xfrm>
+        </p:spPr>
+        <p:txBody>
+          <a:bodyPr>
+            <a:normAutofit/>
+          </a:bodyPr>
+          <a:lstStyle/>
+          <a:p>
+            <a:r>
+              <a:rPr lang="en-US" sz="2000" dirty="0">
+                <a:gradFill>
+                  <a:gsLst>
+                    <a:gs pos="34000">
+                      <a:srgbClr val="EDEDED"/>
+                    </a:gs>
+                    <a:gs pos="0">
+                      <a:srgbClr val="BFBFBF"/>
+                    </a:gs>
+                    <a:gs pos="100000">
+                      <a:srgbClr val="FFFFFF"/>
+                    </a:gs>
+                  </a:gsLst>
+                  <a:lin ang="4800000" scaled="0"/>
+                </a:gradFill>
+              </a:rPr>
+              <a:t>White Sharks are the most fatal  followed by Zebra Sharks </a:t>
+            </a:r>
+          </a:p>
+          <a:p>
+            <a:r>
+              <a:rPr lang="en-US" sz="2000" dirty="0">
+                <a:gradFill>
+                  <a:gsLst>
+                    <a:gs pos="34000">
+                      <a:srgbClr val="EDEDED"/>
+                    </a:gs>
+                    <a:gs pos="0">
+                      <a:srgbClr val="BFBFBF"/>
+                    </a:gs>
+                    <a:gs pos="100000">
+                      <a:srgbClr val="FFFFFF"/>
+                    </a:gs>
+                  </a:gsLst>
+                  <a:lin ang="4800000" scaled="0"/>
+                </a:gradFill>
+              </a:rPr>
+              <a:t>Data complicated as most descriptions were by shark size and not by species </a:t>
+            </a:r>
+          </a:p>
+        </p:txBody>
+      </p:sp>
+      <p:pic>
+        <p:nvPicPr>
+          <p:cNvPr id="2050" name="Picture 2">
+            <a:extLst>
+              <a:ext uri="{FF2B5EF4-FFF2-40B4-BE49-F238E27FC236}">
+                <a16:creationId xmlns:a16="http://schemas.microsoft.com/office/drawing/2014/main" id="{F09F4142-1C7E-43FE-8D19-6AD6771385C9}"/>
+              </a:ext>
+            </a:extLst>
+          </p:cNvPr>
+          <p:cNvPicPr>
+            <a:picLocks noChangeAspect="1" noChangeArrowheads="1"/>
+          </p:cNvPicPr>
+          <p:nvPr/>
+        </p:nvPicPr>
+        <p:blipFill>
+          <a:blip r:embed="rId3">
+            <a:extLst>
+              <a:ext uri="{28A0092B-C50C-407E-A947-70E740481C1C}">
+                <a14:useLocalDpi xmlns:a14="http://schemas.microsoft.com/office/drawing/2010/main" val="0"/>
+              </a:ext>
+            </a:extLst>
+          </a:blip>
+          <a:stretch>
+            <a:fillRect/>
+          </a:stretch>
+        </p:blipFill>
+        <p:spPr bwMode="auto">
+          <a:xfrm>
+            <a:off x="6734531" y="742846"/>
+            <a:ext cx="4854495" cy="5372307"/>
+          </a:xfrm>
+          <a:prstGeom prst="rect">
+            <a:avLst/>
+          </a:prstGeom>
+          <a:noFill/>
+          <a:extLst>
+            <a:ext uri="{909E8E84-426E-40DD-AFC4-6F175D3DCCD1}">
+              <a14:hiddenFill xmlns:a14="http://schemas.microsoft.com/office/drawing/2010/main">
+                <a:solidFill>
+                  <a:srgbClr val="FFFFFF"/>
+                </a:solidFill>
+              </a14:hiddenFill>
+            </a:ext>
+          </a:extLst>
+        </p:spPr>
+      </p:pic>
+    </p:spTree>
+    <p:extLst>
+      <p:ext uri="{BB962C8B-B14F-4D97-AF65-F5344CB8AC3E}">
+        <p14:creationId xmlns:p14="http://schemas.microsoft.com/office/powerpoint/2010/main" val="3759120689"/>
+      </p:ext>
+    </p:extLst>
+  </p:cSld>
+  <p:clrMapOvr>
+    <a:overrideClrMapping bg1="lt1" tx1="dk1" bg2="lt2" tx2="dk2" accent1="accent1" accent2="accent2" accent3="accent3" accent4="accent4" accent5="accent5" accent6="accent6" hlink="hlink" folHlink="folHlink"/>
+  </p:clrMapOvr>
+</p:sld>
+</file>
+
+<file path=ppt/slides/slide13.xml><?xml version="1.0" encoding="utf-8"?>
 <p:sld xmlns:a="http://schemas.openxmlformats.org/drawingml/2006/main" xmlns:r="http://schemas.openxmlformats.org/officeDocument/2006/relationships" xmlns:p="http://schemas.openxmlformats.org/presentationml/2006/main">
   <p:cSld>
     <p:spTree>
@@ -13308,7 +14046,26 @@
           <a:bodyPr/>
           <a:lstStyle/>
           <a:p>
-            <a:endParaRPr lang="en-US"/>
+            <a:r>
+              <a:rPr lang="en-US" dirty="0"/>
+              <a:t>TBD </a:t>
+            </a:r>
+          </a:p>
+          <a:p>
+            <a:endParaRPr lang="en-US" dirty="0"/>
+          </a:p>
+          <a:p>
+            <a:r>
+              <a:rPr lang="en-US" dirty="0"/>
+              <a:t>Use of API to obtain historic weather for location by groups and compare with number of attacks</a:t>
+            </a:r>
+          </a:p>
+          <a:p>
+            <a:pPr lvl="1"/>
+            <a:r>
+              <a:rPr lang="en-US" dirty="0"/>
+              <a:t>Analyze if storms increase shark attacks</a:t>
+            </a:r>
           </a:p>
         </p:txBody>
       </p:sp>
@@ -13714,7 +14471,7 @@
           <p:cNvPr id="2" name="Title 1">
             <a:extLst>
               <a:ext uri="{FF2B5EF4-FFF2-40B4-BE49-F238E27FC236}">
-                <a16:creationId xmlns:a16="http://schemas.microsoft.com/office/drawing/2014/main" id="{30566A63-2DC8-41A3-9943-E284E59976C7}"/>
+                <a16:creationId xmlns:a16="http://schemas.microsoft.com/office/drawing/2014/main" id="{6990B7C3-9CC1-48A0-9619-208FA5F599F0}"/>
               </a:ext>
             </a:extLst>
           </p:cNvPr>
@@ -13742,7 +14499,7 @@
           <p:cNvPr id="3" name="Content Placeholder 2">
             <a:extLst>
               <a:ext uri="{FF2B5EF4-FFF2-40B4-BE49-F238E27FC236}">
-                <a16:creationId xmlns:a16="http://schemas.microsoft.com/office/drawing/2014/main" id="{3CF170D7-BFAF-4A4E-A945-4956C27AE002}"/>
+                <a16:creationId xmlns:a16="http://schemas.microsoft.com/office/drawing/2014/main" id="{6E5895FC-E870-407B-90BF-2AD93030C96A}"/>
               </a:ext>
             </a:extLst>
           </p:cNvPr>
@@ -13755,17 +14512,51 @@
         </p:nvSpPr>
         <p:spPr/>
         <p:txBody>
-          <a:bodyPr/>
+          <a:bodyPr>
+            <a:normAutofit/>
+          </a:bodyPr>
           <a:lstStyle/>
           <a:p>
-            <a:endParaRPr lang="en-US"/>
+            <a:r>
+              <a:rPr lang="en-US" dirty="0"/>
+              <a:t>Finalized cleaning of Species columns, utilized cleaned Fatal column. </a:t>
+            </a:r>
+          </a:p>
+          <a:p>
+            <a:pPr marL="0" indent="0">
+              <a:buNone/>
+            </a:pPr>
+            <a:r>
+              <a:rPr lang="en-US" dirty="0"/>
+              <a:t> </a:t>
+            </a:r>
+          </a:p>
+          <a:p>
+            <a:r>
+              <a:rPr lang="en-US" dirty="0"/>
+              <a:t>Questions to answer: </a:t>
+            </a:r>
+          </a:p>
+          <a:p>
+            <a:pPr lvl="1"/>
+            <a:r>
+              <a:rPr lang="en-US" dirty="0"/>
+              <a:t>What location has the most shark attacks? </a:t>
+            </a:r>
+          </a:p>
+          <a:p>
+            <a:pPr lvl="1"/>
+            <a:r>
+              <a:rPr lang="en-US" dirty="0"/>
+              <a:t>Does the season of the year affect the likelihood of being attacked?</a:t>
+            </a:r>
           </a:p>
         </p:txBody>
       </p:sp>
     </p:spTree>
     <p:extLst>
       <p:ext uri="{BB962C8B-B14F-4D97-AF65-F5344CB8AC3E}">
-        <p14:creationId xmlns:p14="http://schemas.microsoft.com/office/powerpoint/2010/main" val="777779433"/>
+        <p14:creationId xmlns:p14="http://schemas.microsoft.com/office/powerpoint/2010/main" val="3208185012"/>
       </p:ext>
     </p:extLst>
   </p:cSld>
@@ -13848,7 +14639,7 @@
     </p:spTree>
     <p:extLst>
       <p:ext uri="{BB962C8B-B14F-4D97-AF65-F5344CB8AC3E}">
-        <p14:creationId xmlns:p14="http://schemas.microsoft.com/office/powerpoint/2010/main" val="2729291996"/>
+        <p14:creationId xmlns:p14="http://schemas.microsoft.com/office/powerpoint/2010/main" val="777779433"/>
       </p:ext>
     </p:extLst>
   </p:cSld>
@@ -13880,7 +14671,7 @@
           <p:cNvPr id="2" name="Title 1">
             <a:extLst>
               <a:ext uri="{FF2B5EF4-FFF2-40B4-BE49-F238E27FC236}">
-                <a16:creationId xmlns:a16="http://schemas.microsoft.com/office/drawing/2014/main" id="{6990B7C3-9CC1-48A0-9619-208FA5F599F0}"/>
+                <a16:creationId xmlns:a16="http://schemas.microsoft.com/office/drawing/2014/main" id="{30566A63-2DC8-41A3-9943-E284E59976C7}"/>
               </a:ext>
             </a:extLst>
           </p:cNvPr>
@@ -13898,7 +14689,7 @@
           <a:p>
             <a:r>
               <a:rPr lang="en-US" dirty="0"/>
-              <a:t>Victim </a:t>
+              <a:t>Location </a:t>
             </a:r>
           </a:p>
         </p:txBody>
@@ -13908,7 +14699,7 @@
           <p:cNvPr id="3" name="Content Placeholder 2">
             <a:extLst>
               <a:ext uri="{FF2B5EF4-FFF2-40B4-BE49-F238E27FC236}">
-                <a16:creationId xmlns:a16="http://schemas.microsoft.com/office/drawing/2014/main" id="{6E5895FC-E870-407B-90BF-2AD93030C96A}"/>
+                <a16:creationId xmlns:a16="http://schemas.microsoft.com/office/drawing/2014/main" id="{3CF170D7-BFAF-4A4E-A945-4956C27AE002}"/>
               </a:ext>
             </a:extLst>
           </p:cNvPr>
@@ -13921,78 +14712,17 @@
         </p:nvSpPr>
         <p:spPr/>
         <p:txBody>
-          <a:bodyPr>
-            <a:normAutofit lnSpcReduction="10000"/>
-          </a:bodyPr>
+          <a:bodyPr/>
           <a:lstStyle/>
           <a:p>
-            <a:r>
-              <a:rPr lang="en-US" dirty="0"/>
-              <a:t>Finalized cleaning of Type, Activity, Sex, Age, and Fatal columns. </a:t>
-            </a:r>
-          </a:p>
-          <a:p>
-            <a:r>
-              <a:rPr lang="en-US" dirty="0"/>
-              <a:t>Reorganized Injury column to remark type of injury: Severe, Minor to Moderate, and None</a:t>
-            </a:r>
-          </a:p>
-          <a:p>
-            <a:pPr marL="0" indent="0">
-              <a:buNone/>
-            </a:pPr>
-            <a:r>
-              <a:rPr lang="en-US" dirty="0"/>
-              <a:t> </a:t>
-            </a:r>
-          </a:p>
-          <a:p>
-            <a:r>
-              <a:rPr lang="en-US" dirty="0"/>
-              <a:t>Questions to answer: </a:t>
-            </a:r>
-          </a:p>
-          <a:p>
-            <a:pPr lvl="1"/>
-            <a:r>
-              <a:rPr lang="en-US" dirty="0"/>
-              <a:t>Which activity results in the most shark attacks? </a:t>
-            </a:r>
-          </a:p>
-          <a:p>
-            <a:pPr lvl="1"/>
-            <a:r>
-              <a:rPr lang="en-US" dirty="0"/>
-              <a:t>Which gender is attacked the most? </a:t>
-            </a:r>
-          </a:p>
-          <a:p>
-            <a:pPr lvl="1"/>
-            <a:r>
-              <a:rPr lang="en-US" dirty="0"/>
-              <a:t>Which gender provokes attacks the most? </a:t>
-            </a:r>
-          </a:p>
-          <a:p>
-            <a:pPr lvl="1"/>
-            <a:r>
-              <a:rPr lang="en-US" dirty="0"/>
-              <a:t>Which age group have the most fatalities? </a:t>
-            </a:r>
-          </a:p>
-          <a:p>
-            <a:pPr lvl="1"/>
-            <a:r>
-              <a:rPr lang="en-US" dirty="0"/>
-              <a:t>Are there more injuries when attacks are provoked? </a:t>
-            </a:r>
+            <a:endParaRPr lang="en-US"/>
           </a:p>
         </p:txBody>
       </p:sp>
     </p:spTree>
     <p:extLst>
       <p:ext uri="{BB962C8B-B14F-4D97-AF65-F5344CB8AC3E}">
-        <p14:creationId xmlns:p14="http://schemas.microsoft.com/office/powerpoint/2010/main" val="3847644132"/>
+        <p14:creationId xmlns:p14="http://schemas.microsoft.com/office/powerpoint/2010/main" val="2729291996"/>
       </p:ext>
     </p:extLst>
   </p:cSld>
@@ -14065,17 +14795,78 @@
         </p:nvSpPr>
         <p:spPr/>
         <p:txBody>
-          <a:bodyPr/>
+          <a:bodyPr>
+            <a:normAutofit lnSpcReduction="10000"/>
+          </a:bodyPr>
           <a:lstStyle/>
           <a:p>
-            <a:endParaRPr lang="en-US"/>
+            <a:r>
+              <a:rPr lang="en-US" dirty="0"/>
+              <a:t>Finalized cleaning of Type, Activity, Sex, Age, and Fatal columns. </a:t>
+            </a:r>
+          </a:p>
+          <a:p>
+            <a:r>
+              <a:rPr lang="en-US" dirty="0"/>
+              <a:t>Reorganized Injury column to remark type of injury: Severe, Minor to Moderate, and None</a:t>
+            </a:r>
+          </a:p>
+          <a:p>
+            <a:pPr marL="0" indent="0">
+              <a:buNone/>
+            </a:pPr>
+            <a:r>
+              <a:rPr lang="en-US" dirty="0"/>
+              <a:t> </a:t>
+            </a:r>
+          </a:p>
+          <a:p>
+            <a:r>
+              <a:rPr lang="en-US" dirty="0"/>
+              <a:t>Questions to answer: </a:t>
+            </a:r>
+          </a:p>
+          <a:p>
+            <a:pPr lvl="1"/>
+            <a:r>
+              <a:rPr lang="en-US" dirty="0"/>
+              <a:t>Which gender is attacked the most? </a:t>
+            </a:r>
+          </a:p>
+          <a:p>
+            <a:pPr lvl="1"/>
+            <a:r>
+              <a:rPr lang="en-US" dirty="0"/>
+              <a:t>Which activity results in the most shark attacks? </a:t>
+            </a:r>
+          </a:p>
+          <a:p>
+            <a:pPr lvl="1"/>
+            <a:r>
+              <a:rPr lang="en-US" dirty="0"/>
+              <a:t>Which gender provokes attacks the most? </a:t>
+            </a:r>
+          </a:p>
+          <a:p>
+            <a:pPr lvl="1"/>
+            <a:r>
+              <a:rPr lang="en-US" dirty="0"/>
+              <a:t>Which age group have the most fatalities? </a:t>
+            </a:r>
+          </a:p>
+          <a:p>
+            <a:pPr lvl="1"/>
+            <a:r>
+              <a:rPr lang="en-US" dirty="0"/>
+              <a:t>Are there more injuries when attacks are provoked? </a:t>
+            </a:r>
           </a:p>
         </p:txBody>
       </p:sp>
     </p:spTree>
     <p:extLst>
       <p:ext uri="{BB962C8B-B14F-4D97-AF65-F5344CB8AC3E}">
-        <p14:creationId xmlns:p14="http://schemas.microsoft.com/office/powerpoint/2010/main" val="2113385708"/>
+        <p14:creationId xmlns:p14="http://schemas.microsoft.com/office/powerpoint/2010/main" val="3847644132"/>
       </p:ext>
     </p:extLst>
   </p:cSld>
@@ -14088,6 +14879,14 @@
 <file path=ppt/slides/slide8.xml><?xml version="1.0" encoding="utf-8"?>
 <p:sld xmlns:a="http://schemas.openxmlformats.org/drawingml/2006/main" xmlns:r="http://schemas.openxmlformats.org/officeDocument/2006/relationships" xmlns:p="http://schemas.openxmlformats.org/presentationml/2006/main">
   <p:cSld>
+    <p:bg>
+      <p:bgPr>
+        <a:solidFill>
+          <a:schemeClr val="bg1"/>
+        </a:solidFill>
+        <a:effectLst/>
+      </p:bgPr>
+    </p:bg>
     <p:spTree>
       <p:nvGrpSpPr>
         <p:cNvPr id="1" name=""/>
@@ -14104,6 +14903,142 @@
       </p:grpSpPr>
       <p:sp>
         <p:nvSpPr>
+          <p:cNvPr id="19" name="Rectangle 18">
+            <a:extLst>
+              <a:ext uri="{FF2B5EF4-FFF2-40B4-BE49-F238E27FC236}">
+                <a16:creationId xmlns:a16="http://schemas.microsoft.com/office/drawing/2014/main" id="{05325879-C4B2-475E-B853-DC8F21A63351}"/>
+              </a:ext>
+              <a:ext uri="{C183D7F6-B498-43B3-948B-1728B52AA6E4}">
+                <adec:decorative xmlns:adec="http://schemas.microsoft.com/office/drawing/2017/decorative" val="1"/>
+              </a:ext>
+            </a:extLst>
+          </p:cNvPr>
+          <p:cNvSpPr>
+            <a:spLocks noGrp="1" noRot="1" noChangeAspect="1" noMove="1" noResize="1" noEditPoints="1" noAdjustHandles="1" noChangeArrowheads="1" noChangeShapeType="1" noTextEdit="1"/>
+          </p:cNvSpPr>
+          <p:nvPr>
+            <p:extLst>
+              <p:ext uri="{386F3935-93C4-4BCD-93E2-E3B085C9AB24}">
+                <p16:designElem xmlns:p16="http://schemas.microsoft.com/office/powerpoint/2015/main" val="1"/>
+              </p:ext>
+            </p:extLst>
+          </p:nvPr>
+        </p:nvSpPr>
+        <p:spPr>
+          <a:xfrm>
+            <a:off x="-1" y="0"/>
+            <a:ext cx="12192001" cy="6858000"/>
+          </a:xfrm>
+          <a:prstGeom prst="rect">
+            <a:avLst/>
+          </a:prstGeom>
+          <a:solidFill>
+            <a:schemeClr val="bg1"/>
+          </a:solidFill>
+          <a:ln>
+            <a:noFill/>
+          </a:ln>
+        </p:spPr>
+        <p:style>
+          <a:lnRef idx="2">
+            <a:schemeClr val="accent1">
+              <a:shade val="50000"/>
+            </a:schemeClr>
+          </a:lnRef>
+          <a:fillRef idx="1">
+            <a:schemeClr val="accent1"/>
+          </a:fillRef>
+          <a:effectRef idx="0">
+            <a:schemeClr val="accent1"/>
+          </a:effectRef>
+          <a:fontRef idx="minor">
+            <a:schemeClr val="lt1"/>
+          </a:fontRef>
+        </p:style>
+        <p:txBody>
+          <a:bodyPr rtlCol="0" anchor="ctr"/>
+          <a:lstStyle/>
+          <a:p>
+            <a:pPr algn="ctr"/>
+            <a:endParaRPr lang="en-US"/>
+          </a:p>
+        </p:txBody>
+      </p:sp>
+      <p:sp>
+        <p:nvSpPr>
+          <p:cNvPr id="21" name="Rectangle 20">
+            <a:extLst>
+              <a:ext uri="{FF2B5EF4-FFF2-40B4-BE49-F238E27FC236}">
+                <a16:creationId xmlns:a16="http://schemas.microsoft.com/office/drawing/2014/main" id="{012C085F-3B19-420D-902A-B55695F5036C}"/>
+              </a:ext>
+              <a:ext uri="{C183D7F6-B498-43B3-948B-1728B52AA6E4}">
+                <adec:decorative xmlns:adec="http://schemas.microsoft.com/office/drawing/2017/decorative" val="1"/>
+              </a:ext>
+            </a:extLst>
+          </p:cNvPr>
+          <p:cNvSpPr>
+            <a:spLocks noGrp="1" noRot="1" noChangeAspect="1" noMove="1" noResize="1" noEditPoints="1" noAdjustHandles="1" noChangeArrowheads="1" noChangeShapeType="1" noTextEdit="1"/>
+          </p:cNvSpPr>
+          <p:nvPr>
+            <p:extLst>
+              <p:ext uri="{386F3935-93C4-4BCD-93E2-E3B085C9AB24}">
+                <p16:designElem xmlns:p16="http://schemas.microsoft.com/office/powerpoint/2015/main" val="1"/>
+              </p:ext>
+            </p:extLst>
+          </p:nvPr>
+        </p:nvSpPr>
+        <p:spPr>
+          <a:xfrm>
+            <a:off x="0" y="0"/>
+            <a:ext cx="4618105" cy="6858000"/>
+          </a:xfrm>
+          <a:prstGeom prst="rect">
+            <a:avLst/>
+          </a:prstGeom>
+          <a:blipFill>
+            <a:blip r:embed="rId2"/>
+            <a:stretch>
+              <a:fillRect r="-164004"/>
+            </a:stretch>
+          </a:blipFill>
+          <a:ln>
+            <a:noFill/>
+          </a:ln>
+          <a:effectLst>
+            <a:outerShdw blurRad="139700" dist="50800" algn="ctr" rotWithShape="0">
+              <a:srgbClr val="000000">
+                <a:alpha val="40000"/>
+              </a:srgbClr>
+            </a:outerShdw>
+          </a:effectLst>
+        </p:spPr>
+        <p:style>
+          <a:lnRef idx="2">
+            <a:schemeClr val="accent1">
+              <a:shade val="50000"/>
+            </a:schemeClr>
+          </a:lnRef>
+          <a:fillRef idx="1">
+            <a:schemeClr val="accent1"/>
+          </a:fillRef>
+          <a:effectRef idx="0">
+            <a:schemeClr val="accent1"/>
+          </a:effectRef>
+          <a:fontRef idx="minor">
+            <a:schemeClr val="lt1"/>
+          </a:fontRef>
+        </p:style>
+        <p:txBody>
+          <a:bodyPr rtlCol="0" anchor="ctr"/>
+          <a:lstStyle/>
+          <a:p>
+            <a:pPr algn="ctr"/>
+            <a:endParaRPr lang="en-US"/>
+          </a:p>
+        </p:txBody>
+      </p:sp>
+      <p:sp>
+        <p:nvSpPr>
           <p:cNvPr id="2" name="Title 1">
             <a:extLst>
               <a:ext uri="{FF2B5EF4-FFF2-40B4-BE49-F238E27FC236}">
@@ -14118,24 +15053,47 @@
             <p:ph type="title"/>
           </p:nvPr>
         </p:nvSpPr>
-        <p:spPr/>
+        <p:spPr>
+          <a:xfrm>
+            <a:off x="838201" y="365125"/>
+            <a:ext cx="3435625" cy="1325563"/>
+          </a:xfrm>
+        </p:spPr>
         <p:txBody>
-          <a:bodyPr/>
+          <a:bodyPr>
+            <a:normAutofit/>
+          </a:bodyPr>
           <a:lstStyle/>
           <a:p>
             <a:r>
-              <a:rPr lang="en-US" dirty="0"/>
-              <a:t>Victim </a:t>
+              <a:rPr lang="en-US" sz="4000" dirty="0">
+                <a:gradFill flip="none" rotWithShape="1">
+                  <a:gsLst>
+                    <a:gs pos="28000">
+                      <a:srgbClr val="EDEDED"/>
+                    </a:gs>
+                    <a:gs pos="0">
+                      <a:srgbClr val="BFBFBF"/>
+                    </a:gs>
+                    <a:gs pos="100000">
+                      <a:srgbClr val="FFFFFF"/>
+                    </a:gs>
+                  </a:gsLst>
+                  <a:lin ang="4800000" scaled="0"/>
+                  <a:tileRect/>
+                </a:gradFill>
+              </a:rPr>
+              <a:t>Victims by  Gender</a:t>
             </a:r>
           </a:p>
         </p:txBody>
       </p:sp>
       <p:sp>
         <p:nvSpPr>
-          <p:cNvPr id="3" name="Content Placeholder 2">
+          <p:cNvPr id="9" name="Content Placeholder 8">
             <a:extLst>
               <a:ext uri="{FF2B5EF4-FFF2-40B4-BE49-F238E27FC236}">
-                <a16:creationId xmlns:a16="http://schemas.microsoft.com/office/drawing/2014/main" id="{6E5895FC-E870-407B-90BF-2AD93030C96A}"/>
+                <a16:creationId xmlns:a16="http://schemas.microsoft.com/office/drawing/2014/main" id="{60D124B2-7E85-452B-81B0-B235F1F92CA5}"/>
               </a:ext>
             </a:extLst>
           </p:cNvPr>
@@ -14146,24 +15104,181 @@
             <p:ph idx="1"/>
           </p:nvPr>
         </p:nvSpPr>
-        <p:spPr/>
+        <p:spPr>
+          <a:xfrm>
+            <a:off x="666974" y="1825625"/>
+            <a:ext cx="3606853" cy="4351338"/>
+          </a:xfrm>
+        </p:spPr>
         <p:txBody>
-          <a:bodyPr/>
+          <a:bodyPr>
+            <a:normAutofit/>
+          </a:bodyPr>
           <a:lstStyle/>
           <a:p>
-            <a:endParaRPr lang="en-US"/>
+            <a:r>
+              <a:rPr lang="en-US" sz="2000" dirty="0">
+                <a:gradFill>
+                  <a:gsLst>
+                    <a:gs pos="34000">
+                      <a:srgbClr val="EDEDED"/>
+                    </a:gs>
+                    <a:gs pos="0">
+                      <a:srgbClr val="BFBFBF"/>
+                    </a:gs>
+                    <a:gs pos="100000">
+                      <a:srgbClr val="FFFFFF"/>
+                    </a:gs>
+                  </a:gsLst>
+                  <a:lin ang="4800000" scaled="0"/>
+                </a:gradFill>
+              </a:rPr>
+              <a:t>2513 attacks to male</a:t>
+            </a:r>
+          </a:p>
+          <a:p>
+            <a:r>
+              <a:rPr lang="en-US" sz="2000" dirty="0">
+                <a:gradFill>
+                  <a:gsLst>
+                    <a:gs pos="34000">
+                      <a:srgbClr val="EDEDED"/>
+                    </a:gs>
+                    <a:gs pos="0">
+                      <a:srgbClr val="BFBFBF"/>
+                    </a:gs>
+                    <a:gs pos="100000">
+                      <a:srgbClr val="FFFFFF"/>
+                    </a:gs>
+                  </a:gsLst>
+                  <a:lin ang="4800000" scaled="0"/>
+                </a:gradFill>
+              </a:rPr>
+              <a:t>466 attacks to females</a:t>
+            </a:r>
+          </a:p>
+          <a:p>
+            <a:r>
+              <a:rPr lang="en-US" sz="2000" dirty="0">
+                <a:gradFill>
+                  <a:gsLst>
+                    <a:gs pos="34000">
+                      <a:srgbClr val="EDEDED"/>
+                    </a:gs>
+                    <a:gs pos="0">
+                      <a:srgbClr val="BFBFBF"/>
+                    </a:gs>
+                    <a:gs pos="100000">
+                      <a:srgbClr val="FFFFFF"/>
+                    </a:gs>
+                  </a:gsLst>
+                  <a:lin ang="4800000" scaled="0"/>
+                </a:gradFill>
+              </a:rPr>
+              <a:t>1 attack unknown gender</a:t>
+            </a:r>
+          </a:p>
+          <a:p>
+            <a:pPr lvl="1"/>
+            <a:r>
+              <a:rPr lang="en-US" sz="1600" dirty="0">
+                <a:gradFill>
+                  <a:gsLst>
+                    <a:gs pos="34000">
+                      <a:srgbClr val="EDEDED"/>
+                    </a:gs>
+                    <a:gs pos="0">
+                      <a:srgbClr val="BFBFBF"/>
+                    </a:gs>
+                    <a:gs pos="100000">
+                      <a:srgbClr val="FFFFFF"/>
+                    </a:gs>
+                  </a:gsLst>
+                  <a:lin ang="4800000" scaled="0"/>
+                </a:gradFill>
+              </a:rPr>
+              <a:t>This was reported as “</a:t>
+            </a:r>
+            <a:r>
+              <a:rPr lang="en-US" sz="1600" dirty="0" err="1">
+                <a:gradFill>
+                  <a:gsLst>
+                    <a:gs pos="34000">
+                      <a:srgbClr val="EDEDED"/>
+                    </a:gs>
+                    <a:gs pos="0">
+                      <a:srgbClr val="BFBFBF"/>
+                    </a:gs>
+                    <a:gs pos="100000">
+                      <a:srgbClr val="FFFFFF"/>
+                    </a:gs>
+                  </a:gsLst>
+                  <a:lin ang="4800000" scaled="0"/>
+                </a:gradFill>
+              </a:rPr>
+              <a:t>lli</a:t>
+            </a:r>
+            <a:r>
+              <a:rPr lang="en-US" sz="1600" dirty="0">
+                <a:gradFill>
+                  <a:gsLst>
+                    <a:gs pos="34000">
+                      <a:srgbClr val="EDEDED"/>
+                    </a:gs>
+                    <a:gs pos="0">
+                      <a:srgbClr val="BFBFBF"/>
+                    </a:gs>
+                    <a:gs pos="100000">
+                      <a:srgbClr val="FFFFFF"/>
+                    </a:gs>
+                  </a:gsLst>
+                  <a:lin ang="4800000" scaled="0"/>
+                </a:gradFill>
+              </a:rPr>
+              <a:t>” where definition could not be found</a:t>
+            </a:r>
           </a:p>
         </p:txBody>
       </p:sp>
+      <p:pic>
+        <p:nvPicPr>
+          <p:cNvPr id="5" name="Content Placeholder 4" descr="Chart, pie chart&#10;&#10;Description automatically generated">
+            <a:extLst>
+              <a:ext uri="{FF2B5EF4-FFF2-40B4-BE49-F238E27FC236}">
+                <a16:creationId xmlns:a16="http://schemas.microsoft.com/office/drawing/2014/main" id="{F1C48F8D-1F2E-44EC-AEE0-72792E0EB9A6}"/>
+              </a:ext>
+            </a:extLst>
+          </p:cNvPr>
+          <p:cNvPicPr>
+            <a:picLocks noChangeAspect="1"/>
+          </p:cNvPicPr>
+          <p:nvPr/>
+        </p:nvPicPr>
+        <p:blipFill>
+          <a:blip r:embed="rId3"/>
+          <a:stretch>
+            <a:fillRect/>
+          </a:stretch>
+        </p:blipFill>
+        <p:spPr>
+          <a:xfrm>
+            <a:off x="2774676" y="0"/>
+            <a:ext cx="10286999" cy="6858000"/>
+          </a:xfrm>
+          <a:prstGeom prst="rect">
+            <a:avLst/>
+          </a:prstGeom>
+        </p:spPr>
+      </p:pic>
     </p:spTree>
     <p:extLst>
       <p:ext uri="{BB962C8B-B14F-4D97-AF65-F5344CB8AC3E}">
-        <p14:creationId xmlns:p14="http://schemas.microsoft.com/office/powerpoint/2010/main" val="3188215547"/>
+        <p14:creationId xmlns:p14="http://schemas.microsoft.com/office/powerpoint/2010/main" val="2113385708"/>
       </p:ext>
     </p:extLst>
   </p:cSld>
   <p:clrMapOvr>
-    <a:masterClrMapping/>
+    <a:overrideClrMapping bg1="lt1" tx1="dk1" bg2="lt2" tx2="dk2" accent1="accent1" accent2="accent2" accent3="accent3" accent4="accent4" accent5="accent5" accent6="accent6" hlink="hlink" folHlink="folHlink"/>
   </p:clrMapOvr>
 </p:sld>
 </file>
@@ -14171,6 +15286,14 @@
 <file path=ppt/slides/slide9.xml><?xml version="1.0" encoding="utf-8"?>
 <p:sld xmlns:a="http://schemas.openxmlformats.org/drawingml/2006/main" xmlns:r="http://schemas.openxmlformats.org/officeDocument/2006/relationships" xmlns:p="http://schemas.openxmlformats.org/presentationml/2006/main">
   <p:cSld>
+    <p:bg>
+      <p:bgPr>
+        <a:solidFill>
+          <a:schemeClr val="bg1"/>
+        </a:solidFill>
+        <a:effectLst/>
+      </p:bgPr>
+    </p:bg>
     <p:spTree>
       <p:nvGrpSpPr>
         <p:cNvPr id="1" name=""/>
@@ -14187,10 +15310,146 @@
       </p:grpSpPr>
       <p:sp>
         <p:nvSpPr>
+          <p:cNvPr id="26" name="Rectangle 25">
+            <a:extLst>
+              <a:ext uri="{FF2B5EF4-FFF2-40B4-BE49-F238E27FC236}">
+                <a16:creationId xmlns:a16="http://schemas.microsoft.com/office/drawing/2014/main" id="{05325879-C4B2-475E-B853-DC8F21A63351}"/>
+              </a:ext>
+              <a:ext uri="{C183D7F6-B498-43B3-948B-1728B52AA6E4}">
+                <adec:decorative xmlns:adec="http://schemas.microsoft.com/office/drawing/2017/decorative" val="1"/>
+              </a:ext>
+            </a:extLst>
+          </p:cNvPr>
+          <p:cNvSpPr>
+            <a:spLocks noGrp="1" noRot="1" noChangeAspect="1" noMove="1" noResize="1" noEditPoints="1" noAdjustHandles="1" noChangeArrowheads="1" noChangeShapeType="1" noTextEdit="1"/>
+          </p:cNvSpPr>
+          <p:nvPr>
+            <p:extLst>
+              <p:ext uri="{386F3935-93C4-4BCD-93E2-E3B085C9AB24}">
+                <p16:designElem xmlns:p16="http://schemas.microsoft.com/office/powerpoint/2015/main" val="1"/>
+              </p:ext>
+            </p:extLst>
+          </p:nvPr>
+        </p:nvSpPr>
+        <p:spPr>
+          <a:xfrm>
+            <a:off x="-1" y="0"/>
+            <a:ext cx="12192001" cy="6858000"/>
+          </a:xfrm>
+          <a:prstGeom prst="rect">
+            <a:avLst/>
+          </a:prstGeom>
+          <a:solidFill>
+            <a:schemeClr val="bg1"/>
+          </a:solidFill>
+          <a:ln>
+            <a:noFill/>
+          </a:ln>
+        </p:spPr>
+        <p:style>
+          <a:lnRef idx="2">
+            <a:schemeClr val="accent1">
+              <a:shade val="50000"/>
+            </a:schemeClr>
+          </a:lnRef>
+          <a:fillRef idx="1">
+            <a:schemeClr val="accent1"/>
+          </a:fillRef>
+          <a:effectRef idx="0">
+            <a:schemeClr val="accent1"/>
+          </a:effectRef>
+          <a:fontRef idx="minor">
+            <a:schemeClr val="lt1"/>
+          </a:fontRef>
+        </p:style>
+        <p:txBody>
+          <a:bodyPr rtlCol="0" anchor="ctr"/>
+          <a:lstStyle/>
+          <a:p>
+            <a:pPr algn="ctr"/>
+            <a:endParaRPr lang="en-US"/>
+          </a:p>
+        </p:txBody>
+      </p:sp>
+      <p:sp>
+        <p:nvSpPr>
+          <p:cNvPr id="28" name="Rectangle 27">
+            <a:extLst>
+              <a:ext uri="{FF2B5EF4-FFF2-40B4-BE49-F238E27FC236}">
+                <a16:creationId xmlns:a16="http://schemas.microsoft.com/office/drawing/2014/main" id="{012C085F-3B19-420D-902A-B55695F5036C}"/>
+              </a:ext>
+              <a:ext uri="{C183D7F6-B498-43B3-948B-1728B52AA6E4}">
+                <adec:decorative xmlns:adec="http://schemas.microsoft.com/office/drawing/2017/decorative" val="1"/>
+              </a:ext>
+            </a:extLst>
+          </p:cNvPr>
+          <p:cNvSpPr>
+            <a:spLocks noGrp="1" noRot="1" noChangeAspect="1" noMove="1" noResize="1" noEditPoints="1" noAdjustHandles="1" noChangeArrowheads="1" noChangeShapeType="1" noTextEdit="1"/>
+          </p:cNvSpPr>
+          <p:nvPr>
+            <p:extLst>
+              <p:ext uri="{386F3935-93C4-4BCD-93E2-E3B085C9AB24}">
+                <p16:designElem xmlns:p16="http://schemas.microsoft.com/office/powerpoint/2015/main" val="1"/>
+              </p:ext>
+            </p:extLst>
+          </p:nvPr>
+        </p:nvSpPr>
+        <p:spPr>
+          <a:xfrm>
+            <a:off x="0" y="0"/>
+            <a:ext cx="4618105" cy="6858000"/>
+          </a:xfrm>
+          <a:prstGeom prst="rect">
+            <a:avLst/>
+          </a:prstGeom>
+          <a:blipFill>
+            <a:blip r:embed="rId2"/>
+            <a:stretch>
+              <a:fillRect r="-164004"/>
+            </a:stretch>
+          </a:blipFill>
+          <a:ln>
+            <a:noFill/>
+          </a:ln>
+          <a:effectLst>
+            <a:outerShdw blurRad="139700" dist="50800" algn="ctr" rotWithShape="0">
+              <a:srgbClr val="000000">
+                <a:alpha val="40000"/>
+              </a:srgbClr>
+            </a:outerShdw>
+          </a:effectLst>
+        </p:spPr>
+        <p:style>
+          <a:lnRef idx="2">
+            <a:schemeClr val="accent1">
+              <a:shade val="50000"/>
+            </a:schemeClr>
+          </a:lnRef>
+          <a:fillRef idx="1">
+            <a:schemeClr val="accent1"/>
+          </a:fillRef>
+          <a:effectRef idx="0">
+            <a:schemeClr val="accent1"/>
+          </a:effectRef>
+          <a:fontRef idx="minor">
+            <a:schemeClr val="lt1"/>
+          </a:fontRef>
+        </p:style>
+        <p:txBody>
+          <a:bodyPr rtlCol="0" anchor="ctr"/>
+          <a:lstStyle/>
+          <a:p>
+            <a:pPr algn="ctr"/>
+            <a:endParaRPr lang="en-US"/>
+          </a:p>
+        </p:txBody>
+      </p:sp>
+      <p:sp>
+        <p:nvSpPr>
           <p:cNvPr id="2" name="Title 1">
             <a:extLst>
               <a:ext uri="{FF2B5EF4-FFF2-40B4-BE49-F238E27FC236}">
-                <a16:creationId xmlns:a16="http://schemas.microsoft.com/office/drawing/2014/main" id="{7FD46AC0-DF8A-4540-8DF3-3F33343FF468}"/>
+                <a16:creationId xmlns:a16="http://schemas.microsoft.com/office/drawing/2014/main" id="{6990B7C3-9CC1-48A0-9619-208FA5F599F0}"/>
               </a:ext>
             </a:extLst>
           </p:cNvPr>
@@ -14201,24 +15460,47 @@
             <p:ph type="title"/>
           </p:nvPr>
         </p:nvSpPr>
-        <p:spPr/>
+        <p:spPr>
+          <a:xfrm>
+            <a:off x="838201" y="365125"/>
+            <a:ext cx="3435625" cy="1325563"/>
+          </a:xfrm>
+        </p:spPr>
         <p:txBody>
-          <a:bodyPr/>
+          <a:bodyPr>
+            <a:normAutofit/>
+          </a:bodyPr>
           <a:lstStyle/>
           <a:p>
             <a:r>
-              <a:rPr lang="en-US" dirty="0"/>
-              <a:t>Shark Types</a:t>
+              <a:rPr lang="en-US" sz="4000" dirty="0">
+                <a:gradFill flip="none" rotWithShape="1">
+                  <a:gsLst>
+                    <a:gs pos="28000">
+                      <a:srgbClr val="EDEDED"/>
+                    </a:gs>
+                    <a:gs pos="0">
+                      <a:srgbClr val="BFBFBF"/>
+                    </a:gs>
+                    <a:gs pos="100000">
+                      <a:srgbClr val="FFFFFF"/>
+                    </a:gs>
+                  </a:gsLst>
+                  <a:lin ang="4800000" scaled="0"/>
+                  <a:tileRect/>
+                </a:gradFill>
+              </a:rPr>
+              <a:t> Victims by Activity</a:t>
             </a:r>
           </a:p>
         </p:txBody>
       </p:sp>
       <p:sp>
         <p:nvSpPr>
-          <p:cNvPr id="3" name="Content Placeholder 2">
+          <p:cNvPr id="23" name="Content Placeholder 22">
             <a:extLst>
               <a:ext uri="{FF2B5EF4-FFF2-40B4-BE49-F238E27FC236}">
-                <a16:creationId xmlns:a16="http://schemas.microsoft.com/office/drawing/2014/main" id="{E26AEC00-AC22-4ECA-B9F3-2A639DB70FEC}"/>
+                <a16:creationId xmlns:a16="http://schemas.microsoft.com/office/drawing/2014/main" id="{ABDBBDDE-CAF5-4A5C-B599-20ECE3674878}"/>
               </a:ext>
             </a:extLst>
           </p:cNvPr>
@@ -14229,24 +15511,222 @@
             <p:ph idx="1"/>
           </p:nvPr>
         </p:nvSpPr>
-        <p:spPr/>
+        <p:spPr>
+          <a:xfrm>
+            <a:off x="666974" y="1825625"/>
+            <a:ext cx="3606853" cy="4351338"/>
+          </a:xfrm>
+        </p:spPr>
         <p:txBody>
-          <a:bodyPr/>
+          <a:bodyPr>
+            <a:normAutofit/>
+          </a:bodyPr>
           <a:lstStyle/>
           <a:p>
-            <a:endParaRPr lang="en-US"/>
+            <a:r>
+              <a:rPr lang="en-US" sz="2000" dirty="0">
+                <a:gradFill>
+                  <a:gsLst>
+                    <a:gs pos="34000">
+                      <a:srgbClr val="EDEDED"/>
+                    </a:gs>
+                    <a:gs pos="0">
+                      <a:srgbClr val="BFBFBF"/>
+                    </a:gs>
+                    <a:gs pos="100000">
+                      <a:srgbClr val="FFFFFF"/>
+                    </a:gs>
+                  </a:gsLst>
+                  <a:lin ang="4800000" scaled="0"/>
+                </a:gradFill>
+              </a:rPr>
+              <a:t>Sharks prefer attacking surfers over all other activities</a:t>
+            </a:r>
+          </a:p>
+          <a:p>
+            <a:endParaRPr lang="en-US" sz="2000" dirty="0">
+              <a:gradFill>
+                <a:gsLst>
+                  <a:gs pos="34000">
+                    <a:srgbClr val="EDEDED"/>
+                  </a:gs>
+                  <a:gs pos="0">
+                    <a:srgbClr val="BFBFBF"/>
+                  </a:gs>
+                  <a:gs pos="100000">
+                    <a:srgbClr val="FFFFFF"/>
+                  </a:gs>
+                </a:gsLst>
+                <a:lin ang="4800000" scaled="0"/>
+              </a:gradFill>
+            </a:endParaRPr>
+          </a:p>
+          <a:p>
+            <a:r>
+              <a:rPr lang="en-US" sz="2000" dirty="0">
+                <a:gradFill>
+                  <a:gsLst>
+                    <a:gs pos="34000">
+                      <a:srgbClr val="EDEDED"/>
+                    </a:gs>
+                    <a:gs pos="0">
+                      <a:srgbClr val="BFBFBF"/>
+                    </a:gs>
+                    <a:gs pos="100000">
+                      <a:srgbClr val="FFFFFF"/>
+                    </a:gs>
+                  </a:gsLst>
+                  <a:lin ang="4800000" scaled="0"/>
+                </a:gradFill>
+              </a:rPr>
+              <a:t>Data was grouped by activity type as best as possible. </a:t>
+            </a:r>
+          </a:p>
+          <a:p>
+            <a:pPr lvl="1"/>
+            <a:r>
+              <a:rPr lang="en-US" sz="1600" dirty="0">
+                <a:gradFill>
+                  <a:gsLst>
+                    <a:gs pos="34000">
+                      <a:srgbClr val="EDEDED"/>
+                    </a:gs>
+                    <a:gs pos="0">
+                      <a:srgbClr val="BFBFBF"/>
+                    </a:gs>
+                    <a:gs pos="100000">
+                      <a:srgbClr val="FFFFFF"/>
+                    </a:gs>
+                  </a:gsLst>
+                  <a:lin ang="4800000" scaled="0"/>
+                </a:gradFill>
+              </a:rPr>
+              <a:t>Accidents: unintentional </a:t>
+            </a:r>
+          </a:p>
+          <a:p>
+            <a:pPr lvl="1"/>
+            <a:r>
+              <a:rPr lang="en-US" sz="1600" dirty="0">
+                <a:gradFill>
+                  <a:gsLst>
+                    <a:gs pos="34000">
+                      <a:srgbClr val="EDEDED"/>
+                    </a:gs>
+                    <a:gs pos="0">
+                      <a:srgbClr val="BFBFBF"/>
+                    </a:gs>
+                    <a:gs pos="100000">
+                      <a:srgbClr val="FFFFFF"/>
+                    </a:gs>
+                  </a:gsLst>
+                  <a:lin ang="4800000" scaled="0"/>
+                </a:gradFill>
+              </a:rPr>
+              <a:t>Disasters: weather, intentional</a:t>
+            </a:r>
+          </a:p>
+          <a:p>
+            <a:pPr lvl="1"/>
+            <a:r>
+              <a:rPr lang="en-US" sz="1600" dirty="0">
+                <a:gradFill>
+                  <a:gsLst>
+                    <a:gs pos="34000">
+                      <a:srgbClr val="EDEDED"/>
+                    </a:gs>
+                    <a:gs pos="0">
+                      <a:srgbClr val="BFBFBF"/>
+                    </a:gs>
+                    <a:gs pos="100000">
+                      <a:srgbClr val="FFFFFF"/>
+                    </a:gs>
+                  </a:gsLst>
+                  <a:lin ang="4800000" scaled="0"/>
+                </a:gradFill>
+              </a:rPr>
+              <a:t>Unknown: included reports where context was unknown such as </a:t>
+            </a:r>
+            <a:r>
+              <a:rPr lang="en-US" sz="1600" dirty="0" err="1">
+                <a:gradFill>
+                  <a:gsLst>
+                    <a:gs pos="34000">
+                      <a:srgbClr val="EDEDED"/>
+                    </a:gs>
+                    <a:gs pos="0">
+                      <a:srgbClr val="BFBFBF"/>
+                    </a:gs>
+                    <a:gs pos="100000">
+                      <a:srgbClr val="FFFFFF"/>
+                    </a:gs>
+                  </a:gsLst>
+                  <a:lin ang="4800000" scaled="0"/>
+                </a:gradFill>
+              </a:rPr>
+              <a:t>Batin</a:t>
+            </a:r>
+            <a:r>
+              <a:rPr lang="en-US" sz="1600" dirty="0">
+                <a:gradFill>
+                  <a:gsLst>
+                    <a:gs pos="34000">
+                      <a:srgbClr val="EDEDED"/>
+                    </a:gs>
+                    <a:gs pos="0">
+                      <a:srgbClr val="BFBFBF"/>
+                    </a:gs>
+                    <a:gs pos="100000">
+                      <a:srgbClr val="FFFFFF"/>
+                    </a:gs>
+                  </a:gsLst>
+                  <a:lin ang="4800000" scaled="0"/>
+                </a:gradFill>
+              </a:rPr>
+              <a:t> and Cruising </a:t>
+            </a:r>
           </a:p>
         </p:txBody>
       </p:sp>
+      <p:pic>
+        <p:nvPicPr>
+          <p:cNvPr id="7" name="Content Placeholder 6" descr="Chart, histogram&#10;&#10;Description automatically generated">
+            <a:extLst>
+              <a:ext uri="{FF2B5EF4-FFF2-40B4-BE49-F238E27FC236}">
+                <a16:creationId xmlns:a16="http://schemas.microsoft.com/office/drawing/2014/main" id="{662AAD8D-6FB5-433F-B6E4-9AEC9BD282AA}"/>
+              </a:ext>
+            </a:extLst>
+          </p:cNvPr>
+          <p:cNvPicPr>
+            <a:picLocks noChangeAspect="1"/>
+          </p:cNvPicPr>
+          <p:nvPr/>
+        </p:nvPicPr>
+        <p:blipFill>
+          <a:blip r:embed="rId3"/>
+          <a:stretch>
+            <a:fillRect/>
+          </a:stretch>
+        </p:blipFill>
+        <p:spPr>
+          <a:xfrm>
+            <a:off x="5476306" y="643464"/>
+            <a:ext cx="5910952" cy="5571072"/>
+          </a:xfrm>
+          <a:prstGeom prst="rect">
+            <a:avLst/>
+          </a:prstGeom>
+        </p:spPr>
+      </p:pic>
     </p:spTree>
     <p:extLst>
       <p:ext uri="{BB962C8B-B14F-4D97-AF65-F5344CB8AC3E}">
-        <p14:creationId xmlns:p14="http://schemas.microsoft.com/office/powerpoint/2010/main" val="2967827184"/>
+        <p14:creationId xmlns:p14="http://schemas.microsoft.com/office/powerpoint/2010/main" val="3188215547"/>
       </p:ext>
     </p:extLst>
   </p:cSld>
   <p:clrMapOvr>
-    <a:masterClrMapping/>
+    <a:overrideClrMapping bg1="lt1" tx1="dk1" bg2="lt2" tx2="dk2" accent1="accent1" accent2="accent2" accent3="accent3" accent4="accent4" accent5="accent5" accent6="accent6" hlink="hlink" folHlink="folHlink"/>
   </p:clrMapOvr>
 </p:sld>
 </file>

</xml_diff>